<commit_message>
Initial styles and images for final presentation
</commit_message>
<xml_diff>
--- a/presentations/thesis.pptx
+++ b/presentations/thesis.pptx
@@ -4,8 +4,13 @@
   <p:sldMasterIdLst>
     <p:sldMasterId id="2147483648" r:id="rId1"/>
   </p:sldMasterIdLst>
+  <p:notesMasterIdLst>
+    <p:notesMasterId r:id="rId5"/>
+  </p:notesMasterIdLst>
   <p:sldIdLst>
     <p:sldId id="256" r:id="rId2"/>
+    <p:sldId id="257" r:id="rId3"/>
+    <p:sldId id="258" r:id="rId4"/>
   </p:sldIdLst>
   <p:sldSz cx="9144000" cy="6858000" type="screen4x3"/>
   <p:notesSz cx="6858000" cy="9144000"/>
@@ -107,6 +112,353 @@
 </p:presentation>
 </file>
 
+<file path=ppt/notesMasters/notesMaster1.xml><?xml version="1.0" encoding="utf-8"?>
+<p:notesMaster xmlns:a="http://schemas.openxmlformats.org/drawingml/2006/main" xmlns:r="http://schemas.openxmlformats.org/officeDocument/2006/relationships" xmlns:p="http://schemas.openxmlformats.org/presentationml/2006/main">
+  <p:cSld>
+    <p:bg>
+      <p:bgRef idx="1001">
+        <a:schemeClr val="bg1"/>
+      </p:bgRef>
+    </p:bg>
+    <p:spTree>
+      <p:nvGrpSpPr>
+        <p:cNvPr id="1" name=""/>
+        <p:cNvGrpSpPr/>
+        <p:nvPr/>
+      </p:nvGrpSpPr>
+      <p:grpSpPr>
+        <a:xfrm>
+          <a:off x="0" y="0"/>
+          <a:ext cx="0" cy="0"/>
+          <a:chOff x="0" y="0"/>
+          <a:chExt cx="0" cy="0"/>
+        </a:xfrm>
+      </p:grpSpPr>
+      <p:sp>
+        <p:nvSpPr>
+          <p:cNvPr id="2" name="Header Placeholder 1"/>
+          <p:cNvSpPr>
+            <a:spLocks noGrp="1"/>
+          </p:cNvSpPr>
+          <p:nvPr>
+            <p:ph type="hdr" sz="quarter"/>
+          </p:nvPr>
+        </p:nvSpPr>
+        <p:spPr>
+          <a:xfrm>
+            <a:off x="0" y="0"/>
+            <a:ext cx="2971800" cy="457200"/>
+          </a:xfrm>
+          <a:prstGeom prst="rect">
+            <a:avLst/>
+          </a:prstGeom>
+        </p:spPr>
+        <p:txBody>
+          <a:bodyPr vert="horz" lIns="91440" tIns="45720" rIns="91440" bIns="45720" rtlCol="0"/>
+          <a:lstStyle>
+            <a:lvl1pPr algn="l">
+              <a:defRPr sz="1200"/>
+            </a:lvl1pPr>
+          </a:lstStyle>
+          <a:p>
+            <a:endParaRPr lang="pt-PT"/>
+          </a:p>
+        </p:txBody>
+      </p:sp>
+      <p:sp>
+        <p:nvSpPr>
+          <p:cNvPr id="3" name="Date Placeholder 2"/>
+          <p:cNvSpPr>
+            <a:spLocks noGrp="1"/>
+          </p:cNvSpPr>
+          <p:nvPr>
+            <p:ph type="dt" idx="1"/>
+          </p:nvPr>
+        </p:nvSpPr>
+        <p:spPr>
+          <a:xfrm>
+            <a:off x="3884613" y="0"/>
+            <a:ext cx="2971800" cy="457200"/>
+          </a:xfrm>
+          <a:prstGeom prst="rect">
+            <a:avLst/>
+          </a:prstGeom>
+        </p:spPr>
+        <p:txBody>
+          <a:bodyPr vert="horz" lIns="91440" tIns="45720" rIns="91440" bIns="45720" rtlCol="0"/>
+          <a:lstStyle>
+            <a:lvl1pPr algn="r">
+              <a:defRPr sz="1200"/>
+            </a:lvl1pPr>
+          </a:lstStyle>
+          <a:p>
+            <a:fld id="{A4A9652A-D4BF-41F5-B3CF-F03C6BFD8852}" type="datetimeFigureOut">
+              <a:rPr lang="pt-PT" smtClean="0"/>
+              <a:t>28-01-2011</a:t>
+            </a:fld>
+            <a:endParaRPr lang="pt-PT"/>
+          </a:p>
+        </p:txBody>
+      </p:sp>
+      <p:sp>
+        <p:nvSpPr>
+          <p:cNvPr id="4" name="Slide Image Placeholder 3"/>
+          <p:cNvSpPr>
+            <a:spLocks noGrp="1" noRot="1" noChangeAspect="1"/>
+          </p:cNvSpPr>
+          <p:nvPr>
+            <p:ph type="sldImg" idx="2"/>
+          </p:nvPr>
+        </p:nvSpPr>
+        <p:spPr>
+          <a:xfrm>
+            <a:off x="1143000" y="685800"/>
+            <a:ext cx="4572000" cy="3429000"/>
+          </a:xfrm>
+          <a:prstGeom prst="rect">
+            <a:avLst/>
+          </a:prstGeom>
+          <a:noFill/>
+          <a:ln w="12700">
+            <a:solidFill>
+              <a:prstClr val="black"/>
+            </a:solidFill>
+          </a:ln>
+        </p:spPr>
+        <p:txBody>
+          <a:bodyPr vert="horz" lIns="91440" tIns="45720" rIns="91440" bIns="45720" rtlCol="0" anchor="ctr"/>
+          <a:lstStyle/>
+          <a:p>
+            <a:endParaRPr lang="pt-PT"/>
+          </a:p>
+        </p:txBody>
+      </p:sp>
+      <p:sp>
+        <p:nvSpPr>
+          <p:cNvPr id="5" name="Notes Placeholder 4"/>
+          <p:cNvSpPr>
+            <a:spLocks noGrp="1"/>
+          </p:cNvSpPr>
+          <p:nvPr>
+            <p:ph type="body" sz="quarter" idx="3"/>
+          </p:nvPr>
+        </p:nvSpPr>
+        <p:spPr>
+          <a:xfrm>
+            <a:off x="685800" y="4343400"/>
+            <a:ext cx="5486400" cy="4114800"/>
+          </a:xfrm>
+          <a:prstGeom prst="rect">
+            <a:avLst/>
+          </a:prstGeom>
+        </p:spPr>
+        <p:txBody>
+          <a:bodyPr vert="horz" lIns="91440" tIns="45720" rIns="91440" bIns="45720" rtlCol="0">
+            <a:normAutofit/>
+          </a:bodyPr>
+          <a:lstStyle/>
+          <a:p>
+            <a:pPr lvl="0"/>
+            <a:r>
+              <a:rPr lang="en-US" smtClean="0"/>
+              <a:t>Click to edit Master text styles</a:t>
+            </a:r>
+          </a:p>
+          <a:p>
+            <a:pPr lvl="1"/>
+            <a:r>
+              <a:rPr lang="en-US" smtClean="0"/>
+              <a:t>Second level</a:t>
+            </a:r>
+          </a:p>
+          <a:p>
+            <a:pPr lvl="2"/>
+            <a:r>
+              <a:rPr lang="en-US" smtClean="0"/>
+              <a:t>Third level</a:t>
+            </a:r>
+          </a:p>
+          <a:p>
+            <a:pPr lvl="3"/>
+            <a:r>
+              <a:rPr lang="en-US" smtClean="0"/>
+              <a:t>Fourth level</a:t>
+            </a:r>
+          </a:p>
+          <a:p>
+            <a:pPr lvl="4"/>
+            <a:r>
+              <a:rPr lang="en-US" smtClean="0"/>
+              <a:t>Fifth level</a:t>
+            </a:r>
+            <a:endParaRPr lang="pt-PT"/>
+          </a:p>
+        </p:txBody>
+      </p:sp>
+      <p:sp>
+        <p:nvSpPr>
+          <p:cNvPr id="6" name="Footer Placeholder 5"/>
+          <p:cNvSpPr>
+            <a:spLocks noGrp="1"/>
+          </p:cNvSpPr>
+          <p:nvPr>
+            <p:ph type="ftr" sz="quarter" idx="4"/>
+          </p:nvPr>
+        </p:nvSpPr>
+        <p:spPr>
+          <a:xfrm>
+            <a:off x="0" y="8685213"/>
+            <a:ext cx="2971800" cy="457200"/>
+          </a:xfrm>
+          <a:prstGeom prst="rect">
+            <a:avLst/>
+          </a:prstGeom>
+        </p:spPr>
+        <p:txBody>
+          <a:bodyPr vert="horz" lIns="91440" tIns="45720" rIns="91440" bIns="45720" rtlCol="0" anchor="b"/>
+          <a:lstStyle>
+            <a:lvl1pPr algn="l">
+              <a:defRPr sz="1200"/>
+            </a:lvl1pPr>
+          </a:lstStyle>
+          <a:p>
+            <a:endParaRPr lang="pt-PT"/>
+          </a:p>
+        </p:txBody>
+      </p:sp>
+      <p:sp>
+        <p:nvSpPr>
+          <p:cNvPr id="7" name="Slide Number Placeholder 6"/>
+          <p:cNvSpPr>
+            <a:spLocks noGrp="1"/>
+          </p:cNvSpPr>
+          <p:nvPr>
+            <p:ph type="sldNum" sz="quarter" idx="5"/>
+          </p:nvPr>
+        </p:nvSpPr>
+        <p:spPr>
+          <a:xfrm>
+            <a:off x="3884613" y="8685213"/>
+            <a:ext cx="2971800" cy="457200"/>
+          </a:xfrm>
+          <a:prstGeom prst="rect">
+            <a:avLst/>
+          </a:prstGeom>
+        </p:spPr>
+        <p:txBody>
+          <a:bodyPr vert="horz" lIns="91440" tIns="45720" rIns="91440" bIns="45720" rtlCol="0" anchor="b"/>
+          <a:lstStyle>
+            <a:lvl1pPr algn="r">
+              <a:defRPr sz="1200"/>
+            </a:lvl1pPr>
+          </a:lstStyle>
+          <a:p>
+            <a:fld id="{EE5867BE-386C-4D16-9B1D-8635FC172DF2}" type="slidenum">
+              <a:rPr lang="pt-PT" smtClean="0"/>
+              <a:t>‹#›</a:t>
+            </a:fld>
+            <a:endParaRPr lang="pt-PT"/>
+          </a:p>
+        </p:txBody>
+      </p:sp>
+    </p:spTree>
+  </p:cSld>
+  <p:clrMap bg1="lt1" tx1="dk1" bg2="lt2" tx2="dk2" accent1="accent1" accent2="accent2" accent3="accent3" accent4="accent4" accent5="accent5" accent6="accent6" hlink="hlink" folHlink="folHlink"/>
+  <p:notesStyle>
+    <a:lvl1pPr marL="0" algn="l" defTabSz="914400" rtl="0" eaLnBrk="1" latinLnBrk="0" hangingPunct="1">
+      <a:defRPr sz="1200" kern="1200">
+        <a:solidFill>
+          <a:schemeClr val="tx1"/>
+        </a:solidFill>
+        <a:latin typeface="+mn-lt"/>
+        <a:ea typeface="+mn-ea"/>
+        <a:cs typeface="+mn-cs"/>
+      </a:defRPr>
+    </a:lvl1pPr>
+    <a:lvl2pPr marL="457200" algn="l" defTabSz="914400" rtl="0" eaLnBrk="1" latinLnBrk="0" hangingPunct="1">
+      <a:defRPr sz="1200" kern="1200">
+        <a:solidFill>
+          <a:schemeClr val="tx1"/>
+        </a:solidFill>
+        <a:latin typeface="+mn-lt"/>
+        <a:ea typeface="+mn-ea"/>
+        <a:cs typeface="+mn-cs"/>
+      </a:defRPr>
+    </a:lvl2pPr>
+    <a:lvl3pPr marL="914400" algn="l" defTabSz="914400" rtl="0" eaLnBrk="1" latinLnBrk="0" hangingPunct="1">
+      <a:defRPr sz="1200" kern="1200">
+        <a:solidFill>
+          <a:schemeClr val="tx1"/>
+        </a:solidFill>
+        <a:latin typeface="+mn-lt"/>
+        <a:ea typeface="+mn-ea"/>
+        <a:cs typeface="+mn-cs"/>
+      </a:defRPr>
+    </a:lvl3pPr>
+    <a:lvl4pPr marL="1371600" algn="l" defTabSz="914400" rtl="0" eaLnBrk="1" latinLnBrk="0" hangingPunct="1">
+      <a:defRPr sz="1200" kern="1200">
+        <a:solidFill>
+          <a:schemeClr val="tx1"/>
+        </a:solidFill>
+        <a:latin typeface="+mn-lt"/>
+        <a:ea typeface="+mn-ea"/>
+        <a:cs typeface="+mn-cs"/>
+      </a:defRPr>
+    </a:lvl4pPr>
+    <a:lvl5pPr marL="1828800" algn="l" defTabSz="914400" rtl="0" eaLnBrk="1" latinLnBrk="0" hangingPunct="1">
+      <a:defRPr sz="1200" kern="1200">
+        <a:solidFill>
+          <a:schemeClr val="tx1"/>
+        </a:solidFill>
+        <a:latin typeface="+mn-lt"/>
+        <a:ea typeface="+mn-ea"/>
+        <a:cs typeface="+mn-cs"/>
+      </a:defRPr>
+    </a:lvl5pPr>
+    <a:lvl6pPr marL="2286000" algn="l" defTabSz="914400" rtl="0" eaLnBrk="1" latinLnBrk="0" hangingPunct="1">
+      <a:defRPr sz="1200" kern="1200">
+        <a:solidFill>
+          <a:schemeClr val="tx1"/>
+        </a:solidFill>
+        <a:latin typeface="+mn-lt"/>
+        <a:ea typeface="+mn-ea"/>
+        <a:cs typeface="+mn-cs"/>
+      </a:defRPr>
+    </a:lvl6pPr>
+    <a:lvl7pPr marL="2743200" algn="l" defTabSz="914400" rtl="0" eaLnBrk="1" latinLnBrk="0" hangingPunct="1">
+      <a:defRPr sz="1200" kern="1200">
+        <a:solidFill>
+          <a:schemeClr val="tx1"/>
+        </a:solidFill>
+        <a:latin typeface="+mn-lt"/>
+        <a:ea typeface="+mn-ea"/>
+        <a:cs typeface="+mn-cs"/>
+      </a:defRPr>
+    </a:lvl7pPr>
+    <a:lvl8pPr marL="3200400" algn="l" defTabSz="914400" rtl="0" eaLnBrk="1" latinLnBrk="0" hangingPunct="1">
+      <a:defRPr sz="1200" kern="1200">
+        <a:solidFill>
+          <a:schemeClr val="tx1"/>
+        </a:solidFill>
+        <a:latin typeface="+mn-lt"/>
+        <a:ea typeface="+mn-ea"/>
+        <a:cs typeface="+mn-cs"/>
+      </a:defRPr>
+    </a:lvl8pPr>
+    <a:lvl9pPr marL="3657600" algn="l" defTabSz="914400" rtl="0" eaLnBrk="1" latinLnBrk="0" hangingPunct="1">
+      <a:defRPr sz="1200" kern="1200">
+        <a:solidFill>
+          <a:schemeClr val="tx1"/>
+        </a:solidFill>
+        <a:latin typeface="+mn-lt"/>
+        <a:ea typeface="+mn-ea"/>
+        <a:cs typeface="+mn-cs"/>
+      </a:defRPr>
+    </a:lvl9pPr>
+  </p:notesStyle>
+</p:notesMaster>
+</file>
+
 <file path=ppt/slideLayouts/slideLayout1.xml><?xml version="1.0" encoding="utf-8"?>
 <p:sldLayout xmlns:a="http://schemas.openxmlformats.org/drawingml/2006/main" xmlns:r="http://schemas.openxmlformats.org/officeDocument/2006/relationships" xmlns:p="http://schemas.openxmlformats.org/presentationml/2006/main" type="title" preserve="1">
   <p:cSld name="Title Slide">
@@ -286,9 +638,9 @@
           <a:bodyPr/>
           <a:lstStyle/>
           <a:p>
-            <a:fld id="{822145EC-93BD-4CB0-9C81-4533A20264B1}" type="datetimeFigureOut">
+            <a:fld id="{B21DA5EC-CDBD-4BE5-AFEC-D05D842E9DCA}" type="datetime1">
               <a:rPr lang="pt-PT" smtClean="0"/>
-              <a:t>27-01-2011</a:t>
+              <a:t>28-01-2011</a:t>
             </a:fld>
             <a:endParaRPr lang="pt-PT"/>
           </a:p>
@@ -330,6 +682,7 @@
           <a:p>
             <a:fld id="{AF2DD60D-AE1E-4B35-90D2-0ABAEDD7A6F5}" type="slidenum">
               <a:rPr lang="pt-PT" smtClean="0"/>
+              <a:pPr/>
               <a:t>‹#›</a:t>
             </a:fld>
             <a:endParaRPr lang="pt-PT"/>
@@ -451,9 +804,9 @@
           <a:bodyPr/>
           <a:lstStyle/>
           <a:p>
-            <a:fld id="{822145EC-93BD-4CB0-9C81-4533A20264B1}" type="datetimeFigureOut">
+            <a:fld id="{265ABC6D-62B8-444F-8CBB-55DA24843F08}" type="datetime1">
               <a:rPr lang="pt-PT" smtClean="0"/>
-              <a:t>27-01-2011</a:t>
+              <a:t>28-01-2011</a:t>
             </a:fld>
             <a:endParaRPr lang="pt-PT"/>
           </a:p>
@@ -495,6 +848,7 @@
           <a:p>
             <a:fld id="{AF2DD60D-AE1E-4B35-90D2-0ABAEDD7A6F5}" type="slidenum">
               <a:rPr lang="pt-PT" smtClean="0"/>
+              <a:pPr/>
               <a:t>‹#›</a:t>
             </a:fld>
             <a:endParaRPr lang="pt-PT"/>
@@ -626,9 +980,9 @@
           <a:bodyPr/>
           <a:lstStyle/>
           <a:p>
-            <a:fld id="{822145EC-93BD-4CB0-9C81-4533A20264B1}" type="datetimeFigureOut">
+            <a:fld id="{642BB447-BC74-408D-87E2-151F2C4E6D5C}" type="datetime1">
               <a:rPr lang="pt-PT" smtClean="0"/>
-              <a:t>27-01-2011</a:t>
+              <a:t>28-01-2011</a:t>
             </a:fld>
             <a:endParaRPr lang="pt-PT"/>
           </a:p>
@@ -670,6 +1024,7 @@
           <a:p>
             <a:fld id="{AF2DD60D-AE1E-4B35-90D2-0ABAEDD7A6F5}" type="slidenum">
               <a:rPr lang="pt-PT" smtClean="0"/>
+              <a:pPr/>
               <a:t>‹#›</a:t>
             </a:fld>
             <a:endParaRPr lang="pt-PT"/>
@@ -791,9 +1146,9 @@
           <a:bodyPr/>
           <a:lstStyle/>
           <a:p>
-            <a:fld id="{822145EC-93BD-4CB0-9C81-4533A20264B1}" type="datetimeFigureOut">
+            <a:fld id="{1AE16238-79D5-4CE1-9F7C-9EB0DB09B684}" type="datetime1">
               <a:rPr lang="pt-PT" smtClean="0"/>
-              <a:t>27-01-2011</a:t>
+              <a:t>28-01-2011</a:t>
             </a:fld>
             <a:endParaRPr lang="pt-PT"/>
           </a:p>
@@ -831,13 +1186,18 @@
         <p:spPr/>
         <p:txBody>
           <a:bodyPr/>
-          <a:lstStyle/>
+          <a:lstStyle>
+            <a:lvl1pPr>
+              <a:defRPr sz="1400"/>
+            </a:lvl1pPr>
+          </a:lstStyle>
           <a:p>
             <a:fld id="{AF2DD60D-AE1E-4B35-90D2-0ABAEDD7A6F5}" type="slidenum">
               <a:rPr lang="pt-PT" smtClean="0"/>
+              <a:pPr/>
               <a:t>‹#›</a:t>
             </a:fld>
-            <a:endParaRPr lang="pt-PT"/>
+            <a:endParaRPr lang="pt-PT" dirty="0"/>
           </a:p>
         </p:txBody>
       </p:sp>
@@ -1032,9 +1392,9 @@
           <a:bodyPr/>
           <a:lstStyle/>
           <a:p>
-            <a:fld id="{822145EC-93BD-4CB0-9C81-4533A20264B1}" type="datetimeFigureOut">
+            <a:fld id="{29EC9118-B484-4893-9D08-9848F3CE7FF2}" type="datetime1">
               <a:rPr lang="pt-PT" smtClean="0"/>
-              <a:t>27-01-2011</a:t>
+              <a:t>28-01-2011</a:t>
             </a:fld>
             <a:endParaRPr lang="pt-PT"/>
           </a:p>
@@ -1076,6 +1436,7 @@
           <a:p>
             <a:fld id="{AF2DD60D-AE1E-4B35-90D2-0ABAEDD7A6F5}" type="slidenum">
               <a:rPr lang="pt-PT" smtClean="0"/>
+              <a:pPr/>
               <a:t>‹#›</a:t>
             </a:fld>
             <a:endParaRPr lang="pt-PT"/>
@@ -1315,9 +1676,9 @@
           <a:bodyPr/>
           <a:lstStyle/>
           <a:p>
-            <a:fld id="{822145EC-93BD-4CB0-9C81-4533A20264B1}" type="datetimeFigureOut">
+            <a:fld id="{93295FF2-CB18-49BE-8735-588EA2A78858}" type="datetime1">
               <a:rPr lang="pt-PT" smtClean="0"/>
-              <a:t>27-01-2011</a:t>
+              <a:t>28-01-2011</a:t>
             </a:fld>
             <a:endParaRPr lang="pt-PT"/>
           </a:p>
@@ -1359,6 +1720,7 @@
           <a:p>
             <a:fld id="{AF2DD60D-AE1E-4B35-90D2-0ABAEDD7A6F5}" type="slidenum">
               <a:rPr lang="pt-PT" smtClean="0"/>
+              <a:pPr/>
               <a:t>‹#›</a:t>
             </a:fld>
             <a:endParaRPr lang="pt-PT"/>
@@ -1732,9 +2094,9 @@
           <a:bodyPr/>
           <a:lstStyle/>
           <a:p>
-            <a:fld id="{822145EC-93BD-4CB0-9C81-4533A20264B1}" type="datetimeFigureOut">
+            <a:fld id="{50896DA6-8084-488D-9E6B-45E32377C613}" type="datetime1">
               <a:rPr lang="pt-PT" smtClean="0"/>
-              <a:t>27-01-2011</a:t>
+              <a:t>28-01-2011</a:t>
             </a:fld>
             <a:endParaRPr lang="pt-PT"/>
           </a:p>
@@ -1776,6 +2138,7 @@
           <a:p>
             <a:fld id="{AF2DD60D-AE1E-4B35-90D2-0ABAEDD7A6F5}" type="slidenum">
               <a:rPr lang="pt-PT" smtClean="0"/>
+              <a:pPr/>
               <a:t>‹#›</a:t>
             </a:fld>
             <a:endParaRPr lang="pt-PT"/>
@@ -1845,9 +2208,9 @@
           <a:bodyPr/>
           <a:lstStyle/>
           <a:p>
-            <a:fld id="{822145EC-93BD-4CB0-9C81-4533A20264B1}" type="datetimeFigureOut">
+            <a:fld id="{40926C83-C8D3-48F0-B08F-F8259B57109C}" type="datetime1">
               <a:rPr lang="pt-PT" smtClean="0"/>
-              <a:t>27-01-2011</a:t>
+              <a:t>28-01-2011</a:t>
             </a:fld>
             <a:endParaRPr lang="pt-PT"/>
           </a:p>
@@ -1889,6 +2252,7 @@
           <a:p>
             <a:fld id="{AF2DD60D-AE1E-4B35-90D2-0ABAEDD7A6F5}" type="slidenum">
               <a:rPr lang="pt-PT" smtClean="0"/>
+              <a:pPr/>
               <a:t>‹#›</a:t>
             </a:fld>
             <a:endParaRPr lang="pt-PT"/>
@@ -1935,9 +2299,9 @@
           <a:bodyPr/>
           <a:lstStyle/>
           <a:p>
-            <a:fld id="{822145EC-93BD-4CB0-9C81-4533A20264B1}" type="datetimeFigureOut">
+            <a:fld id="{379D2EB6-009D-45E0-886C-0BF1B142AD62}" type="datetime1">
               <a:rPr lang="pt-PT" smtClean="0"/>
-              <a:t>27-01-2011</a:t>
+              <a:t>28-01-2011</a:t>
             </a:fld>
             <a:endParaRPr lang="pt-PT"/>
           </a:p>
@@ -1979,6 +2343,7 @@
           <a:p>
             <a:fld id="{AF2DD60D-AE1E-4B35-90D2-0ABAEDD7A6F5}" type="slidenum">
               <a:rPr lang="pt-PT" smtClean="0"/>
+              <a:pPr/>
               <a:t>‹#›</a:t>
             </a:fld>
             <a:endParaRPr lang="pt-PT"/>
@@ -2207,9 +2572,9 @@
           <a:bodyPr/>
           <a:lstStyle/>
           <a:p>
-            <a:fld id="{822145EC-93BD-4CB0-9C81-4533A20264B1}" type="datetimeFigureOut">
+            <a:fld id="{D9720365-511F-43DE-9BF0-D286DA1D7131}" type="datetime1">
               <a:rPr lang="pt-PT" smtClean="0"/>
-              <a:t>27-01-2011</a:t>
+              <a:t>28-01-2011</a:t>
             </a:fld>
             <a:endParaRPr lang="pt-PT"/>
           </a:p>
@@ -2251,6 +2616,7 @@
           <a:p>
             <a:fld id="{AF2DD60D-AE1E-4B35-90D2-0ABAEDD7A6F5}" type="slidenum">
               <a:rPr lang="pt-PT" smtClean="0"/>
+              <a:pPr/>
               <a:t>‹#›</a:t>
             </a:fld>
             <a:endParaRPr lang="pt-PT"/>
@@ -2455,9 +2821,9 @@
           <a:bodyPr/>
           <a:lstStyle/>
           <a:p>
-            <a:fld id="{822145EC-93BD-4CB0-9C81-4533A20264B1}" type="datetimeFigureOut">
+            <a:fld id="{E9DCFC39-BBD6-4CEF-9802-34CE70E119D6}" type="datetime1">
               <a:rPr lang="pt-PT" smtClean="0"/>
-              <a:t>27-01-2011</a:t>
+              <a:t>28-01-2011</a:t>
             </a:fld>
             <a:endParaRPr lang="pt-PT"/>
           </a:p>
@@ -2499,6 +2865,7 @@
           <a:p>
             <a:fld id="{AF2DD60D-AE1E-4B35-90D2-0ABAEDD7A6F5}" type="slidenum">
               <a:rPr lang="pt-PT" smtClean="0"/>
+              <a:pPr/>
               <a:t>‹#›</a:t>
             </a:fld>
             <a:endParaRPr lang="pt-PT"/>
@@ -2663,9 +3030,9 @@
             </a:lvl1pPr>
           </a:lstStyle>
           <a:p>
-            <a:fld id="{822145EC-93BD-4CB0-9C81-4533A20264B1}" type="datetimeFigureOut">
+            <a:fld id="{D7EF8D5E-585F-4BE6-AEBD-62F6999D90C3}" type="datetime1">
               <a:rPr lang="pt-PT" smtClean="0"/>
-              <a:t>27-01-2011</a:t>
+              <a:t>28-01-2011</a:t>
             </a:fld>
             <a:endParaRPr lang="pt-PT"/>
           </a:p>
@@ -2720,12 +3087,17 @@
         </p:nvSpPr>
         <p:spPr>
           <a:xfrm>
-            <a:off x="6553200" y="6356350"/>
-            <a:ext cx="2133600" cy="365125"/>
+            <a:off x="8244408" y="6381328"/>
+            <a:ext cx="899592" cy="365125"/>
           </a:xfrm>
           <a:prstGeom prst="rect">
             <a:avLst/>
           </a:prstGeom>
+          <a:solidFill>
+            <a:schemeClr val="tx1">
+              <a:alpha val="90000"/>
+            </a:schemeClr>
+          </a:solidFill>
         </p:spPr>
         <p:txBody>
           <a:bodyPr vert="horz" lIns="91440" tIns="45720" rIns="91440" bIns="45720" rtlCol="0" anchor="ctr"/>
@@ -2733,16 +3105,16 @@
             <a:lvl1pPr algn="r">
               <a:defRPr sz="1200">
                 <a:solidFill>
-                  <a:schemeClr val="tx1">
-                    <a:tint val="75000"/>
-                  </a:schemeClr>
+                  <a:schemeClr val="bg1"/>
                 </a:solidFill>
+                <a:latin typeface="League Gothic" pitchFamily="50" charset="0"/>
               </a:defRPr>
             </a:lvl1pPr>
           </a:lstStyle>
           <a:p>
             <a:fld id="{AF2DD60D-AE1E-4B35-90D2-0ABAEDD7A6F5}" type="slidenum">
               <a:rPr lang="pt-PT" smtClean="0"/>
+              <a:pPr/>
               <a:t>‹#›</a:t>
             </a:fld>
             <a:endParaRPr lang="pt-PT"/>
@@ -2765,6 +3137,7 @@
     <p:sldLayoutId id="2147483658" r:id="rId10"/>
     <p:sldLayoutId id="2147483659" r:id="rId11"/>
   </p:sldLayoutIdLst>
+  <p:hf hdr="0" ftr="0" dt="0"/>
   <p:txStyles>
     <p:titleStyle>
       <a:lvl1pPr algn="ctr" defTabSz="914400" rtl="0" eaLnBrk="1" latinLnBrk="0" hangingPunct="1">
@@ -3035,6 +3408,32 @@
           <a:chExt cx="0" cy="0"/>
         </a:xfrm>
       </p:grpSpPr>
+      <p:pic>
+        <p:nvPicPr>
+          <p:cNvPr id="1026" name="Picture 2" descr="C:\Users\jgradim\Documents\thesis\presentations\building_framework_grayscale.jpg"/>
+          <p:cNvPicPr>
+            <a:picLocks noChangeAspect="1" noChangeArrowheads="1"/>
+          </p:cNvPicPr>
+          <p:nvPr/>
+        </p:nvPicPr>
+        <p:blipFill>
+          <a:blip r:embed="rId2" cstate="print"/>
+          <a:srcRect/>
+          <a:stretch>
+            <a:fillRect/>
+          </a:stretch>
+        </p:blipFill>
+        <p:spPr bwMode="auto">
+          <a:xfrm>
+            <a:off x="1" y="1"/>
+            <a:ext cx="9144001" cy="6858000"/>
+          </a:xfrm>
+          <a:prstGeom prst="rect">
+            <a:avLst/>
+          </a:prstGeom>
+          <a:noFill/>
+        </p:spPr>
+      </p:pic>
       <p:sp>
         <p:nvSpPr>
           <p:cNvPr id="2" name="Title 1"/>
@@ -3047,7 +3446,7 @@
         </p:nvSpPr>
         <p:spPr>
           <a:xfrm>
-            <a:off x="0" y="1124744"/>
+            <a:off x="0" y="980728"/>
             <a:ext cx="9144000" cy="2423268"/>
           </a:xfrm>
           <a:solidFill>
@@ -3097,16 +3496,118 @@
           </a:p>
         </p:txBody>
       </p:sp>
-      <p:sp>
-        <p:nvSpPr>
-          <p:cNvPr id="4" name="TextBox 3"/>
+      <p:grpSp>
+        <p:nvGrpSpPr>
+          <p:cNvPr id="10" name="Group 9"/>
+          <p:cNvGrpSpPr/>
+          <p:nvPr/>
+        </p:nvGrpSpPr>
+        <p:grpSpPr>
+          <a:xfrm>
+            <a:off x="2043" y="6381328"/>
+            <a:ext cx="9144000" cy="364803"/>
+            <a:chOff x="0" y="6492519"/>
+            <a:chExt cx="9144000" cy="116173"/>
+          </a:xfrm>
+        </p:grpSpPr>
+        <p:sp>
+          <p:nvSpPr>
+            <p:cNvPr id="7" name="TextBox 6"/>
+            <p:cNvSpPr txBox="1"/>
+            <p:nvPr/>
+          </p:nvSpPr>
+          <p:spPr>
+            <a:xfrm>
+              <a:off x="0" y="6492519"/>
+              <a:ext cx="9144000" cy="116173"/>
+            </a:xfrm>
+            <a:prstGeom prst="rect">
+              <a:avLst/>
+            </a:prstGeom>
+            <a:solidFill>
+              <a:schemeClr val="tx1">
+                <a:alpha val="90000"/>
+              </a:schemeClr>
+            </a:solidFill>
+          </p:spPr>
+          <p:txBody>
+            <a:bodyPr wrap="square" lIns="144000" rtlCol="0" anchor="ctr">
+              <a:spAutoFit/>
+            </a:bodyPr>
+            <a:lstStyle/>
+            <a:p>
+              <a:r>
+                <a:rPr lang="pt-PT" sz="1600" dirty="0" smtClean="0">
+                  <a:solidFill>
+                    <a:schemeClr val="bg1"/>
+                  </a:solidFill>
+                  <a:latin typeface="Chaparral Pro Light" pitchFamily="18" charset="0"/>
+                  <a:cs typeface="Times New Roman" pitchFamily="18" charset="0"/>
+                </a:rPr>
+                <a:t>Faculdade de Engenharia da Universidade do Porto</a:t>
+              </a:r>
+              <a:endParaRPr lang="pt-PT" sz="1600" dirty="0">
+                <a:solidFill>
+                  <a:schemeClr val="bg1"/>
+                </a:solidFill>
+                <a:latin typeface="Chaparral Pro Light" pitchFamily="18" charset="0"/>
+                <a:cs typeface="Times New Roman" pitchFamily="18" charset="0"/>
+              </a:endParaRPr>
+            </a:p>
+          </p:txBody>
+        </p:sp>
+        <p:sp>
+          <p:nvSpPr>
+            <p:cNvPr id="8" name="TextBox 7"/>
+            <p:cNvSpPr txBox="1"/>
+            <p:nvPr/>
+          </p:nvSpPr>
+          <p:spPr>
+            <a:xfrm>
+              <a:off x="5148064" y="6492519"/>
+              <a:ext cx="3995936" cy="116173"/>
+            </a:xfrm>
+            <a:prstGeom prst="rect">
+              <a:avLst/>
+            </a:prstGeom>
+            <a:noFill/>
+          </p:spPr>
+          <p:txBody>
+            <a:bodyPr wrap="square" rIns="144000" rtlCol="0" anchor="ctr">
+              <a:spAutoFit/>
+            </a:bodyPr>
+            <a:lstStyle/>
+            <a:p>
+              <a:pPr algn="r"/>
+              <a:r>
+                <a:rPr lang="pt-PT" sz="1600" dirty="0" smtClean="0">
+                  <a:solidFill>
+                    <a:schemeClr val="bg1"/>
+                  </a:solidFill>
+                  <a:latin typeface="Chaparral Pro Light" pitchFamily="18" charset="0"/>
+                </a:rPr>
+                <a:t>February  11th, 2011</a:t>
+              </a:r>
+              <a:endParaRPr lang="pt-PT" sz="1600" dirty="0">
+                <a:solidFill>
+                  <a:schemeClr val="bg1"/>
+                </a:solidFill>
+                <a:latin typeface="Chaparral Pro Light" pitchFamily="18" charset="0"/>
+              </a:endParaRPr>
+            </a:p>
+          </p:txBody>
+        </p:sp>
+      </p:grpSp>
+      <p:sp>
+        <p:nvSpPr>
+          <p:cNvPr id="12" name="TextBox 11"/>
           <p:cNvSpPr txBox="1"/>
           <p:nvPr/>
         </p:nvSpPr>
         <p:spPr>
           <a:xfrm>
-            <a:off x="0" y="4179857"/>
-            <a:ext cx="4644008" cy="400110"/>
+            <a:off x="0" y="4221088"/>
+            <a:ext cx="5112568" cy="1246495"/>
           </a:xfrm>
           <a:prstGeom prst="rect">
             <a:avLst/>
@@ -3118,45 +3619,113 @@
           </a:solidFill>
         </p:spPr>
         <p:txBody>
-          <a:bodyPr wrap="square" rtlCol="0" anchor="ctr">
+          <a:bodyPr wrap="square" lIns="144000" rtlCol="0">
             <a:spAutoFit/>
           </a:bodyPr>
           <a:lstStyle/>
           <a:p>
-            <a:r>
-              <a:rPr lang="pt-PT" sz="2000" spc="-50" smtClean="0">
+            <a:pPr>
+              <a:lnSpc>
+                <a:spcPts val="3000"/>
+              </a:lnSpc>
+            </a:pPr>
+            <a:r>
+              <a:rPr lang="pt-PT" sz="2000" dirty="0" smtClean="0">
                 <a:solidFill>
                   <a:schemeClr val="bg1"/>
                 </a:solidFill>
-                <a:latin typeface="Georgia" pitchFamily="18" charset="0"/>
-                <a:cs typeface="Times New Roman" pitchFamily="18" charset="0"/>
+                <a:latin typeface="Chaparral Pro Light Capt" pitchFamily="18" charset="0"/>
               </a:rPr>
               <a:t>João Gradim</a:t>
             </a:r>
-            <a:endParaRPr lang="pt-PT" sz="2000" spc="-50" dirty="0">
+          </a:p>
+          <a:p>
+            <a:pPr>
+              <a:lnSpc>
+                <a:spcPts val="3000"/>
+              </a:lnSpc>
+            </a:pPr>
+            <a:r>
+              <a:rPr lang="pt-PT" sz="2000" dirty="0" smtClean="0">
+                <a:solidFill>
+                  <a:schemeClr val="bg1"/>
+                </a:solidFill>
+                <a:latin typeface="Chaparral Pro Light Capt" pitchFamily="18" charset="0"/>
+              </a:rPr>
+              <a:t>Supervisor: Ademar Aguiar (Ph.D.)</a:t>
+            </a:r>
+          </a:p>
+          <a:p>
+            <a:pPr>
+              <a:lnSpc>
+                <a:spcPts val="3000"/>
+              </a:lnSpc>
+            </a:pPr>
+            <a:r>
+              <a:rPr lang="pt-PT" sz="2000" dirty="0" smtClean="0">
+                <a:solidFill>
+                  <a:schemeClr val="bg1"/>
+                </a:solidFill>
+                <a:latin typeface="Chaparral Pro Light Capt" pitchFamily="18" charset="0"/>
+              </a:rPr>
+              <a:t>Supervisor: Hugo Ferreira (Ph.D. AbD)</a:t>
+            </a:r>
+            <a:endParaRPr lang="pt-PT" sz="2000" dirty="0">
               <a:solidFill>
                 <a:schemeClr val="bg1"/>
               </a:solidFill>
-              <a:latin typeface="Georgia" pitchFamily="18" charset="0"/>
-              <a:cs typeface="Times New Roman" pitchFamily="18" charset="0"/>
+              <a:latin typeface="Chaparral Pro Light Capt" pitchFamily="18" charset="0"/>
             </a:endParaRPr>
           </a:p>
         </p:txBody>
       </p:sp>
-      <p:sp>
-        <p:nvSpPr>
-          <p:cNvPr id="5" name="TextBox 4"/>
-          <p:cNvSpPr txBox="1"/>
-          <p:nvPr/>
+    </p:spTree>
+  </p:cSld>
+  <p:clrMapOvr>
+    <a:masterClrMapping/>
+  </p:clrMapOvr>
+  <p:timing>
+    <p:tnLst>
+      <p:par>
+        <p:cTn id="1" dur="indefinite" restart="never" nodeType="tmRoot"/>
+      </p:par>
+    </p:tnLst>
+  </p:timing>
+</p:sld>
+</file>
+
+<file path=ppt/slides/slide2.xml><?xml version="1.0" encoding="utf-8"?>
+<p:sld xmlns:a="http://schemas.openxmlformats.org/drawingml/2006/main" xmlns:r="http://schemas.openxmlformats.org/officeDocument/2006/relationships" xmlns:p="http://schemas.openxmlformats.org/presentationml/2006/main">
+  <p:cSld>
+    <p:spTree>
+      <p:nvGrpSpPr>
+        <p:cNvPr id="1" name=""/>
+        <p:cNvGrpSpPr/>
+        <p:nvPr/>
+      </p:nvGrpSpPr>
+      <p:grpSpPr>
+        <a:xfrm>
+          <a:off x="0" y="0"/>
+          <a:ext cx="0" cy="0"/>
+          <a:chOff x="0" y="0"/>
+          <a:chExt cx="0" cy="0"/>
+        </a:xfrm>
+      </p:grpSpPr>
+      <p:sp>
+        <p:nvSpPr>
+          <p:cNvPr id="2" name="Title 1"/>
+          <p:cNvSpPr>
+            <a:spLocks noGrp="1"/>
+          </p:cNvSpPr>
+          <p:nvPr>
+            <p:ph type="title"/>
+          </p:nvPr>
         </p:nvSpPr>
         <p:spPr>
           <a:xfrm>
-            <a:off x="0" y="4726304"/>
-            <a:ext cx="4644008" cy="400110"/>
+            <a:off x="0" y="2941730"/>
+            <a:ext cx="4644008" cy="974540"/>
           </a:xfrm>
-          <a:prstGeom prst="rect">
-            <a:avLst/>
-          </a:prstGeom>
           <a:solidFill>
             <a:schemeClr val="tx1">
               <a:alpha val="90000"/>
@@ -3164,120 +3733,145 @@
           </a:solidFill>
         </p:spPr>
         <p:txBody>
-          <a:bodyPr wrap="square" rtlCol="0" anchor="ctr">
-            <a:spAutoFit/>
+          <a:bodyPr lIns="360000">
+            <a:noAutofit/>
           </a:bodyPr>
           <a:lstStyle/>
           <a:p>
-            <a:r>
-              <a:rPr lang="pt-PT" sz="2000" spc="-50" smtClean="0">
+            <a:pPr algn="l"/>
+            <a:r>
+              <a:rPr lang="pt-PT" sz="5400" dirty="0" smtClean="0">
                 <a:solidFill>
                   <a:schemeClr val="bg1"/>
                 </a:solidFill>
-                <a:latin typeface="Georgia" pitchFamily="18" charset="0"/>
-                <a:cs typeface="Times New Roman" pitchFamily="18" charset="0"/>
+                <a:latin typeface="League Gothic" pitchFamily="50" charset="0"/>
               </a:rPr>
-              <a:t>Supervisor: Ademar Aguiar</a:t>
-            </a:r>
-            <a:endParaRPr lang="pt-PT" sz="2000" spc="-50" dirty="0">
+              <a:t>Introduction</a:t>
+            </a:r>
+            <a:endParaRPr lang="pt-PT" sz="5400" dirty="0">
               <a:solidFill>
                 <a:schemeClr val="bg1"/>
               </a:solidFill>
-              <a:latin typeface="Georgia" pitchFamily="18" charset="0"/>
-              <a:cs typeface="Times New Roman" pitchFamily="18" charset="0"/>
+              <a:latin typeface="League Gothic" pitchFamily="50" charset="0"/>
             </a:endParaRPr>
           </a:p>
         </p:txBody>
       </p:sp>
       <p:sp>
         <p:nvSpPr>
-          <p:cNvPr id="6" name="TextBox 5"/>
-          <p:cNvSpPr txBox="1"/>
-          <p:nvPr/>
-        </p:nvSpPr>
-        <p:spPr>
-          <a:xfrm>
-            <a:off x="0" y="5259977"/>
-            <a:ext cx="4644008" cy="400110"/>
-          </a:xfrm>
-          <a:prstGeom prst="rect">
-            <a:avLst/>
-          </a:prstGeom>
-          <a:solidFill>
-            <a:schemeClr val="tx1">
-              <a:alpha val="90000"/>
-            </a:schemeClr>
-          </a:solidFill>
-        </p:spPr>
-        <p:txBody>
-          <a:bodyPr wrap="square" rtlCol="0" anchor="ctr">
-            <a:spAutoFit/>
-          </a:bodyPr>
-          <a:lstStyle/>
-          <a:p>
-            <a:r>
-              <a:rPr lang="pt-PT" sz="2000" spc="-50" smtClean="0">
-                <a:solidFill>
-                  <a:schemeClr val="bg1"/>
-                </a:solidFill>
-                <a:latin typeface="Georgia" pitchFamily="18" charset="0"/>
-                <a:cs typeface="Times New Roman" pitchFamily="18" charset="0"/>
-              </a:rPr>
-              <a:t>Second Supervisor: Hugo Ferreira</a:t>
-            </a:r>
-            <a:endParaRPr lang="pt-PT" sz="2000" spc="-50" dirty="0">
-              <a:solidFill>
-                <a:schemeClr val="bg1"/>
-              </a:solidFill>
-              <a:latin typeface="Georgia" pitchFamily="18" charset="0"/>
-              <a:cs typeface="Times New Roman" pitchFamily="18" charset="0"/>
-            </a:endParaRPr>
-          </a:p>
-        </p:txBody>
-      </p:sp>
-      <p:sp>
-        <p:nvSpPr>
-          <p:cNvPr id="7" name="TextBox 6"/>
-          <p:cNvSpPr txBox="1"/>
-          <p:nvPr/>
-        </p:nvSpPr>
-        <p:spPr>
-          <a:xfrm>
-            <a:off x="0" y="6258798"/>
-            <a:ext cx="9144000" cy="338554"/>
-          </a:xfrm>
-          <a:prstGeom prst="rect">
-            <a:avLst/>
-          </a:prstGeom>
-          <a:solidFill>
-            <a:schemeClr val="tx1">
-              <a:alpha val="90000"/>
-            </a:schemeClr>
-          </a:solidFill>
-        </p:spPr>
-        <p:txBody>
-          <a:bodyPr wrap="square" rtlCol="0" anchor="ctr">
-            <a:spAutoFit/>
-          </a:bodyPr>
-          <a:lstStyle/>
-          <a:p>
-            <a:r>
-              <a:rPr lang="pt-PT" sz="1600" spc="-50" dirty="0" smtClean="0">
-                <a:solidFill>
-                  <a:schemeClr val="bg1"/>
-                </a:solidFill>
-                <a:latin typeface="Georgia" pitchFamily="18" charset="0"/>
-                <a:cs typeface="Times New Roman" pitchFamily="18" charset="0"/>
-              </a:rPr>
-              <a:t>Faculdade de Engenharia da Universidade do Porto</a:t>
-            </a:r>
-            <a:endParaRPr lang="pt-PT" sz="1600" spc="-50" dirty="0">
-              <a:solidFill>
-                <a:schemeClr val="bg1"/>
-              </a:solidFill>
-              <a:latin typeface="Georgia" pitchFamily="18" charset="0"/>
-              <a:cs typeface="Times New Roman" pitchFamily="18" charset="0"/>
-            </a:endParaRPr>
+          <p:cNvPr id="5" name="Slide Number Placeholder 4"/>
+          <p:cNvSpPr>
+            <a:spLocks noGrp="1"/>
+          </p:cNvSpPr>
+          <p:nvPr>
+            <p:ph type="sldNum" sz="quarter" idx="12"/>
+          </p:nvPr>
+        </p:nvSpPr>
+        <p:spPr/>
+        <p:txBody>
+          <a:bodyPr/>
+          <a:lstStyle/>
+          <a:p>
+            <a:fld id="{AF2DD60D-AE1E-4B35-90D2-0ABAEDD7A6F5}" type="slidenum">
+              <a:rPr lang="pt-PT" smtClean="0"/>
+              <a:pPr/>
+              <a:t>2</a:t>
+            </a:fld>
+            <a:endParaRPr lang="pt-PT" dirty="0"/>
+          </a:p>
+        </p:txBody>
+      </p:sp>
+    </p:spTree>
+  </p:cSld>
+  <p:clrMapOvr>
+    <a:masterClrMapping/>
+  </p:clrMapOvr>
+  <p:timing>
+    <p:tnLst>
+      <p:par>
+        <p:cTn id="1" dur="indefinite" restart="never" nodeType="tmRoot"/>
+      </p:par>
+    </p:tnLst>
+  </p:timing>
+</p:sld>
+</file>
+
+<file path=ppt/slides/slide3.xml><?xml version="1.0" encoding="utf-8"?>
+<p:sld xmlns:a="http://schemas.openxmlformats.org/drawingml/2006/main" xmlns:r="http://schemas.openxmlformats.org/officeDocument/2006/relationships" xmlns:p="http://schemas.openxmlformats.org/presentationml/2006/main">
+  <p:cSld>
+    <p:spTree>
+      <p:nvGrpSpPr>
+        <p:cNvPr id="1" name=""/>
+        <p:cNvGrpSpPr/>
+        <p:nvPr/>
+      </p:nvGrpSpPr>
+      <p:grpSpPr>
+        <a:xfrm>
+          <a:off x="0" y="0"/>
+          <a:ext cx="0" cy="0"/>
+          <a:chOff x="0" y="0"/>
+          <a:chExt cx="0" cy="0"/>
+        </a:xfrm>
+      </p:grpSpPr>
+      <p:sp>
+        <p:nvSpPr>
+          <p:cNvPr id="2" name="Title 1"/>
+          <p:cNvSpPr>
+            <a:spLocks noGrp="1"/>
+          </p:cNvSpPr>
+          <p:nvPr>
+            <p:ph type="title"/>
+          </p:nvPr>
+        </p:nvSpPr>
+        <p:spPr/>
+        <p:txBody>
+          <a:bodyPr/>
+          <a:lstStyle/>
+          <a:p>
+            <a:endParaRPr lang="pt-PT"/>
+          </a:p>
+        </p:txBody>
+      </p:sp>
+      <p:sp>
+        <p:nvSpPr>
+          <p:cNvPr id="3" name="Content Placeholder 2"/>
+          <p:cNvSpPr>
+            <a:spLocks noGrp="1"/>
+          </p:cNvSpPr>
+          <p:nvPr>
+            <p:ph idx="1"/>
+          </p:nvPr>
+        </p:nvSpPr>
+        <p:spPr/>
+        <p:txBody>
+          <a:bodyPr/>
+          <a:lstStyle/>
+          <a:p>
+            <a:endParaRPr lang="pt-PT"/>
+          </a:p>
+        </p:txBody>
+      </p:sp>
+      <p:sp>
+        <p:nvSpPr>
+          <p:cNvPr id="4" name="Slide Number Placeholder 3"/>
+          <p:cNvSpPr>
+            <a:spLocks noGrp="1"/>
+          </p:cNvSpPr>
+          <p:nvPr>
+            <p:ph type="sldNum" sz="quarter" idx="12"/>
+          </p:nvPr>
+        </p:nvSpPr>
+        <p:spPr/>
+        <p:txBody>
+          <a:bodyPr/>
+          <a:lstStyle/>
+          <a:p>
+            <a:fld id="{AF2DD60D-AE1E-4B35-90D2-0ABAEDD7A6F5}" type="slidenum">
+              <a:rPr lang="pt-PT" smtClean="0"/>
+              <a:pPr/>
+              <a:t>3</a:t>
+            </a:fld>
+            <a:endParaRPr lang="pt-PT" dirty="0"/>
           </a:p>
         </p:txBody>
       </p:sp>
@@ -3577,4 +4171,287 @@
   <a:objectDefaults/>
   <a:extraClrSchemeLst/>
 </a:theme>
+</file>
+
+<file path=ppt/theme/theme2.xml><?xml version="1.0" encoding="utf-8"?>
+<a:theme xmlns:a="http://schemas.openxmlformats.org/drawingml/2006/main" name="Office Theme">
+  <a:themeElements>
+    <a:clrScheme name="Office">
+      <a:dk1>
+        <a:sysClr val="windowText" lastClr="000000"/>
+      </a:dk1>
+      <a:lt1>
+        <a:sysClr val="window" lastClr="FFFFFF"/>
+      </a:lt1>
+      <a:dk2>
+        <a:srgbClr val="1F497D"/>
+      </a:dk2>
+      <a:lt2>
+        <a:srgbClr val="EEECE1"/>
+      </a:lt2>
+      <a:accent1>
+        <a:srgbClr val="4F81BD"/>
+      </a:accent1>
+      <a:accent2>
+        <a:srgbClr val="C0504D"/>
+      </a:accent2>
+      <a:accent3>
+        <a:srgbClr val="9BBB59"/>
+      </a:accent3>
+      <a:accent4>
+        <a:srgbClr val="8064A2"/>
+      </a:accent4>
+      <a:accent5>
+        <a:srgbClr val="4BACC6"/>
+      </a:accent5>
+      <a:accent6>
+        <a:srgbClr val="F79646"/>
+      </a:accent6>
+      <a:hlink>
+        <a:srgbClr val="0000FF"/>
+      </a:hlink>
+      <a:folHlink>
+        <a:srgbClr val="800080"/>
+      </a:folHlink>
+    </a:clrScheme>
+    <a:fontScheme name="Office">
+      <a:majorFont>
+        <a:latin typeface="Calibri"/>
+        <a:ea typeface=""/>
+        <a:cs typeface=""/>
+        <a:font script="Jpan" typeface="ＭＳ Ｐゴシック"/>
+        <a:font script="Hang" typeface="맑은 고딕"/>
+        <a:font script="Hans" typeface="宋体"/>
+        <a:font script="Hant" typeface="新細明體"/>
+        <a:font script="Arab" typeface="Times New Roman"/>
+        <a:font script="Hebr" typeface="Times New Roman"/>
+        <a:font script="Thai" typeface="Angsana New"/>
+        <a:font script="Ethi" typeface="Nyala"/>
+        <a:font script="Beng" typeface="Vrinda"/>
+        <a:font script="Gujr" typeface="Shruti"/>
+        <a:font script="Khmr" typeface="MoolBoran"/>
+        <a:font script="Knda" typeface="Tunga"/>
+        <a:font script="Guru" typeface="Raavi"/>
+        <a:font script="Cans" typeface="Euphemia"/>
+        <a:font script="Cher" typeface="Plantagenet Cherokee"/>
+        <a:font script="Yiii" typeface="Microsoft Yi Baiti"/>
+        <a:font script="Tibt" typeface="Microsoft Himalaya"/>
+        <a:font script="Thaa" typeface="MV Boli"/>
+        <a:font script="Deva" typeface="Mangal"/>
+        <a:font script="Telu" typeface="Gautami"/>
+        <a:font script="Taml" typeface="Latha"/>
+        <a:font script="Syrc" typeface="Estrangelo Edessa"/>
+        <a:font script="Orya" typeface="Kalinga"/>
+        <a:font script="Mlym" typeface="Kartika"/>
+        <a:font script="Laoo" typeface="DokChampa"/>
+        <a:font script="Sinh" typeface="Iskoola Pota"/>
+        <a:font script="Mong" typeface="Mongolian Baiti"/>
+        <a:font script="Viet" typeface="Times New Roman"/>
+        <a:font script="Uigh" typeface="Microsoft Uighur"/>
+      </a:majorFont>
+      <a:minorFont>
+        <a:latin typeface="Calibri"/>
+        <a:ea typeface=""/>
+        <a:cs typeface=""/>
+        <a:font script="Jpan" typeface="ＭＳ Ｐゴシック"/>
+        <a:font script="Hang" typeface="맑은 고딕"/>
+        <a:font script="Hans" typeface="宋体"/>
+        <a:font script="Hant" typeface="新細明體"/>
+        <a:font script="Arab" typeface="Arial"/>
+        <a:font script="Hebr" typeface="Arial"/>
+        <a:font script="Thai" typeface="Cordia New"/>
+        <a:font script="Ethi" typeface="Nyala"/>
+        <a:font script="Beng" typeface="Vrinda"/>
+        <a:font script="Gujr" typeface="Shruti"/>
+        <a:font script="Khmr" typeface="DaunPenh"/>
+        <a:font script="Knda" typeface="Tunga"/>
+        <a:font script="Guru" typeface="Raavi"/>
+        <a:font script="Cans" typeface="Euphemia"/>
+        <a:font script="Cher" typeface="Plantagenet Cherokee"/>
+        <a:font script="Yiii" typeface="Microsoft Yi Baiti"/>
+        <a:font script="Tibt" typeface="Microsoft Himalaya"/>
+        <a:font script="Thaa" typeface="MV Boli"/>
+        <a:font script="Deva" typeface="Mangal"/>
+        <a:font script="Telu" typeface="Gautami"/>
+        <a:font script="Taml" typeface="Latha"/>
+        <a:font script="Syrc" typeface="Estrangelo Edessa"/>
+        <a:font script="Orya" typeface="Kalinga"/>
+        <a:font script="Mlym" typeface="Kartika"/>
+        <a:font script="Laoo" typeface="DokChampa"/>
+        <a:font script="Sinh" typeface="Iskoola Pota"/>
+        <a:font script="Mong" typeface="Mongolian Baiti"/>
+        <a:font script="Viet" typeface="Arial"/>
+        <a:font script="Uigh" typeface="Microsoft Uighur"/>
+      </a:minorFont>
+    </a:fontScheme>
+    <a:fmtScheme name="Office">
+      <a:fillStyleLst>
+        <a:solidFill>
+          <a:schemeClr val="phClr"/>
+        </a:solidFill>
+        <a:gradFill rotWithShape="1">
+          <a:gsLst>
+            <a:gs pos="0">
+              <a:schemeClr val="phClr">
+                <a:tint val="50000"/>
+                <a:satMod val="300000"/>
+              </a:schemeClr>
+            </a:gs>
+            <a:gs pos="35000">
+              <a:schemeClr val="phClr">
+                <a:tint val="37000"/>
+                <a:satMod val="300000"/>
+              </a:schemeClr>
+            </a:gs>
+            <a:gs pos="100000">
+              <a:schemeClr val="phClr">
+                <a:tint val="15000"/>
+                <a:satMod val="350000"/>
+              </a:schemeClr>
+            </a:gs>
+          </a:gsLst>
+          <a:lin ang="16200000" scaled="1"/>
+        </a:gradFill>
+        <a:gradFill rotWithShape="1">
+          <a:gsLst>
+            <a:gs pos="0">
+              <a:schemeClr val="phClr">
+                <a:shade val="51000"/>
+                <a:satMod val="130000"/>
+              </a:schemeClr>
+            </a:gs>
+            <a:gs pos="80000">
+              <a:schemeClr val="phClr">
+                <a:shade val="93000"/>
+                <a:satMod val="130000"/>
+              </a:schemeClr>
+            </a:gs>
+            <a:gs pos="100000">
+              <a:schemeClr val="phClr">
+                <a:shade val="94000"/>
+                <a:satMod val="135000"/>
+              </a:schemeClr>
+            </a:gs>
+          </a:gsLst>
+          <a:lin ang="16200000" scaled="0"/>
+        </a:gradFill>
+      </a:fillStyleLst>
+      <a:lnStyleLst>
+        <a:ln w="9525" cap="flat" cmpd="sng" algn="ctr">
+          <a:solidFill>
+            <a:schemeClr val="phClr">
+              <a:shade val="95000"/>
+              <a:satMod val="105000"/>
+            </a:schemeClr>
+          </a:solidFill>
+          <a:prstDash val="solid"/>
+        </a:ln>
+        <a:ln w="25400" cap="flat" cmpd="sng" algn="ctr">
+          <a:solidFill>
+            <a:schemeClr val="phClr"/>
+          </a:solidFill>
+          <a:prstDash val="solid"/>
+        </a:ln>
+        <a:ln w="38100" cap="flat" cmpd="sng" algn="ctr">
+          <a:solidFill>
+            <a:schemeClr val="phClr"/>
+          </a:solidFill>
+          <a:prstDash val="solid"/>
+        </a:ln>
+      </a:lnStyleLst>
+      <a:effectStyleLst>
+        <a:effectStyle>
+          <a:effectLst>
+            <a:outerShdw blurRad="40000" dist="20000" dir="5400000" rotWithShape="0">
+              <a:srgbClr val="000000">
+                <a:alpha val="38000"/>
+              </a:srgbClr>
+            </a:outerShdw>
+          </a:effectLst>
+        </a:effectStyle>
+        <a:effectStyle>
+          <a:effectLst>
+            <a:outerShdw blurRad="40000" dist="23000" dir="5400000" rotWithShape="0">
+              <a:srgbClr val="000000">
+                <a:alpha val="35000"/>
+              </a:srgbClr>
+            </a:outerShdw>
+          </a:effectLst>
+        </a:effectStyle>
+        <a:effectStyle>
+          <a:effectLst>
+            <a:outerShdw blurRad="40000" dist="23000" dir="5400000" rotWithShape="0">
+              <a:srgbClr val="000000">
+                <a:alpha val="35000"/>
+              </a:srgbClr>
+            </a:outerShdw>
+          </a:effectLst>
+          <a:scene3d>
+            <a:camera prst="orthographicFront">
+              <a:rot lat="0" lon="0" rev="0"/>
+            </a:camera>
+            <a:lightRig rig="threePt" dir="t">
+              <a:rot lat="0" lon="0" rev="1200000"/>
+            </a:lightRig>
+          </a:scene3d>
+          <a:sp3d>
+            <a:bevelT w="63500" h="25400"/>
+          </a:sp3d>
+        </a:effectStyle>
+      </a:effectStyleLst>
+      <a:bgFillStyleLst>
+        <a:solidFill>
+          <a:schemeClr val="phClr"/>
+        </a:solidFill>
+        <a:gradFill rotWithShape="1">
+          <a:gsLst>
+            <a:gs pos="0">
+              <a:schemeClr val="phClr">
+                <a:tint val="40000"/>
+                <a:satMod val="350000"/>
+              </a:schemeClr>
+            </a:gs>
+            <a:gs pos="40000">
+              <a:schemeClr val="phClr">
+                <a:tint val="45000"/>
+                <a:shade val="99000"/>
+                <a:satMod val="350000"/>
+              </a:schemeClr>
+            </a:gs>
+            <a:gs pos="100000">
+              <a:schemeClr val="phClr">
+                <a:shade val="20000"/>
+                <a:satMod val="255000"/>
+              </a:schemeClr>
+            </a:gs>
+          </a:gsLst>
+          <a:path path="circle">
+            <a:fillToRect l="50000" t="-80000" r="50000" b="180000"/>
+          </a:path>
+        </a:gradFill>
+        <a:gradFill rotWithShape="1">
+          <a:gsLst>
+            <a:gs pos="0">
+              <a:schemeClr val="phClr">
+                <a:tint val="80000"/>
+                <a:satMod val="300000"/>
+              </a:schemeClr>
+            </a:gs>
+            <a:gs pos="100000">
+              <a:schemeClr val="phClr">
+                <a:shade val="30000"/>
+                <a:satMod val="200000"/>
+              </a:schemeClr>
+            </a:gs>
+          </a:gsLst>
+          <a:path path="circle">
+            <a:fillToRect l="50000" t="50000" r="50000" b="50000"/>
+          </a:path>
+        </a:gradFill>
+      </a:bgFillStyleLst>
+    </a:fmtScheme>
+  </a:themeElements>
+  <a:objectDefaults/>
+  <a:extraClrSchemeLst/>
+</a:theme>
 </file>
</xml_diff>

<commit_message>
Changed copy font to FF Meta Serif
</commit_message>
<xml_diff>
--- a/presentations/thesis.pptx
+++ b/presentations/thesis.pptx
@@ -194,6 +194,7 @@
           <a:p>
             <a:fld id="{A4A9652A-D4BF-41F5-B3CF-F03C6BFD8852}" type="datetimeFigureOut">
               <a:rPr lang="pt-PT" smtClean="0"/>
+              <a:pPr/>
               <a:t>28-01-2011</a:t>
             </a:fld>
             <a:endParaRPr lang="pt-PT"/>
@@ -355,6 +356,7 @@
           <a:p>
             <a:fld id="{EE5867BE-386C-4D16-9B1D-8635FC172DF2}" type="slidenum">
               <a:rPr lang="pt-PT" smtClean="0"/>
+              <a:pPr/>
               <a:t>‹#›</a:t>
             </a:fld>
             <a:endParaRPr lang="pt-PT"/>
@@ -640,6 +642,7 @@
           <a:p>
             <a:fld id="{B21DA5EC-CDBD-4BE5-AFEC-D05D842E9DCA}" type="datetime1">
               <a:rPr lang="pt-PT" smtClean="0"/>
+              <a:pPr/>
               <a:t>28-01-2011</a:t>
             </a:fld>
             <a:endParaRPr lang="pt-PT"/>
@@ -806,6 +809,7 @@
           <a:p>
             <a:fld id="{265ABC6D-62B8-444F-8CBB-55DA24843F08}" type="datetime1">
               <a:rPr lang="pt-PT" smtClean="0"/>
+              <a:pPr/>
               <a:t>28-01-2011</a:t>
             </a:fld>
             <a:endParaRPr lang="pt-PT"/>
@@ -982,6 +986,7 @@
           <a:p>
             <a:fld id="{642BB447-BC74-408D-87E2-151F2C4E6D5C}" type="datetime1">
               <a:rPr lang="pt-PT" smtClean="0"/>
+              <a:pPr/>
               <a:t>28-01-2011</a:t>
             </a:fld>
             <a:endParaRPr lang="pt-PT"/>
@@ -1089,45 +1094,98 @@
             <p:ph idx="1"/>
           </p:nvPr>
         </p:nvSpPr>
-        <p:spPr/>
-        <p:txBody>
-          <a:bodyPr/>
-          <a:lstStyle/>
+        <p:spPr>
+          <a:noFill/>
+        </p:spPr>
+        <p:txBody>
+          <a:bodyPr/>
+          <a:lstStyle>
+            <a:lvl1pPr>
+              <a:buClr>
+                <a:schemeClr val="bg1">
+                  <a:lumMod val="65000"/>
+                </a:schemeClr>
+              </a:buClr>
+              <a:buFont typeface="Arial" pitchFamily="34" charset="0"/>
+              <a:buChar char="•"/>
+              <a:defRPr/>
+            </a:lvl1pPr>
+            <a:lvl2pPr>
+              <a:buClr>
+                <a:schemeClr val="bg1">
+                  <a:lumMod val="65000"/>
+                </a:schemeClr>
+              </a:buClr>
+              <a:buFont typeface="Arial" pitchFamily="34" charset="0"/>
+              <a:buChar char="•"/>
+              <a:defRPr/>
+            </a:lvl2pPr>
+            <a:lvl3pPr>
+              <a:buClr>
+                <a:schemeClr val="bg1">
+                  <a:lumMod val="65000"/>
+                </a:schemeClr>
+              </a:buClr>
+              <a:buFont typeface="Arial" pitchFamily="34" charset="0"/>
+              <a:buChar char="•"/>
+              <a:defRPr/>
+            </a:lvl3pPr>
+            <a:lvl4pPr>
+              <a:buClr>
+                <a:schemeClr val="bg1">
+                  <a:lumMod val="65000"/>
+                </a:schemeClr>
+              </a:buClr>
+              <a:buFont typeface="Arial" pitchFamily="34" charset="0"/>
+              <a:buChar char="•"/>
+              <a:defRPr/>
+            </a:lvl4pPr>
+            <a:lvl5pPr>
+              <a:buClr>
+                <a:schemeClr val="bg1">
+                  <a:lumMod val="65000"/>
+                </a:schemeClr>
+              </a:buClr>
+              <a:buFont typeface="Arial" pitchFamily="34" charset="0"/>
+              <a:buChar char="•"/>
+              <a:defRPr/>
+            </a:lvl5pPr>
+          </a:lstStyle>
           <a:p>
             <a:pPr lvl="0"/>
             <a:r>
-              <a:rPr lang="en-US" smtClean="0"/>
+              <a:rPr lang="en-US" dirty="0" smtClean="0"/>
               <a:t>Click to edit Master text styles</a:t>
             </a:r>
           </a:p>
           <a:p>
             <a:pPr lvl="1"/>
             <a:r>
-              <a:rPr lang="en-US" smtClean="0"/>
+              <a:rPr lang="en-US" dirty="0" smtClean="0"/>
               <a:t>Second level</a:t>
             </a:r>
           </a:p>
           <a:p>
             <a:pPr lvl="2"/>
             <a:r>
-              <a:rPr lang="en-US" smtClean="0"/>
+              <a:rPr lang="en-US" dirty="0" smtClean="0"/>
               <a:t>Third level</a:t>
             </a:r>
           </a:p>
           <a:p>
             <a:pPr lvl="3"/>
             <a:r>
-              <a:rPr lang="en-US" smtClean="0"/>
+              <a:rPr lang="en-US" dirty="0" smtClean="0"/>
               <a:t>Fourth level</a:t>
             </a:r>
           </a:p>
           <a:p>
             <a:pPr lvl="4"/>
             <a:r>
-              <a:rPr lang="en-US" smtClean="0"/>
+              <a:rPr lang="en-US" dirty="0" smtClean="0"/>
               <a:t>Fifth level</a:t>
             </a:r>
-            <a:endParaRPr lang="pt-PT"/>
+            <a:endParaRPr lang="pt-PT" dirty="0"/>
           </a:p>
         </p:txBody>
       </p:sp>
@@ -1148,6 +1206,7 @@
           <a:p>
             <a:fld id="{1AE16238-79D5-4CE1-9F7C-9EB0DB09B684}" type="datetime1">
               <a:rPr lang="pt-PT" smtClean="0"/>
+              <a:pPr/>
               <a:t>28-01-2011</a:t>
             </a:fld>
             <a:endParaRPr lang="pt-PT"/>
@@ -1394,6 +1453,7 @@
           <a:p>
             <a:fld id="{29EC9118-B484-4893-9D08-9848F3CE7FF2}" type="datetime1">
               <a:rPr lang="pt-PT" smtClean="0"/>
+              <a:pPr/>
               <a:t>28-01-2011</a:t>
             </a:fld>
             <a:endParaRPr lang="pt-PT"/>
@@ -1678,6 +1738,7 @@
           <a:p>
             <a:fld id="{93295FF2-CB18-49BE-8735-588EA2A78858}" type="datetime1">
               <a:rPr lang="pt-PT" smtClean="0"/>
+              <a:pPr/>
               <a:t>28-01-2011</a:t>
             </a:fld>
             <a:endParaRPr lang="pt-PT"/>
@@ -2096,6 +2157,7 @@
           <a:p>
             <a:fld id="{50896DA6-8084-488D-9E6B-45E32377C613}" type="datetime1">
               <a:rPr lang="pt-PT" smtClean="0"/>
+              <a:pPr/>
               <a:t>28-01-2011</a:t>
             </a:fld>
             <a:endParaRPr lang="pt-PT"/>
@@ -2210,6 +2272,7 @@
           <a:p>
             <a:fld id="{40926C83-C8D3-48F0-B08F-F8259B57109C}" type="datetime1">
               <a:rPr lang="pt-PT" smtClean="0"/>
+              <a:pPr/>
               <a:t>28-01-2011</a:t>
             </a:fld>
             <a:endParaRPr lang="pt-PT"/>
@@ -2301,6 +2364,7 @@
           <a:p>
             <a:fld id="{379D2EB6-009D-45E0-886C-0BF1B142AD62}" type="datetime1">
               <a:rPr lang="pt-PT" smtClean="0"/>
+              <a:pPr/>
               <a:t>28-01-2011</a:t>
             </a:fld>
             <a:endParaRPr lang="pt-PT"/>
@@ -2574,6 +2638,7 @@
           <a:p>
             <a:fld id="{D9720365-511F-43DE-9BF0-D286DA1D7131}" type="datetime1">
               <a:rPr lang="pt-PT" smtClean="0"/>
+              <a:pPr/>
               <a:t>28-01-2011</a:t>
             </a:fld>
             <a:endParaRPr lang="pt-PT"/>
@@ -2823,6 +2888,7 @@
           <a:p>
             <a:fld id="{E9DCFC39-BBD6-4CEF-9802-34CE70E119D6}" type="datetime1">
               <a:rPr lang="pt-PT" smtClean="0"/>
+              <a:pPr/>
               <a:t>28-01-2011</a:t>
             </a:fld>
             <a:endParaRPr lang="pt-PT"/>
@@ -3032,6 +3098,7 @@
           <a:p>
             <a:fld id="{D7EF8D5E-585F-4BE6-AEBD-62F6999D90C3}" type="datetime1">
               <a:rPr lang="pt-PT" smtClean="0"/>
+              <a:pPr/>
               <a:t>28-01-2011</a:t>
             </a:fld>
             <a:endParaRPr lang="pt-PT"/>
@@ -3504,10 +3571,10 @@
         </p:nvGrpSpPr>
         <p:grpSpPr>
           <a:xfrm>
-            <a:off x="2043" y="6381328"/>
-            <a:ext cx="9144000" cy="364803"/>
-            <a:chOff x="0" y="6492519"/>
-            <a:chExt cx="9144000" cy="116173"/>
+            <a:off x="2043" y="6394432"/>
+            <a:ext cx="9144000" cy="338554"/>
+            <a:chOff x="0" y="6496698"/>
+            <a:chExt cx="9144000" cy="107814"/>
           </a:xfrm>
         </p:grpSpPr>
         <p:sp>
@@ -3518,8 +3585,8 @@
           </p:nvSpPr>
           <p:spPr>
             <a:xfrm>
-              <a:off x="0" y="6492519"/>
-              <a:ext cx="9144000" cy="116173"/>
+              <a:off x="0" y="6496698"/>
+              <a:ext cx="9144000" cy="107814"/>
             </a:xfrm>
             <a:prstGeom prst="rect">
               <a:avLst/>
@@ -3541,7 +3608,7 @@
                   <a:solidFill>
                     <a:schemeClr val="bg1"/>
                   </a:solidFill>
-                  <a:latin typeface="Chaparral Pro Light" pitchFamily="18" charset="0"/>
+                  <a:latin typeface="MetaSerifLf-Book" pitchFamily="34" charset="0"/>
                   <a:cs typeface="Times New Roman" pitchFamily="18" charset="0"/>
                 </a:rPr>
                 <a:t>Faculdade de Engenharia da Universidade do Porto</a:t>
@@ -3550,7 +3617,7 @@
                 <a:solidFill>
                   <a:schemeClr val="bg1"/>
                 </a:solidFill>
-                <a:latin typeface="Chaparral Pro Light" pitchFamily="18" charset="0"/>
+                <a:latin typeface="MetaSerifLf-Book" pitchFamily="34" charset="0"/>
                 <a:cs typeface="Times New Roman" pitchFamily="18" charset="0"/>
               </a:endParaRPr>
             </a:p>
@@ -3564,8 +3631,8 @@
           </p:nvSpPr>
           <p:spPr>
             <a:xfrm>
-              <a:off x="5148064" y="6492519"/>
-              <a:ext cx="3995936" cy="116173"/>
+              <a:off x="5148064" y="6496698"/>
+              <a:ext cx="3995936" cy="107814"/>
             </a:xfrm>
             <a:prstGeom prst="rect">
               <a:avLst/>
@@ -3584,7 +3651,7 @@
                   <a:solidFill>
                     <a:schemeClr val="bg1"/>
                   </a:solidFill>
-                  <a:latin typeface="Chaparral Pro Light" pitchFamily="18" charset="0"/>
+                  <a:latin typeface="MetaSerifLf-Book" pitchFamily="34" charset="0"/>
                 </a:rPr>
                 <a:t>February  11th, 2011</a:t>
               </a:r>
@@ -3592,7 +3659,7 @@
                 <a:solidFill>
                   <a:schemeClr val="bg1"/>
                 </a:solidFill>
-                <a:latin typeface="Chaparral Pro Light" pitchFamily="18" charset="0"/>
+                <a:latin typeface="MetaSerifLf-Book" pitchFamily="34" charset="0"/>
               </a:endParaRPr>
             </a:p>
           </p:txBody>
@@ -3607,7 +3674,7 @@
         <p:spPr>
           <a:xfrm>
             <a:off x="0" y="4221088"/>
-            <a:ext cx="5112568" cy="1246495"/>
+            <a:ext cx="5112568" cy="1278555"/>
           </a:xfrm>
           <a:prstGeom prst="rect">
             <a:avLst/>
@@ -3626,7 +3693,7 @@
           <a:p>
             <a:pPr>
               <a:lnSpc>
-                <a:spcPts val="3000"/>
+                <a:spcPts val="3200"/>
               </a:lnSpc>
             </a:pPr>
             <a:r>
@@ -3634,7 +3701,7 @@
                 <a:solidFill>
                   <a:schemeClr val="bg1"/>
                 </a:solidFill>
-                <a:latin typeface="Chaparral Pro Light Capt" pitchFamily="18" charset="0"/>
+                <a:latin typeface="MetaSerifLf-Book" pitchFamily="34" charset="0"/>
               </a:rPr>
               <a:t>João Gradim</a:t>
             </a:r>
@@ -3642,7 +3709,7 @@
           <a:p>
             <a:pPr>
               <a:lnSpc>
-                <a:spcPts val="3000"/>
+                <a:spcPts val="3200"/>
               </a:lnSpc>
             </a:pPr>
             <a:r>
@@ -3650,7 +3717,7 @@
                 <a:solidFill>
                   <a:schemeClr val="bg1"/>
                 </a:solidFill>
-                <a:latin typeface="Chaparral Pro Light Capt" pitchFamily="18" charset="0"/>
+                <a:latin typeface="MetaSerifLf-Book" pitchFamily="34" charset="0"/>
               </a:rPr>
               <a:t>Supervisor: Ademar Aguiar (Ph.D.)</a:t>
             </a:r>
@@ -3658,7 +3725,7 @@
           <a:p>
             <a:pPr>
               <a:lnSpc>
-                <a:spcPts val="3000"/>
+                <a:spcPts val="3200"/>
               </a:lnSpc>
             </a:pPr>
             <a:r>
@@ -3666,7 +3733,7 @@
                 <a:solidFill>
                   <a:schemeClr val="bg1"/>
                 </a:solidFill>
-                <a:latin typeface="Chaparral Pro Light Capt" pitchFamily="18" charset="0"/>
+                <a:latin typeface="MetaSerifLf-Book" pitchFamily="34" charset="0"/>
               </a:rPr>
               <a:t>Supervisor: Hugo Ferreira (Ph.D. AbD)</a:t>
             </a:r>
@@ -3674,7 +3741,7 @@
               <a:solidFill>
                 <a:schemeClr val="bg1"/>
               </a:solidFill>
-              <a:latin typeface="Chaparral Pro Light Capt" pitchFamily="18" charset="0"/>
+              <a:latin typeface="MetaSerifLf-Book" pitchFamily="34" charset="0"/>
             </a:endParaRPr>
           </a:p>
         </p:txBody>
@@ -3823,12 +3890,39 @@
             <p:ph type="title"/>
           </p:nvPr>
         </p:nvSpPr>
-        <p:spPr/>
-        <p:txBody>
-          <a:bodyPr/>
-          <a:lstStyle/>
-          <a:p>
-            <a:endParaRPr lang="pt-PT"/>
+        <p:spPr>
+          <a:xfrm>
+            <a:off x="5868144" y="188640"/>
+            <a:ext cx="3275856" cy="706090"/>
+          </a:xfrm>
+          <a:solidFill>
+            <a:schemeClr val="tx1">
+              <a:alpha val="90000"/>
+            </a:schemeClr>
+          </a:solidFill>
+        </p:spPr>
+        <p:txBody>
+          <a:bodyPr rIns="144000">
+            <a:normAutofit/>
+          </a:bodyPr>
+          <a:lstStyle/>
+          <a:p>
+            <a:pPr algn="r"/>
+            <a:r>
+              <a:rPr lang="pt-PT" sz="3200" dirty="0" smtClean="0">
+                <a:solidFill>
+                  <a:schemeClr val="bg1"/>
+                </a:solidFill>
+                <a:latin typeface="League Gothic" pitchFamily="50" charset="0"/>
+              </a:rPr>
+              <a:t>Context</a:t>
+            </a:r>
+            <a:endParaRPr lang="pt-PT" sz="3200" dirty="0">
+              <a:solidFill>
+                <a:schemeClr val="bg1"/>
+              </a:solidFill>
+              <a:latin typeface="League Gothic" pitchFamily="50" charset="0"/>
+            </a:endParaRPr>
           </a:p>
         </p:txBody>
       </p:sp>
@@ -3842,12 +3936,76 @@
             <p:ph idx="1"/>
           </p:nvPr>
         </p:nvSpPr>
-        <p:spPr/>
-        <p:txBody>
-          <a:bodyPr/>
-          <a:lstStyle/>
-          <a:p>
-            <a:endParaRPr lang="pt-PT"/>
+        <p:spPr>
+          <a:effectLst>
+            <a:outerShdw blurRad="50800" dist="25400" dir="2700000" algn="tl" rotWithShape="0">
+              <a:prstClr val="black">
+                <a:alpha val="15000"/>
+              </a:prstClr>
+            </a:outerShdw>
+          </a:effectLst>
+        </p:spPr>
+        <p:txBody>
+          <a:bodyPr>
+            <a:normAutofit/>
+          </a:bodyPr>
+          <a:lstStyle/>
+          <a:p>
+            <a:pPr>
+              <a:lnSpc>
+                <a:spcPct val="110000"/>
+              </a:lnSpc>
+            </a:pPr>
+            <a:r>
+              <a:rPr lang="pt-PT" sz="3600" dirty="0" smtClean="0">
+                <a:solidFill>
+                  <a:schemeClr val="tx1">
+                    <a:lumMod val="85000"/>
+                    <a:lumOff val="15000"/>
+                  </a:schemeClr>
+                </a:solidFill>
+                <a:latin typeface="MetaSerifLf-Book" pitchFamily="34" charset="0"/>
+              </a:rPr>
+              <a:t>Many software projects exist in an ever-changing environment</a:t>
+            </a:r>
+          </a:p>
+          <a:p>
+            <a:pPr>
+              <a:lnSpc>
+                <a:spcPct val="110000"/>
+              </a:lnSpc>
+            </a:pPr>
+            <a:r>
+              <a:rPr lang="pt-PT" sz="3600" dirty="0" smtClean="0">
+                <a:solidFill>
+                  <a:schemeClr val="tx1">
+                    <a:lumMod val="85000"/>
+                    <a:lumOff val="15000"/>
+                  </a:schemeClr>
+                </a:solidFill>
+                <a:latin typeface="MetaSerifLf-Book" pitchFamily="34" charset="0"/>
+              </a:rPr>
+              <a:t>Requirements change to reflect changes in the enviroment, the industry, the client and end-users</a:t>
+            </a:r>
+          </a:p>
+          <a:p>
+            <a:pPr>
+              <a:lnSpc>
+                <a:spcPct val="110000"/>
+              </a:lnSpc>
+            </a:pPr>
+            <a:r>
+              <a:rPr lang="pt-PT" sz="3600" dirty="0" smtClean="0">
+                <a:solidFill>
+                  <a:schemeClr val="tx1">
+                    <a:lumMod val="85000"/>
+                    <a:lumOff val="15000"/>
+                  </a:schemeClr>
+                </a:solidFill>
+                <a:latin typeface="MetaSerifLf-Book" pitchFamily="34" charset="0"/>
+              </a:rPr>
+              <a:t>Modifying a system is costly</a:t>
+            </a:r>
           </a:p>
         </p:txBody>
       </p:sp>

</xml_diff>

<commit_message>
Some more ideas and images
</commit_message>
<xml_diff>
--- a/presentations/thesis.pptx
+++ b/presentations/thesis.pptx
@@ -5,12 +5,21 @@
     <p:sldMasterId id="2147483648" r:id="rId1"/>
   </p:sldMasterIdLst>
   <p:notesMasterIdLst>
-    <p:notesMasterId r:id="rId5"/>
+    <p:notesMasterId r:id="rId14"/>
   </p:notesMasterIdLst>
   <p:sldIdLst>
     <p:sldId id="256" r:id="rId2"/>
     <p:sldId id="257" r:id="rId3"/>
     <p:sldId id="258" r:id="rId4"/>
+    <p:sldId id="260" r:id="rId5"/>
+    <p:sldId id="259" r:id="rId6"/>
+    <p:sldId id="263" r:id="rId7"/>
+    <p:sldId id="264" r:id="rId8"/>
+    <p:sldId id="269" r:id="rId9"/>
+    <p:sldId id="270" r:id="rId10"/>
+    <p:sldId id="266" r:id="rId11"/>
+    <p:sldId id="267" r:id="rId12"/>
+    <p:sldId id="268" r:id="rId13"/>
   </p:sldIdLst>
   <p:sldSz cx="9144000" cy="6858000" type="screen4x3"/>
   <p:notesSz cx="6858000" cy="9144000"/>
@@ -195,7 +204,7 @@
             <a:fld id="{A4A9652A-D4BF-41F5-B3CF-F03C6BFD8852}" type="datetimeFigureOut">
               <a:rPr lang="pt-PT" smtClean="0"/>
               <a:pPr/>
-              <a:t>28-01-2011</a:t>
+              <a:t>29-01-2011</a:t>
             </a:fld>
             <a:endParaRPr lang="pt-PT"/>
           </a:p>
@@ -643,7 +652,7 @@
             <a:fld id="{B21DA5EC-CDBD-4BE5-AFEC-D05D842E9DCA}" type="datetime1">
               <a:rPr lang="pt-PT" smtClean="0"/>
               <a:pPr/>
-              <a:t>28-01-2011</a:t>
+              <a:t>29-01-2011</a:t>
             </a:fld>
             <a:endParaRPr lang="pt-PT"/>
           </a:p>
@@ -810,7 +819,7 @@
             <a:fld id="{265ABC6D-62B8-444F-8CBB-55DA24843F08}" type="datetime1">
               <a:rPr lang="pt-PT" smtClean="0"/>
               <a:pPr/>
-              <a:t>28-01-2011</a:t>
+              <a:t>29-01-2011</a:t>
             </a:fld>
             <a:endParaRPr lang="pt-PT"/>
           </a:p>
@@ -987,7 +996,7 @@
             <a:fld id="{642BB447-BC74-408D-87E2-151F2C4E6D5C}" type="datetime1">
               <a:rPr lang="pt-PT" smtClean="0"/>
               <a:pPr/>
-              <a:t>28-01-2011</a:t>
+              <a:t>29-01-2011</a:t>
             </a:fld>
             <a:endParaRPr lang="pt-PT"/>
           </a:p>
@@ -1207,7 +1216,7 @@
             <a:fld id="{1AE16238-79D5-4CE1-9F7C-9EB0DB09B684}" type="datetime1">
               <a:rPr lang="pt-PT" smtClean="0"/>
               <a:pPr/>
-              <a:t>28-01-2011</a:t>
+              <a:t>29-01-2011</a:t>
             </a:fld>
             <a:endParaRPr lang="pt-PT"/>
           </a:p>
@@ -1454,7 +1463,7 @@
             <a:fld id="{29EC9118-B484-4893-9D08-9848F3CE7FF2}" type="datetime1">
               <a:rPr lang="pt-PT" smtClean="0"/>
               <a:pPr/>
-              <a:t>28-01-2011</a:t>
+              <a:t>29-01-2011</a:t>
             </a:fld>
             <a:endParaRPr lang="pt-PT"/>
           </a:p>
@@ -1739,7 +1748,7 @@
             <a:fld id="{93295FF2-CB18-49BE-8735-588EA2A78858}" type="datetime1">
               <a:rPr lang="pt-PT" smtClean="0"/>
               <a:pPr/>
-              <a:t>28-01-2011</a:t>
+              <a:t>29-01-2011</a:t>
             </a:fld>
             <a:endParaRPr lang="pt-PT"/>
           </a:p>
@@ -2158,7 +2167,7 @@
             <a:fld id="{50896DA6-8084-488D-9E6B-45E32377C613}" type="datetime1">
               <a:rPr lang="pt-PT" smtClean="0"/>
               <a:pPr/>
-              <a:t>28-01-2011</a:t>
+              <a:t>29-01-2011</a:t>
             </a:fld>
             <a:endParaRPr lang="pt-PT"/>
           </a:p>
@@ -2273,7 +2282,7 @@
             <a:fld id="{40926C83-C8D3-48F0-B08F-F8259B57109C}" type="datetime1">
               <a:rPr lang="pt-PT" smtClean="0"/>
               <a:pPr/>
-              <a:t>28-01-2011</a:t>
+              <a:t>29-01-2011</a:t>
             </a:fld>
             <a:endParaRPr lang="pt-PT"/>
           </a:p>
@@ -2365,7 +2374,7 @@
             <a:fld id="{379D2EB6-009D-45E0-886C-0BF1B142AD62}" type="datetime1">
               <a:rPr lang="pt-PT" smtClean="0"/>
               <a:pPr/>
-              <a:t>28-01-2011</a:t>
+              <a:t>29-01-2011</a:t>
             </a:fld>
             <a:endParaRPr lang="pt-PT"/>
           </a:p>
@@ -2639,7 +2648,7 @@
             <a:fld id="{D9720365-511F-43DE-9BF0-D286DA1D7131}" type="datetime1">
               <a:rPr lang="pt-PT" smtClean="0"/>
               <a:pPr/>
-              <a:t>28-01-2011</a:t>
+              <a:t>29-01-2011</a:t>
             </a:fld>
             <a:endParaRPr lang="pt-PT"/>
           </a:p>
@@ -2889,7 +2898,7 @@
             <a:fld id="{E9DCFC39-BBD6-4CEF-9802-34CE70E119D6}" type="datetime1">
               <a:rPr lang="pt-PT" smtClean="0"/>
               <a:pPr/>
-              <a:t>28-01-2011</a:t>
+              <a:t>29-01-2011</a:t>
             </a:fld>
             <a:endParaRPr lang="pt-PT"/>
           </a:p>
@@ -3099,7 +3108,7 @@
             <a:fld id="{D7EF8D5E-585F-4BE6-AEBD-62F6999D90C3}" type="datetime1">
               <a:rPr lang="pt-PT" smtClean="0"/>
               <a:pPr/>
-              <a:t>28-01-2011</a:t>
+              <a:t>29-01-2011</a:t>
             </a:fld>
             <a:endParaRPr lang="pt-PT"/>
           </a:p>
@@ -3761,6 +3770,412 @@
 </p:sld>
 </file>
 
+<file path=ppt/slides/slide10.xml><?xml version="1.0" encoding="utf-8"?>
+<p:sld xmlns:a="http://schemas.openxmlformats.org/drawingml/2006/main" xmlns:r="http://schemas.openxmlformats.org/officeDocument/2006/relationships" xmlns:p="http://schemas.openxmlformats.org/presentationml/2006/main">
+  <p:cSld>
+    <p:spTree>
+      <p:nvGrpSpPr>
+        <p:cNvPr id="1" name=""/>
+        <p:cNvGrpSpPr/>
+        <p:nvPr/>
+      </p:nvGrpSpPr>
+      <p:grpSpPr>
+        <a:xfrm>
+          <a:off x="0" y="0"/>
+          <a:ext cx="0" cy="0"/>
+          <a:chOff x="0" y="0"/>
+          <a:chExt cx="0" cy="0"/>
+        </a:xfrm>
+      </p:grpSpPr>
+      <p:sp>
+        <p:nvSpPr>
+          <p:cNvPr id="2" name="Title 1"/>
+          <p:cNvSpPr>
+            <a:spLocks noGrp="1"/>
+          </p:cNvSpPr>
+          <p:nvPr>
+            <p:ph type="title"/>
+          </p:nvPr>
+        </p:nvSpPr>
+        <p:spPr>
+          <a:xfrm>
+            <a:off x="0" y="2941730"/>
+            <a:ext cx="4644008" cy="974540"/>
+          </a:xfrm>
+          <a:solidFill>
+            <a:schemeClr val="tx1">
+              <a:alpha val="90000"/>
+            </a:schemeClr>
+          </a:solidFill>
+        </p:spPr>
+        <p:txBody>
+          <a:bodyPr lIns="360000">
+            <a:noAutofit/>
+          </a:bodyPr>
+          <a:lstStyle/>
+          <a:p>
+            <a:pPr algn="l"/>
+            <a:r>
+              <a:rPr lang="pt-PT" sz="5400" dirty="0" smtClean="0">
+                <a:solidFill>
+                  <a:schemeClr val="bg1"/>
+                </a:solidFill>
+                <a:latin typeface="League Gothic" pitchFamily="50" charset="0"/>
+              </a:rPr>
+              <a:t>Further Work</a:t>
+            </a:r>
+            <a:endParaRPr lang="pt-PT" sz="5400" dirty="0">
+              <a:solidFill>
+                <a:schemeClr val="bg1"/>
+              </a:solidFill>
+              <a:latin typeface="League Gothic" pitchFamily="50" charset="0"/>
+            </a:endParaRPr>
+          </a:p>
+        </p:txBody>
+      </p:sp>
+      <p:sp>
+        <p:nvSpPr>
+          <p:cNvPr id="5" name="Slide Number Placeholder 4"/>
+          <p:cNvSpPr>
+            <a:spLocks noGrp="1"/>
+          </p:cNvSpPr>
+          <p:nvPr>
+            <p:ph type="sldNum" sz="quarter" idx="12"/>
+          </p:nvPr>
+        </p:nvSpPr>
+        <p:spPr/>
+        <p:txBody>
+          <a:bodyPr/>
+          <a:lstStyle/>
+          <a:p>
+            <a:fld id="{AF2DD60D-AE1E-4B35-90D2-0ABAEDD7A6F5}" type="slidenum">
+              <a:rPr lang="pt-PT" smtClean="0"/>
+              <a:pPr/>
+              <a:t>10</a:t>
+            </a:fld>
+            <a:endParaRPr lang="pt-PT" dirty="0"/>
+          </a:p>
+        </p:txBody>
+      </p:sp>
+    </p:spTree>
+  </p:cSld>
+  <p:clrMapOvr>
+    <a:masterClrMapping/>
+  </p:clrMapOvr>
+  <p:timing>
+    <p:tnLst>
+      <p:par>
+        <p:cTn id="1" dur="indefinite" restart="never" nodeType="tmRoot"/>
+      </p:par>
+    </p:tnLst>
+  </p:timing>
+</p:sld>
+</file>
+
+<file path=ppt/slides/slide11.xml><?xml version="1.0" encoding="utf-8"?>
+<p:sld xmlns:a="http://schemas.openxmlformats.org/drawingml/2006/main" xmlns:r="http://schemas.openxmlformats.org/officeDocument/2006/relationships" xmlns:p="http://schemas.openxmlformats.org/presentationml/2006/main">
+  <p:cSld>
+    <p:spTree>
+      <p:nvGrpSpPr>
+        <p:cNvPr id="1" name=""/>
+        <p:cNvGrpSpPr/>
+        <p:nvPr/>
+      </p:nvGrpSpPr>
+      <p:grpSpPr>
+        <a:xfrm>
+          <a:off x="0" y="0"/>
+          <a:ext cx="0" cy="0"/>
+          <a:chOff x="0" y="0"/>
+          <a:chExt cx="0" cy="0"/>
+        </a:xfrm>
+      </p:grpSpPr>
+      <p:sp>
+        <p:nvSpPr>
+          <p:cNvPr id="2" name="Title 1"/>
+          <p:cNvSpPr>
+            <a:spLocks noGrp="1"/>
+          </p:cNvSpPr>
+          <p:nvPr>
+            <p:ph type="title"/>
+          </p:nvPr>
+        </p:nvSpPr>
+        <p:spPr>
+          <a:xfrm>
+            <a:off x="5868144" y="188640"/>
+            <a:ext cx="3275856" cy="706090"/>
+          </a:xfrm>
+          <a:solidFill>
+            <a:schemeClr val="tx1">
+              <a:alpha val="90000"/>
+            </a:schemeClr>
+          </a:solidFill>
+        </p:spPr>
+        <p:txBody>
+          <a:bodyPr rIns="144000">
+            <a:normAutofit/>
+          </a:bodyPr>
+          <a:lstStyle/>
+          <a:p>
+            <a:pPr algn="r"/>
+            <a:r>
+              <a:rPr lang="pt-PT" sz="3200" dirty="0" smtClean="0">
+                <a:solidFill>
+                  <a:schemeClr val="bg1"/>
+                </a:solidFill>
+                <a:latin typeface="League Gothic" pitchFamily="50" charset="0"/>
+              </a:rPr>
+              <a:t>Implementation</a:t>
+            </a:r>
+            <a:endParaRPr lang="pt-PT" sz="3200" dirty="0">
+              <a:solidFill>
+                <a:schemeClr val="bg1"/>
+              </a:solidFill>
+              <a:latin typeface="League Gothic" pitchFamily="50" charset="0"/>
+            </a:endParaRPr>
+          </a:p>
+        </p:txBody>
+      </p:sp>
+      <p:sp>
+        <p:nvSpPr>
+          <p:cNvPr id="3" name="Content Placeholder 2"/>
+          <p:cNvSpPr>
+            <a:spLocks noGrp="1"/>
+          </p:cNvSpPr>
+          <p:nvPr>
+            <p:ph idx="1"/>
+          </p:nvPr>
+        </p:nvSpPr>
+        <p:spPr>
+          <a:xfrm>
+            <a:off x="457200" y="1124744"/>
+            <a:ext cx="8229600" cy="5040560"/>
+          </a:xfrm>
+          <a:effectLst>
+            <a:outerShdw blurRad="50800" dist="25400" dir="2700000" algn="tl" rotWithShape="0">
+              <a:prstClr val="black">
+                <a:alpha val="15000"/>
+              </a:prstClr>
+            </a:outerShdw>
+          </a:effectLst>
+        </p:spPr>
+        <p:txBody>
+          <a:bodyPr anchor="ctr" anchorCtr="0">
+            <a:normAutofit/>
+          </a:bodyPr>
+          <a:lstStyle/>
+          <a:p>
+            <a:pPr indent="0">
+              <a:lnSpc>
+                <a:spcPct val="110000"/>
+              </a:lnSpc>
+              <a:spcBef>
+                <a:spcPts val="0"/>
+              </a:spcBef>
+              <a:buNone/>
+            </a:pPr>
+            <a:endParaRPr lang="pt-PT" sz="3600" dirty="0" smtClean="0">
+              <a:solidFill>
+                <a:schemeClr val="tx1">
+                  <a:lumMod val="85000"/>
+                  <a:lumOff val="15000"/>
+                </a:schemeClr>
+              </a:solidFill>
+              <a:latin typeface="MetaSerif-Book" pitchFamily="34" charset="0"/>
+            </a:endParaRPr>
+          </a:p>
+        </p:txBody>
+      </p:sp>
+      <p:sp>
+        <p:nvSpPr>
+          <p:cNvPr id="4" name="Slide Number Placeholder 3"/>
+          <p:cNvSpPr>
+            <a:spLocks noGrp="1"/>
+          </p:cNvSpPr>
+          <p:nvPr>
+            <p:ph type="sldNum" sz="quarter" idx="12"/>
+          </p:nvPr>
+        </p:nvSpPr>
+        <p:spPr/>
+        <p:txBody>
+          <a:bodyPr/>
+          <a:lstStyle/>
+          <a:p>
+            <a:fld id="{AF2DD60D-AE1E-4B35-90D2-0ABAEDD7A6F5}" type="slidenum">
+              <a:rPr lang="pt-PT" smtClean="0"/>
+              <a:pPr/>
+              <a:t>11</a:t>
+            </a:fld>
+            <a:endParaRPr lang="pt-PT" dirty="0"/>
+          </a:p>
+        </p:txBody>
+      </p:sp>
+    </p:spTree>
+  </p:cSld>
+  <p:clrMapOvr>
+    <a:masterClrMapping/>
+  </p:clrMapOvr>
+  <p:timing>
+    <p:tnLst>
+      <p:par>
+        <p:cTn id="1" dur="indefinite" restart="never" nodeType="tmRoot"/>
+      </p:par>
+    </p:tnLst>
+  </p:timing>
+</p:sld>
+</file>
+
+<file path=ppt/slides/slide12.xml><?xml version="1.0" encoding="utf-8"?>
+<p:sld xmlns:a="http://schemas.openxmlformats.org/drawingml/2006/main" xmlns:r="http://schemas.openxmlformats.org/officeDocument/2006/relationships" xmlns:p="http://schemas.openxmlformats.org/presentationml/2006/main">
+  <p:cSld>
+    <p:spTree>
+      <p:nvGrpSpPr>
+        <p:cNvPr id="1" name=""/>
+        <p:cNvGrpSpPr/>
+        <p:nvPr/>
+      </p:nvGrpSpPr>
+      <p:grpSpPr>
+        <a:xfrm>
+          <a:off x="0" y="0"/>
+          <a:ext cx="0" cy="0"/>
+          <a:chOff x="0" y="0"/>
+          <a:chExt cx="0" cy="0"/>
+        </a:xfrm>
+      </p:grpSpPr>
+      <p:sp>
+        <p:nvSpPr>
+          <p:cNvPr id="2" name="Title 1"/>
+          <p:cNvSpPr>
+            <a:spLocks noGrp="1"/>
+          </p:cNvSpPr>
+          <p:nvPr>
+            <p:ph type="title"/>
+          </p:nvPr>
+        </p:nvSpPr>
+        <p:spPr>
+          <a:xfrm>
+            <a:off x="5868144" y="188640"/>
+            <a:ext cx="3275856" cy="706090"/>
+          </a:xfrm>
+          <a:solidFill>
+            <a:schemeClr val="tx1">
+              <a:alpha val="90000"/>
+            </a:schemeClr>
+          </a:solidFill>
+        </p:spPr>
+        <p:txBody>
+          <a:bodyPr rIns="144000">
+            <a:normAutofit/>
+          </a:bodyPr>
+          <a:lstStyle/>
+          <a:p>
+            <a:pPr algn="r"/>
+            <a:r>
+              <a:rPr lang="pt-PT" sz="3200" dirty="0" smtClean="0">
+                <a:solidFill>
+                  <a:schemeClr val="bg1"/>
+                </a:solidFill>
+                <a:latin typeface="League Gothic" pitchFamily="50" charset="0"/>
+              </a:rPr>
+              <a:t>Performance</a:t>
+            </a:r>
+            <a:endParaRPr lang="pt-PT" sz="3200" dirty="0">
+              <a:solidFill>
+                <a:schemeClr val="bg1"/>
+              </a:solidFill>
+              <a:latin typeface="League Gothic" pitchFamily="50" charset="0"/>
+            </a:endParaRPr>
+          </a:p>
+        </p:txBody>
+      </p:sp>
+      <p:sp>
+        <p:nvSpPr>
+          <p:cNvPr id="3" name="Content Placeholder 2"/>
+          <p:cNvSpPr>
+            <a:spLocks noGrp="1"/>
+          </p:cNvSpPr>
+          <p:nvPr>
+            <p:ph idx="1"/>
+          </p:nvPr>
+        </p:nvSpPr>
+        <p:spPr>
+          <a:xfrm>
+            <a:off x="457200" y="1124744"/>
+            <a:ext cx="8229600" cy="5040560"/>
+          </a:xfrm>
+          <a:effectLst>
+            <a:outerShdw blurRad="50800" dist="25400" dir="2700000" algn="tl" rotWithShape="0">
+              <a:prstClr val="black">
+                <a:alpha val="15000"/>
+              </a:prstClr>
+            </a:outerShdw>
+          </a:effectLst>
+        </p:spPr>
+        <p:txBody>
+          <a:bodyPr anchor="ctr" anchorCtr="0">
+            <a:normAutofit/>
+          </a:bodyPr>
+          <a:lstStyle/>
+          <a:p>
+            <a:pPr indent="0">
+              <a:lnSpc>
+                <a:spcPct val="110000"/>
+              </a:lnSpc>
+              <a:spcBef>
+                <a:spcPts val="0"/>
+              </a:spcBef>
+              <a:buNone/>
+            </a:pPr>
+            <a:endParaRPr lang="pt-PT" sz="3600" dirty="0" smtClean="0">
+              <a:solidFill>
+                <a:schemeClr val="tx1">
+                  <a:lumMod val="85000"/>
+                  <a:lumOff val="15000"/>
+                </a:schemeClr>
+              </a:solidFill>
+              <a:latin typeface="MetaSerif-Book" pitchFamily="34" charset="0"/>
+            </a:endParaRPr>
+          </a:p>
+        </p:txBody>
+      </p:sp>
+      <p:sp>
+        <p:nvSpPr>
+          <p:cNvPr id="4" name="Slide Number Placeholder 3"/>
+          <p:cNvSpPr>
+            <a:spLocks noGrp="1"/>
+          </p:cNvSpPr>
+          <p:nvPr>
+            <p:ph type="sldNum" sz="quarter" idx="12"/>
+          </p:nvPr>
+        </p:nvSpPr>
+        <p:spPr/>
+        <p:txBody>
+          <a:bodyPr/>
+          <a:lstStyle/>
+          <a:p>
+            <a:fld id="{AF2DD60D-AE1E-4B35-90D2-0ABAEDD7A6F5}" type="slidenum">
+              <a:rPr lang="pt-PT" smtClean="0"/>
+              <a:pPr/>
+              <a:t>12</a:t>
+            </a:fld>
+            <a:endParaRPr lang="pt-PT" dirty="0"/>
+          </a:p>
+        </p:txBody>
+      </p:sp>
+    </p:spTree>
+  </p:cSld>
+  <p:clrMapOvr>
+    <a:masterClrMapping/>
+  </p:clrMapOvr>
+  <p:timing>
+    <p:tnLst>
+      <p:par>
+        <p:cTn id="1" dur="indefinite" restart="never" nodeType="tmRoot"/>
+      </p:par>
+    </p:tnLst>
+  </p:timing>
+</p:sld>
+</file>
+
 <file path=ppt/slides/slide2.xml><?xml version="1.0" encoding="utf-8"?>
 <p:sld xmlns:a="http://schemas.openxmlformats.org/drawingml/2006/main" xmlns:r="http://schemas.openxmlformats.org/officeDocument/2006/relationships" xmlns:p="http://schemas.openxmlformats.org/presentationml/2006/main">
   <p:cSld>
@@ -3946,7 +4361,7 @@
           </a:effectLst>
         </p:spPr>
         <p:txBody>
-          <a:bodyPr>
+          <a:bodyPr anchor="ctr" anchorCtr="0">
             <a:normAutofit/>
           </a:bodyPr>
           <a:lstStyle/>
@@ -3964,7 +4379,7 @@
                     <a:lumOff val="15000"/>
                   </a:schemeClr>
                 </a:solidFill>
-                <a:latin typeface="MetaSerifLf-Book" pitchFamily="34" charset="0"/>
+                <a:latin typeface="MetaSerif-Book" pitchFamily="34" charset="0"/>
               </a:rPr>
               <a:t>Many software projects exist in an ever-changing environment</a:t>
             </a:r>
@@ -3983,7 +4398,7 @@
                     <a:lumOff val="15000"/>
                   </a:schemeClr>
                 </a:solidFill>
-                <a:latin typeface="MetaSerifLf-Book" pitchFamily="34" charset="0"/>
+                <a:latin typeface="MetaSerif-Book" pitchFamily="34" charset="0"/>
               </a:rPr>
               <a:t>Requirements change to reflect changes in the enviroment, the industry, the client and end-users</a:t>
             </a:r>
@@ -4002,7 +4417,7 @@
                     <a:lumOff val="15000"/>
                   </a:schemeClr>
                 </a:solidFill>
-                <a:latin typeface="MetaSerifLf-Book" pitchFamily="34" charset="0"/>
+                <a:latin typeface="MetaSerif-Book" pitchFamily="34" charset="0"/>
               </a:rPr>
               <a:t>Modifying a system is costly</a:t>
             </a:r>
@@ -4028,6 +4443,902 @@
               <a:rPr lang="pt-PT" smtClean="0"/>
               <a:pPr/>
               <a:t>3</a:t>
+            </a:fld>
+            <a:endParaRPr lang="pt-PT" dirty="0"/>
+          </a:p>
+        </p:txBody>
+      </p:sp>
+    </p:spTree>
+  </p:cSld>
+  <p:clrMapOvr>
+    <a:masterClrMapping/>
+  </p:clrMapOvr>
+  <p:timing>
+    <p:tnLst>
+      <p:par>
+        <p:cTn id="1" dur="indefinite" restart="never" nodeType="tmRoot"/>
+      </p:par>
+    </p:tnLst>
+  </p:timing>
+</p:sld>
+</file>
+
+<file path=ppt/slides/slide4.xml><?xml version="1.0" encoding="utf-8"?>
+<p:sld xmlns:a="http://schemas.openxmlformats.org/drawingml/2006/main" xmlns:r="http://schemas.openxmlformats.org/officeDocument/2006/relationships" xmlns:p="http://schemas.openxmlformats.org/presentationml/2006/main">
+  <p:cSld>
+    <p:spTree>
+      <p:nvGrpSpPr>
+        <p:cNvPr id="1" name=""/>
+        <p:cNvGrpSpPr/>
+        <p:nvPr/>
+      </p:nvGrpSpPr>
+      <p:grpSpPr>
+        <a:xfrm>
+          <a:off x="0" y="0"/>
+          <a:ext cx="0" cy="0"/>
+          <a:chOff x="0" y="0"/>
+          <a:chExt cx="0" cy="0"/>
+        </a:xfrm>
+      </p:grpSpPr>
+      <p:pic>
+        <p:nvPicPr>
+          <p:cNvPr id="4" name="Picture 2" descr="C:\Users\jgradim\Documents\thesis\presentations\cameras.jpg"/>
+          <p:cNvPicPr>
+            <a:picLocks noChangeAspect="1" noChangeArrowheads="1"/>
+          </p:cNvPicPr>
+          <p:nvPr/>
+        </p:nvPicPr>
+        <p:blipFill>
+          <a:blip r:embed="rId2" cstate="print">
+            <a:duotone>
+              <a:schemeClr val="bg2">
+                <a:shade val="45000"/>
+                <a:satMod val="135000"/>
+              </a:schemeClr>
+              <a:prstClr val="white"/>
+            </a:duotone>
+          </a:blip>
+          <a:srcRect r="11089"/>
+          <a:stretch>
+            <a:fillRect/>
+          </a:stretch>
+        </p:blipFill>
+        <p:spPr bwMode="auto">
+          <a:xfrm>
+            <a:off x="0" y="0"/>
+            <a:ext cx="9144000" cy="6858000"/>
+          </a:xfrm>
+          <a:prstGeom prst="rect">
+            <a:avLst/>
+          </a:prstGeom>
+          <a:noFill/>
+        </p:spPr>
+      </p:pic>
+      <p:sp>
+        <p:nvSpPr>
+          <p:cNvPr id="2" name="Title 1"/>
+          <p:cNvSpPr>
+            <a:spLocks noGrp="1"/>
+          </p:cNvSpPr>
+          <p:nvPr>
+            <p:ph type="title"/>
+          </p:nvPr>
+        </p:nvSpPr>
+        <p:spPr>
+          <a:xfrm>
+            <a:off x="0" y="2941730"/>
+            <a:ext cx="4644008" cy="974540"/>
+          </a:xfrm>
+          <a:solidFill>
+            <a:schemeClr val="tx1">
+              <a:alpha val="90000"/>
+            </a:schemeClr>
+          </a:solidFill>
+        </p:spPr>
+        <p:txBody>
+          <a:bodyPr lIns="360000">
+            <a:noAutofit/>
+          </a:bodyPr>
+          <a:lstStyle/>
+          <a:p>
+            <a:pPr algn="l"/>
+            <a:r>
+              <a:rPr lang="pt-PT" sz="5400" dirty="0" smtClean="0">
+                <a:solidFill>
+                  <a:schemeClr val="bg1"/>
+                </a:solidFill>
+                <a:latin typeface="League Gothic" pitchFamily="50" charset="0"/>
+              </a:rPr>
+              <a:t>Related Work</a:t>
+            </a:r>
+            <a:endParaRPr lang="pt-PT" sz="5400" dirty="0">
+              <a:solidFill>
+                <a:schemeClr val="bg1"/>
+              </a:solidFill>
+              <a:latin typeface="League Gothic" pitchFamily="50" charset="0"/>
+            </a:endParaRPr>
+          </a:p>
+        </p:txBody>
+      </p:sp>
+      <p:sp>
+        <p:nvSpPr>
+          <p:cNvPr id="5" name="Slide Number Placeholder 4"/>
+          <p:cNvSpPr>
+            <a:spLocks noGrp="1"/>
+          </p:cNvSpPr>
+          <p:nvPr>
+            <p:ph type="sldNum" sz="quarter" idx="12"/>
+          </p:nvPr>
+        </p:nvSpPr>
+        <p:spPr/>
+        <p:txBody>
+          <a:bodyPr/>
+          <a:lstStyle/>
+          <a:p>
+            <a:fld id="{AF2DD60D-AE1E-4B35-90D2-0ABAEDD7A6F5}" type="slidenum">
+              <a:rPr lang="pt-PT" smtClean="0"/>
+              <a:pPr/>
+              <a:t>4</a:t>
+            </a:fld>
+            <a:endParaRPr lang="pt-PT" dirty="0"/>
+          </a:p>
+        </p:txBody>
+      </p:sp>
+    </p:spTree>
+  </p:cSld>
+  <p:clrMapOvr>
+    <a:masterClrMapping/>
+  </p:clrMapOvr>
+  <p:timing>
+    <p:tnLst>
+      <p:par>
+        <p:cTn id="1" dur="indefinite" restart="never" nodeType="tmRoot"/>
+      </p:par>
+    </p:tnLst>
+  </p:timing>
+</p:sld>
+</file>
+
+<file path=ppt/slides/slide5.xml><?xml version="1.0" encoding="utf-8"?>
+<p:sld xmlns:a="http://schemas.openxmlformats.org/drawingml/2006/main" xmlns:r="http://schemas.openxmlformats.org/officeDocument/2006/relationships" xmlns:p="http://schemas.openxmlformats.org/presentationml/2006/main">
+  <p:cSld>
+    <p:spTree>
+      <p:nvGrpSpPr>
+        <p:cNvPr id="1" name=""/>
+        <p:cNvGrpSpPr/>
+        <p:nvPr/>
+      </p:nvGrpSpPr>
+      <p:grpSpPr>
+        <a:xfrm>
+          <a:off x="0" y="0"/>
+          <a:ext cx="0" cy="0"/>
+          <a:chOff x="0" y="0"/>
+          <a:chExt cx="0" cy="0"/>
+        </a:xfrm>
+      </p:grpSpPr>
+      <p:pic>
+        <p:nvPicPr>
+          <p:cNvPr id="3074" name="Picture 2" descr="C:\Users\jgradim\Documents\thesis\presentations\old_books.jpg"/>
+          <p:cNvPicPr>
+            <a:picLocks noChangeAspect="1" noChangeArrowheads="1"/>
+          </p:cNvPicPr>
+          <p:nvPr/>
+        </p:nvPicPr>
+        <p:blipFill>
+          <a:blip r:embed="rId2" cstate="print"/>
+          <a:srcRect r="11066"/>
+          <a:stretch>
+            <a:fillRect/>
+          </a:stretch>
+        </p:blipFill>
+        <p:spPr bwMode="auto">
+          <a:xfrm>
+            <a:off x="0" y="0"/>
+            <a:ext cx="9144000" cy="6858000"/>
+          </a:xfrm>
+          <a:prstGeom prst="rect">
+            <a:avLst/>
+          </a:prstGeom>
+          <a:noFill/>
+        </p:spPr>
+      </p:pic>
+      <p:sp>
+        <p:nvSpPr>
+          <p:cNvPr id="2" name="Title 1"/>
+          <p:cNvSpPr>
+            <a:spLocks noGrp="1"/>
+          </p:cNvSpPr>
+          <p:nvPr>
+            <p:ph type="title"/>
+          </p:nvPr>
+        </p:nvSpPr>
+        <p:spPr>
+          <a:xfrm>
+            <a:off x="0" y="2941730"/>
+            <a:ext cx="4644008" cy="974540"/>
+          </a:xfrm>
+          <a:solidFill>
+            <a:schemeClr val="tx1">
+              <a:alpha val="90000"/>
+            </a:schemeClr>
+          </a:solidFill>
+        </p:spPr>
+        <p:txBody>
+          <a:bodyPr lIns="360000">
+            <a:noAutofit/>
+          </a:bodyPr>
+          <a:lstStyle/>
+          <a:p>
+            <a:pPr algn="l"/>
+            <a:r>
+              <a:rPr lang="pt-PT" sz="5400" dirty="0" smtClean="0">
+                <a:solidFill>
+                  <a:schemeClr val="bg1"/>
+                </a:solidFill>
+                <a:latin typeface="League Gothic" pitchFamily="50" charset="0"/>
+              </a:rPr>
+              <a:t>Conclusions</a:t>
+            </a:r>
+            <a:endParaRPr lang="pt-PT" sz="5400" dirty="0">
+              <a:solidFill>
+                <a:schemeClr val="bg1"/>
+              </a:solidFill>
+              <a:latin typeface="League Gothic" pitchFamily="50" charset="0"/>
+            </a:endParaRPr>
+          </a:p>
+        </p:txBody>
+      </p:sp>
+      <p:sp>
+        <p:nvSpPr>
+          <p:cNvPr id="5" name="Slide Number Placeholder 4"/>
+          <p:cNvSpPr>
+            <a:spLocks noGrp="1"/>
+          </p:cNvSpPr>
+          <p:nvPr>
+            <p:ph type="sldNum" sz="quarter" idx="12"/>
+          </p:nvPr>
+        </p:nvSpPr>
+        <p:spPr/>
+        <p:txBody>
+          <a:bodyPr/>
+          <a:lstStyle/>
+          <a:p>
+            <a:fld id="{AF2DD60D-AE1E-4B35-90D2-0ABAEDD7A6F5}" type="slidenum">
+              <a:rPr lang="pt-PT" smtClean="0"/>
+              <a:pPr/>
+              <a:t>5</a:t>
+            </a:fld>
+            <a:endParaRPr lang="pt-PT" dirty="0"/>
+          </a:p>
+        </p:txBody>
+      </p:sp>
+    </p:spTree>
+  </p:cSld>
+  <p:clrMapOvr>
+    <a:masterClrMapping/>
+  </p:clrMapOvr>
+  <p:timing>
+    <p:tnLst>
+      <p:par>
+        <p:cTn id="1" dur="indefinite" restart="never" nodeType="tmRoot"/>
+      </p:par>
+    </p:tnLst>
+  </p:timing>
+</p:sld>
+</file>
+
+<file path=ppt/slides/slide6.xml><?xml version="1.0" encoding="utf-8"?>
+<p:sld xmlns:a="http://schemas.openxmlformats.org/drawingml/2006/main" xmlns:r="http://schemas.openxmlformats.org/officeDocument/2006/relationships" xmlns:p="http://schemas.openxmlformats.org/presentationml/2006/main">
+  <p:cSld>
+    <p:spTree>
+      <p:nvGrpSpPr>
+        <p:cNvPr id="1" name=""/>
+        <p:cNvGrpSpPr/>
+        <p:nvPr/>
+      </p:nvGrpSpPr>
+      <p:grpSpPr>
+        <a:xfrm>
+          <a:off x="0" y="0"/>
+          <a:ext cx="0" cy="0"/>
+          <a:chOff x="0" y="0"/>
+          <a:chExt cx="0" cy="0"/>
+        </a:xfrm>
+      </p:grpSpPr>
+      <p:sp>
+        <p:nvSpPr>
+          <p:cNvPr id="2" name="Title 1"/>
+          <p:cNvSpPr>
+            <a:spLocks noGrp="1"/>
+          </p:cNvSpPr>
+          <p:nvPr>
+            <p:ph type="title"/>
+          </p:nvPr>
+        </p:nvSpPr>
+        <p:spPr>
+          <a:xfrm>
+            <a:off x="5868144" y="188640"/>
+            <a:ext cx="3275856" cy="706090"/>
+          </a:xfrm>
+          <a:solidFill>
+            <a:schemeClr val="tx1">
+              <a:alpha val="90000"/>
+            </a:schemeClr>
+          </a:solidFill>
+        </p:spPr>
+        <p:txBody>
+          <a:bodyPr rIns="144000">
+            <a:normAutofit/>
+          </a:bodyPr>
+          <a:lstStyle/>
+          <a:p>
+            <a:pPr algn="r"/>
+            <a:r>
+              <a:rPr lang="pt-PT" sz="3200" dirty="0" smtClean="0">
+                <a:solidFill>
+                  <a:schemeClr val="bg1"/>
+                </a:solidFill>
+                <a:latin typeface="League Gothic" pitchFamily="50" charset="0"/>
+              </a:rPr>
+              <a:t>AOMs</a:t>
+            </a:r>
+            <a:endParaRPr lang="pt-PT" sz="3200" dirty="0">
+              <a:solidFill>
+                <a:schemeClr val="bg1"/>
+              </a:solidFill>
+              <a:latin typeface="League Gothic" pitchFamily="50" charset="0"/>
+            </a:endParaRPr>
+          </a:p>
+        </p:txBody>
+      </p:sp>
+      <p:sp>
+        <p:nvSpPr>
+          <p:cNvPr id="3" name="Content Placeholder 2"/>
+          <p:cNvSpPr>
+            <a:spLocks noGrp="1"/>
+          </p:cNvSpPr>
+          <p:nvPr>
+            <p:ph idx="1"/>
+          </p:nvPr>
+        </p:nvSpPr>
+        <p:spPr>
+          <a:xfrm>
+            <a:off x="457200" y="1124744"/>
+            <a:ext cx="8229600" cy="5040560"/>
+          </a:xfrm>
+          <a:effectLst>
+            <a:outerShdw blurRad="50800" dist="25400" dir="2700000" algn="tl" rotWithShape="0">
+              <a:prstClr val="black">
+                <a:alpha val="15000"/>
+              </a:prstClr>
+            </a:outerShdw>
+          </a:effectLst>
+        </p:spPr>
+        <p:txBody>
+          <a:bodyPr anchor="ctr" anchorCtr="0">
+            <a:normAutofit/>
+          </a:bodyPr>
+          <a:lstStyle/>
+          <a:p>
+            <a:pPr indent="0">
+              <a:lnSpc>
+                <a:spcPct val="110000"/>
+              </a:lnSpc>
+              <a:spcBef>
+                <a:spcPts val="0"/>
+              </a:spcBef>
+              <a:buNone/>
+            </a:pPr>
+            <a:r>
+              <a:rPr lang="pt-PT" sz="3600" dirty="0" smtClean="0">
+                <a:solidFill>
+                  <a:schemeClr val="tx1">
+                    <a:lumMod val="85000"/>
+                    <a:lumOff val="15000"/>
+                  </a:schemeClr>
+                </a:solidFill>
+                <a:latin typeface="MetaSerif-Book" pitchFamily="34" charset="0"/>
+              </a:rPr>
+              <a:t>AOM architectures provide the best framework for building adaptable software systems</a:t>
+            </a:r>
+            <a:endParaRPr lang="pt-PT" sz="3600" dirty="0" smtClean="0">
+              <a:solidFill>
+                <a:schemeClr val="tx1">
+                  <a:lumMod val="85000"/>
+                  <a:lumOff val="15000"/>
+                </a:schemeClr>
+              </a:solidFill>
+              <a:latin typeface="MetaSerif-Book" pitchFamily="34" charset="0"/>
+            </a:endParaRPr>
+          </a:p>
+        </p:txBody>
+      </p:sp>
+      <p:sp>
+        <p:nvSpPr>
+          <p:cNvPr id="4" name="Slide Number Placeholder 3"/>
+          <p:cNvSpPr>
+            <a:spLocks noGrp="1"/>
+          </p:cNvSpPr>
+          <p:nvPr>
+            <p:ph type="sldNum" sz="quarter" idx="12"/>
+          </p:nvPr>
+        </p:nvSpPr>
+        <p:spPr/>
+        <p:txBody>
+          <a:bodyPr/>
+          <a:lstStyle/>
+          <a:p>
+            <a:fld id="{AF2DD60D-AE1E-4B35-90D2-0ABAEDD7A6F5}" type="slidenum">
+              <a:rPr lang="pt-PT" smtClean="0"/>
+              <a:pPr/>
+              <a:t>6</a:t>
+            </a:fld>
+            <a:endParaRPr lang="pt-PT" dirty="0"/>
+          </a:p>
+        </p:txBody>
+      </p:sp>
+    </p:spTree>
+  </p:cSld>
+  <p:clrMapOvr>
+    <a:masterClrMapping/>
+  </p:clrMapOvr>
+  <p:timing>
+    <p:tnLst>
+      <p:par>
+        <p:cTn id="1" dur="indefinite" restart="never" nodeType="tmRoot"/>
+      </p:par>
+    </p:tnLst>
+  </p:timing>
+</p:sld>
+</file>
+
+<file path=ppt/slides/slide7.xml><?xml version="1.0" encoding="utf-8"?>
+<p:sld xmlns:a="http://schemas.openxmlformats.org/drawingml/2006/main" xmlns:r="http://schemas.openxmlformats.org/officeDocument/2006/relationships" xmlns:p="http://schemas.openxmlformats.org/presentationml/2006/main">
+  <p:cSld>
+    <p:spTree>
+      <p:nvGrpSpPr>
+        <p:cNvPr id="1" name=""/>
+        <p:cNvGrpSpPr/>
+        <p:nvPr/>
+      </p:nvGrpSpPr>
+      <p:grpSpPr>
+        <a:xfrm>
+          <a:off x="0" y="0"/>
+          <a:ext cx="0" cy="0"/>
+          <a:chOff x="0" y="0"/>
+          <a:chExt cx="0" cy="0"/>
+        </a:xfrm>
+      </p:grpSpPr>
+      <p:sp>
+        <p:nvSpPr>
+          <p:cNvPr id="2" name="Title 1"/>
+          <p:cNvSpPr>
+            <a:spLocks noGrp="1"/>
+          </p:cNvSpPr>
+          <p:nvPr>
+            <p:ph type="title"/>
+          </p:nvPr>
+        </p:nvSpPr>
+        <p:spPr>
+          <a:xfrm>
+            <a:off x="5868144" y="188640"/>
+            <a:ext cx="3275856" cy="706090"/>
+          </a:xfrm>
+          <a:solidFill>
+            <a:schemeClr val="tx1">
+              <a:alpha val="90000"/>
+            </a:schemeClr>
+          </a:solidFill>
+        </p:spPr>
+        <p:txBody>
+          <a:bodyPr rIns="144000">
+            <a:normAutofit/>
+          </a:bodyPr>
+          <a:lstStyle/>
+          <a:p>
+            <a:pPr algn="r"/>
+            <a:r>
+              <a:rPr lang="pt-PT" sz="3200" dirty="0" smtClean="0">
+                <a:solidFill>
+                  <a:schemeClr val="bg1"/>
+                </a:solidFill>
+                <a:latin typeface="League Gothic" pitchFamily="50" charset="0"/>
+              </a:rPr>
+              <a:t>Rails &amp; MVC</a:t>
+            </a:r>
+            <a:endParaRPr lang="pt-PT" sz="3200" dirty="0">
+              <a:solidFill>
+                <a:schemeClr val="bg1"/>
+              </a:solidFill>
+              <a:latin typeface="League Gothic" pitchFamily="50" charset="0"/>
+            </a:endParaRPr>
+          </a:p>
+        </p:txBody>
+      </p:sp>
+      <p:sp>
+        <p:nvSpPr>
+          <p:cNvPr id="3" name="Content Placeholder 2"/>
+          <p:cNvSpPr>
+            <a:spLocks noGrp="1"/>
+          </p:cNvSpPr>
+          <p:nvPr>
+            <p:ph idx="1"/>
+          </p:nvPr>
+        </p:nvSpPr>
+        <p:spPr>
+          <a:xfrm>
+            <a:off x="457200" y="1124744"/>
+            <a:ext cx="8229600" cy="5040560"/>
+          </a:xfrm>
+          <a:effectLst>
+            <a:outerShdw blurRad="50800" dist="25400" dir="2700000" algn="tl" rotWithShape="0">
+              <a:prstClr val="black">
+                <a:alpha val="15000"/>
+              </a:prstClr>
+            </a:outerShdw>
+          </a:effectLst>
+        </p:spPr>
+        <p:txBody>
+          <a:bodyPr anchor="ctr" anchorCtr="0">
+            <a:normAutofit/>
+          </a:bodyPr>
+          <a:lstStyle/>
+          <a:p>
+            <a:pPr indent="0">
+              <a:lnSpc>
+                <a:spcPct val="110000"/>
+              </a:lnSpc>
+              <a:spcBef>
+                <a:spcPts val="0"/>
+              </a:spcBef>
+              <a:buNone/>
+            </a:pPr>
+            <a:r>
+              <a:rPr lang="pt-PT" sz="3600" dirty="0" smtClean="0">
+                <a:solidFill>
+                  <a:schemeClr val="tx1">
+                    <a:lumMod val="85000"/>
+                    <a:lumOff val="15000"/>
+                  </a:schemeClr>
+                </a:solidFill>
+                <a:latin typeface="MetaSerif-Book" pitchFamily="34" charset="0"/>
+              </a:rPr>
+              <a:t>MVC architecture used by Rails can coexist harmoniously with AOM design patterns, especially </a:t>
+            </a:r>
+            <a:endParaRPr lang="pt-PT" sz="3600" dirty="0" smtClean="0">
+              <a:solidFill>
+                <a:schemeClr val="tx1">
+                  <a:lumMod val="85000"/>
+                  <a:lumOff val="15000"/>
+                </a:schemeClr>
+              </a:solidFill>
+              <a:latin typeface="MetaSerif-Book" pitchFamily="34" charset="0"/>
+            </a:endParaRPr>
+          </a:p>
+        </p:txBody>
+      </p:sp>
+      <p:sp>
+        <p:nvSpPr>
+          <p:cNvPr id="4" name="Slide Number Placeholder 3"/>
+          <p:cNvSpPr>
+            <a:spLocks noGrp="1"/>
+          </p:cNvSpPr>
+          <p:nvPr>
+            <p:ph type="sldNum" sz="quarter" idx="12"/>
+          </p:nvPr>
+        </p:nvSpPr>
+        <p:spPr/>
+        <p:txBody>
+          <a:bodyPr/>
+          <a:lstStyle/>
+          <a:p>
+            <a:fld id="{AF2DD60D-AE1E-4B35-90D2-0ABAEDD7A6F5}" type="slidenum">
+              <a:rPr lang="pt-PT" smtClean="0"/>
+              <a:pPr/>
+              <a:t>7</a:t>
+            </a:fld>
+            <a:endParaRPr lang="pt-PT" dirty="0"/>
+          </a:p>
+        </p:txBody>
+      </p:sp>
+    </p:spTree>
+  </p:cSld>
+  <p:clrMapOvr>
+    <a:masterClrMapping/>
+  </p:clrMapOvr>
+  <p:timing>
+    <p:tnLst>
+      <p:par>
+        <p:cTn id="1" dur="indefinite" restart="never" nodeType="tmRoot"/>
+      </p:par>
+    </p:tnLst>
+  </p:timing>
+</p:sld>
+</file>
+
+<file path=ppt/slides/slide8.xml><?xml version="1.0" encoding="utf-8"?>
+<p:sld xmlns:a="http://schemas.openxmlformats.org/drawingml/2006/main" xmlns:r="http://schemas.openxmlformats.org/officeDocument/2006/relationships" xmlns:p="http://schemas.openxmlformats.org/presentationml/2006/main">
+  <p:cSld>
+    <p:spTree>
+      <p:nvGrpSpPr>
+        <p:cNvPr id="1" name=""/>
+        <p:cNvGrpSpPr/>
+        <p:nvPr/>
+      </p:nvGrpSpPr>
+      <p:grpSpPr>
+        <a:xfrm>
+          <a:off x="0" y="0"/>
+          <a:ext cx="0" cy="0"/>
+          <a:chOff x="0" y="0"/>
+          <a:chExt cx="0" cy="0"/>
+        </a:xfrm>
+      </p:grpSpPr>
+      <p:sp>
+        <p:nvSpPr>
+          <p:cNvPr id="2" name="Title 1"/>
+          <p:cNvSpPr>
+            <a:spLocks noGrp="1"/>
+          </p:cNvSpPr>
+          <p:nvPr>
+            <p:ph type="title"/>
+          </p:nvPr>
+        </p:nvSpPr>
+        <p:spPr>
+          <a:xfrm>
+            <a:off x="5868144" y="188640"/>
+            <a:ext cx="3275856" cy="706090"/>
+          </a:xfrm>
+          <a:solidFill>
+            <a:schemeClr val="tx1">
+              <a:alpha val="90000"/>
+            </a:schemeClr>
+          </a:solidFill>
+        </p:spPr>
+        <p:txBody>
+          <a:bodyPr rIns="144000">
+            <a:normAutofit/>
+          </a:bodyPr>
+          <a:lstStyle/>
+          <a:p>
+            <a:pPr algn="r"/>
+            <a:r>
+              <a:rPr lang="pt-PT" sz="3200" dirty="0" smtClean="0">
+                <a:solidFill>
+                  <a:schemeClr val="bg1"/>
+                </a:solidFill>
+                <a:latin typeface="League Gothic" pitchFamily="50" charset="0"/>
+              </a:rPr>
+              <a:t>Variability</a:t>
+            </a:r>
+            <a:endParaRPr lang="pt-PT" sz="3200" dirty="0">
+              <a:solidFill>
+                <a:schemeClr val="bg1"/>
+              </a:solidFill>
+              <a:latin typeface="League Gothic" pitchFamily="50" charset="0"/>
+            </a:endParaRPr>
+          </a:p>
+        </p:txBody>
+      </p:sp>
+      <p:sp>
+        <p:nvSpPr>
+          <p:cNvPr id="3" name="Content Placeholder 2"/>
+          <p:cNvSpPr>
+            <a:spLocks noGrp="1"/>
+          </p:cNvSpPr>
+          <p:nvPr>
+            <p:ph idx="1"/>
+          </p:nvPr>
+        </p:nvSpPr>
+        <p:spPr>
+          <a:xfrm>
+            <a:off x="457200" y="1124744"/>
+            <a:ext cx="8229600" cy="5040560"/>
+          </a:xfrm>
+          <a:effectLst>
+            <a:outerShdw blurRad="50800" dist="25400" dir="2700000" algn="tl" rotWithShape="0">
+              <a:prstClr val="black">
+                <a:alpha val="15000"/>
+              </a:prstClr>
+            </a:outerShdw>
+          </a:effectLst>
+        </p:spPr>
+        <p:txBody>
+          <a:bodyPr anchor="ctr" anchorCtr="0">
+            <a:normAutofit/>
+          </a:bodyPr>
+          <a:lstStyle/>
+          <a:p>
+            <a:pPr indent="0">
+              <a:lnSpc>
+                <a:spcPct val="110000"/>
+              </a:lnSpc>
+              <a:spcBef>
+                <a:spcPts val="0"/>
+              </a:spcBef>
+              <a:buNone/>
+            </a:pPr>
+            <a:endParaRPr lang="pt-PT" sz="3600" dirty="0" smtClean="0">
+              <a:solidFill>
+                <a:schemeClr val="tx1">
+                  <a:lumMod val="85000"/>
+                  <a:lumOff val="15000"/>
+                </a:schemeClr>
+              </a:solidFill>
+              <a:latin typeface="MetaSerif-Book" pitchFamily="34" charset="0"/>
+            </a:endParaRPr>
+          </a:p>
+        </p:txBody>
+      </p:sp>
+      <p:sp>
+        <p:nvSpPr>
+          <p:cNvPr id="4" name="Slide Number Placeholder 3"/>
+          <p:cNvSpPr>
+            <a:spLocks noGrp="1"/>
+          </p:cNvSpPr>
+          <p:nvPr>
+            <p:ph type="sldNum" sz="quarter" idx="12"/>
+          </p:nvPr>
+        </p:nvSpPr>
+        <p:spPr/>
+        <p:txBody>
+          <a:bodyPr/>
+          <a:lstStyle/>
+          <a:p>
+            <a:fld id="{AF2DD60D-AE1E-4B35-90D2-0ABAEDD7A6F5}" type="slidenum">
+              <a:rPr lang="pt-PT" smtClean="0"/>
+              <a:pPr/>
+              <a:t>8</a:t>
+            </a:fld>
+            <a:endParaRPr lang="pt-PT" dirty="0"/>
+          </a:p>
+        </p:txBody>
+      </p:sp>
+    </p:spTree>
+  </p:cSld>
+  <p:clrMapOvr>
+    <a:masterClrMapping/>
+  </p:clrMapOvr>
+  <p:timing>
+    <p:tnLst>
+      <p:par>
+        <p:cTn id="1" dur="indefinite" restart="never" nodeType="tmRoot"/>
+      </p:par>
+    </p:tnLst>
+  </p:timing>
+</p:sld>
+</file>
+
+<file path=ppt/slides/slide9.xml><?xml version="1.0" encoding="utf-8"?>
+<p:sld xmlns:a="http://schemas.openxmlformats.org/drawingml/2006/main" xmlns:r="http://schemas.openxmlformats.org/officeDocument/2006/relationships" xmlns:p="http://schemas.openxmlformats.org/presentationml/2006/main">
+  <p:cSld>
+    <p:spTree>
+      <p:nvGrpSpPr>
+        <p:cNvPr id="1" name=""/>
+        <p:cNvGrpSpPr/>
+        <p:nvPr/>
+      </p:nvGrpSpPr>
+      <p:grpSpPr>
+        <a:xfrm>
+          <a:off x="0" y="0"/>
+          <a:ext cx="0" cy="0"/>
+          <a:chOff x="0" y="0"/>
+          <a:chExt cx="0" cy="0"/>
+        </a:xfrm>
+      </p:grpSpPr>
+      <p:sp>
+        <p:nvSpPr>
+          <p:cNvPr id="2" name="Title 1"/>
+          <p:cNvSpPr>
+            <a:spLocks noGrp="1"/>
+          </p:cNvSpPr>
+          <p:nvPr>
+            <p:ph type="title"/>
+          </p:nvPr>
+        </p:nvSpPr>
+        <p:spPr>
+          <a:xfrm>
+            <a:off x="5868144" y="188640"/>
+            <a:ext cx="3275856" cy="706090"/>
+          </a:xfrm>
+          <a:solidFill>
+            <a:schemeClr val="tx1">
+              <a:alpha val="90000"/>
+            </a:schemeClr>
+          </a:solidFill>
+        </p:spPr>
+        <p:txBody>
+          <a:bodyPr rIns="144000">
+            <a:normAutofit/>
+          </a:bodyPr>
+          <a:lstStyle/>
+          <a:p>
+            <a:pPr algn="r"/>
+            <a:r>
+              <a:rPr lang="pt-PT" sz="3200" dirty="0" smtClean="0">
+                <a:solidFill>
+                  <a:schemeClr val="bg1"/>
+                </a:solidFill>
+                <a:latin typeface="League Gothic" pitchFamily="50" charset="0"/>
+              </a:rPr>
+              <a:t>Performance</a:t>
+            </a:r>
+            <a:endParaRPr lang="pt-PT" sz="3200" dirty="0">
+              <a:solidFill>
+                <a:schemeClr val="bg1"/>
+              </a:solidFill>
+              <a:latin typeface="League Gothic" pitchFamily="50" charset="0"/>
+            </a:endParaRPr>
+          </a:p>
+        </p:txBody>
+      </p:sp>
+      <p:sp>
+        <p:nvSpPr>
+          <p:cNvPr id="3" name="Content Placeholder 2"/>
+          <p:cNvSpPr>
+            <a:spLocks noGrp="1"/>
+          </p:cNvSpPr>
+          <p:nvPr>
+            <p:ph idx="1"/>
+          </p:nvPr>
+        </p:nvSpPr>
+        <p:spPr>
+          <a:xfrm>
+            <a:off x="457200" y="1124744"/>
+            <a:ext cx="8229600" cy="5040560"/>
+          </a:xfrm>
+          <a:effectLst>
+            <a:outerShdw blurRad="50800" dist="25400" dir="2700000" algn="tl" rotWithShape="0">
+              <a:prstClr val="black">
+                <a:alpha val="15000"/>
+              </a:prstClr>
+            </a:outerShdw>
+          </a:effectLst>
+        </p:spPr>
+        <p:txBody>
+          <a:bodyPr anchor="ctr" anchorCtr="0">
+            <a:normAutofit/>
+          </a:bodyPr>
+          <a:lstStyle/>
+          <a:p>
+            <a:pPr indent="0">
+              <a:lnSpc>
+                <a:spcPct val="110000"/>
+              </a:lnSpc>
+              <a:spcBef>
+                <a:spcPts val="0"/>
+              </a:spcBef>
+              <a:buNone/>
+            </a:pPr>
+            <a:endParaRPr lang="pt-PT" sz="3600" dirty="0" smtClean="0">
+              <a:solidFill>
+                <a:schemeClr val="tx1">
+                  <a:lumMod val="85000"/>
+                  <a:lumOff val="15000"/>
+                </a:schemeClr>
+              </a:solidFill>
+              <a:latin typeface="MetaSerif-Book" pitchFamily="34" charset="0"/>
+            </a:endParaRPr>
+          </a:p>
+        </p:txBody>
+      </p:sp>
+      <p:sp>
+        <p:nvSpPr>
+          <p:cNvPr id="4" name="Slide Number Placeholder 3"/>
+          <p:cNvSpPr>
+            <a:spLocks noGrp="1"/>
+          </p:cNvSpPr>
+          <p:nvPr>
+            <p:ph type="sldNum" sz="quarter" idx="12"/>
+          </p:nvPr>
+        </p:nvSpPr>
+        <p:spPr/>
+        <p:txBody>
+          <a:bodyPr/>
+          <a:lstStyle/>
+          <a:p>
+            <a:fld id="{AF2DD60D-AE1E-4B35-90D2-0ABAEDD7A6F5}" type="slidenum">
+              <a:rPr lang="pt-PT" smtClean="0"/>
+              <a:pPr/>
+              <a:t>9</a:t>
             </a:fld>
             <a:endParaRPr lang="pt-PT" dirty="0"/>
           </a:p>

</xml_diff>

<commit_message>
Modified front page image, added image for Introduction
</commit_message>
<xml_diff>
--- a/presentations/thesis.pptx
+++ b/presentations/thesis.pptx
@@ -3501,8 +3501,34 @@
         </p:blipFill>
         <p:spPr bwMode="auto">
           <a:xfrm>
-            <a:off x="1" y="1"/>
+            <a:off x="-1" y="0"/>
             <a:ext cx="9144001" cy="6858000"/>
+          </a:xfrm>
+          <a:prstGeom prst="rect">
+            <a:avLst/>
+          </a:prstGeom>
+          <a:noFill/>
+        </p:spPr>
+      </p:pic>
+      <p:pic>
+        <p:nvPicPr>
+          <p:cNvPr id="2050" name="Picture 2" descr="C:\Users\jgradim\Documents\thesis\presentations\building_framework_grayscale_blur.jpg"/>
+          <p:cNvPicPr>
+            <a:picLocks noChangeAspect="1" noChangeArrowheads="1"/>
+          </p:cNvPicPr>
+          <p:nvPr/>
+        </p:nvPicPr>
+        <p:blipFill>
+          <a:blip r:embed="rId3" cstate="print"/>
+          <a:srcRect/>
+          <a:stretch>
+            <a:fillRect/>
+          </a:stretch>
+        </p:blipFill>
+        <p:spPr bwMode="auto">
+          <a:xfrm>
+            <a:off x="0" y="0"/>
+            <a:ext cx="9144000" cy="6858000"/>
           </a:xfrm>
           <a:prstGeom prst="rect">
             <a:avLst/>
@@ -3833,30 +3859,6 @@
           </a:p>
         </p:txBody>
       </p:sp>
-      <p:sp>
-        <p:nvSpPr>
-          <p:cNvPr id="5" name="Slide Number Placeholder 4"/>
-          <p:cNvSpPr>
-            <a:spLocks noGrp="1"/>
-          </p:cNvSpPr>
-          <p:nvPr>
-            <p:ph type="sldNum" sz="quarter" idx="12"/>
-          </p:nvPr>
-        </p:nvSpPr>
-        <p:spPr/>
-        <p:txBody>
-          <a:bodyPr/>
-          <a:lstStyle/>
-          <a:p>
-            <a:fld id="{AF2DD60D-AE1E-4B35-90D2-0ABAEDD7A6F5}" type="slidenum">
-              <a:rPr lang="pt-PT" smtClean="0"/>
-              <a:pPr/>
-              <a:t>10</a:t>
-            </a:fld>
-            <a:endParaRPr lang="pt-PT" dirty="0"/>
-          </a:p>
-        </p:txBody>
-      </p:sp>
     </p:spTree>
   </p:cSld>
   <p:clrMapOvr>
@@ -4193,6 +4195,32 @@
           <a:chExt cx="0" cy="0"/>
         </a:xfrm>
       </p:grpSpPr>
+      <p:pic>
+        <p:nvPicPr>
+          <p:cNvPr id="1027" name="Picture 3" descr="C:\Users\jgradim\Documents\thesis\presentations\open_book.jpg"/>
+          <p:cNvPicPr>
+            <a:picLocks noChangeAspect="1" noChangeArrowheads="1"/>
+          </p:cNvPicPr>
+          <p:nvPr/>
+        </p:nvPicPr>
+        <p:blipFill>
+          <a:blip r:embed="rId2" cstate="print"/>
+          <a:srcRect l="10677"/>
+          <a:stretch>
+            <a:fillRect/>
+          </a:stretch>
+        </p:blipFill>
+        <p:spPr bwMode="auto">
+          <a:xfrm>
+            <a:off x="0" y="0"/>
+            <a:ext cx="9144000" cy="6858000"/>
+          </a:xfrm>
+          <a:prstGeom prst="rect">
+            <a:avLst/>
+          </a:prstGeom>
+          <a:noFill/>
+        </p:spPr>
+      </p:pic>
       <p:sp>
         <p:nvSpPr>
           <p:cNvPr id="2" name="Title 1"/>
@@ -4236,30 +4264,6 @@
               </a:solidFill>
               <a:latin typeface="League Gothic" pitchFamily="50" charset="0"/>
             </a:endParaRPr>
-          </a:p>
-        </p:txBody>
-      </p:sp>
-      <p:sp>
-        <p:nvSpPr>
-          <p:cNvPr id="5" name="Slide Number Placeholder 4"/>
-          <p:cNvSpPr>
-            <a:spLocks noGrp="1"/>
-          </p:cNvSpPr>
-          <p:nvPr>
-            <p:ph type="sldNum" sz="quarter" idx="12"/>
-          </p:nvPr>
-        </p:nvSpPr>
-        <p:spPr/>
-        <p:txBody>
-          <a:bodyPr/>
-          <a:lstStyle/>
-          <a:p>
-            <a:fld id="{AF2DD60D-AE1E-4B35-90D2-0ABAEDD7A6F5}" type="slidenum">
-              <a:rPr lang="pt-PT" smtClean="0"/>
-              <a:pPr/>
-              <a:t>2</a:t>
-            </a:fld>
-            <a:endParaRPr lang="pt-PT" dirty="0"/>
           </a:p>
         </p:txBody>
       </p:sp>
@@ -4560,30 +4564,6 @@
           </a:p>
         </p:txBody>
       </p:sp>
-      <p:sp>
-        <p:nvSpPr>
-          <p:cNvPr id="5" name="Slide Number Placeholder 4"/>
-          <p:cNvSpPr>
-            <a:spLocks noGrp="1"/>
-          </p:cNvSpPr>
-          <p:nvPr>
-            <p:ph type="sldNum" sz="quarter" idx="12"/>
-          </p:nvPr>
-        </p:nvSpPr>
-        <p:spPr/>
-        <p:txBody>
-          <a:bodyPr/>
-          <a:lstStyle/>
-          <a:p>
-            <a:fld id="{AF2DD60D-AE1E-4B35-90D2-0ABAEDD7A6F5}" type="slidenum">
-              <a:rPr lang="pt-PT" smtClean="0"/>
-              <a:pPr/>
-              <a:t>4</a:t>
-            </a:fld>
-            <a:endParaRPr lang="pt-PT" dirty="0"/>
-          </a:p>
-        </p:txBody>
-      </p:sp>
     </p:spTree>
   </p:cSld>
   <p:clrMapOvr>
@@ -4688,30 +4668,6 @@
           </a:p>
         </p:txBody>
       </p:sp>
-      <p:sp>
-        <p:nvSpPr>
-          <p:cNvPr id="5" name="Slide Number Placeholder 4"/>
-          <p:cNvSpPr>
-            <a:spLocks noGrp="1"/>
-          </p:cNvSpPr>
-          <p:nvPr>
-            <p:ph type="sldNum" sz="quarter" idx="12"/>
-          </p:nvPr>
-        </p:nvSpPr>
-        <p:spPr/>
-        <p:txBody>
-          <a:bodyPr/>
-          <a:lstStyle/>
-          <a:p>
-            <a:fld id="{AF2DD60D-AE1E-4B35-90D2-0ABAEDD7A6F5}" type="slidenum">
-              <a:rPr lang="pt-PT" smtClean="0"/>
-              <a:pPr/>
-              <a:t>5</a:t>
-            </a:fld>
-            <a:endParaRPr lang="pt-PT" dirty="0"/>
-          </a:p>
-        </p:txBody>
-      </p:sp>
     </p:spTree>
   </p:cSld>
   <p:clrMapOvr>
@@ -4840,15 +4796,6 @@
               </a:rPr>
               <a:t>AOM architectures provide the best framework for building adaptable software systems</a:t>
             </a:r>
-            <a:endParaRPr lang="pt-PT" sz="3600" dirty="0" smtClean="0">
-              <a:solidFill>
-                <a:schemeClr val="tx1">
-                  <a:lumMod val="85000"/>
-                  <a:lumOff val="15000"/>
-                </a:schemeClr>
-              </a:solidFill>
-              <a:latin typeface="MetaSerif-Book" pitchFamily="34" charset="0"/>
-            </a:endParaRPr>
           </a:p>
         </p:txBody>
       </p:sp>
@@ -5004,15 +4951,6 @@
               </a:rPr>
               <a:t>MVC architecture used by Rails can coexist harmoniously with AOM design patterns, especially </a:t>
             </a:r>
-            <a:endParaRPr lang="pt-PT" sz="3600" dirty="0" smtClean="0">
-              <a:solidFill>
-                <a:schemeClr val="tx1">
-                  <a:lumMod val="85000"/>
-                  <a:lumOff val="15000"/>
-                </a:schemeClr>
-              </a:solidFill>
-              <a:latin typeface="MetaSerif-Book" pitchFamily="34" charset="0"/>
-            </a:endParaRPr>
           </a:p>
         </p:txBody>
       </p:sp>

</xml_diff>

<commit_message>
Added image for 'Approach & Results'
</commit_message>
<xml_diff>
--- a/presentations/thesis.pptx
+++ b/presentations/thesis.pptx
@@ -5,21 +5,22 @@
     <p:sldMasterId id="2147483648" r:id="rId1"/>
   </p:sldMasterIdLst>
   <p:notesMasterIdLst>
-    <p:notesMasterId r:id="rId14"/>
+    <p:notesMasterId r:id="rId15"/>
   </p:notesMasterIdLst>
   <p:sldIdLst>
     <p:sldId id="256" r:id="rId2"/>
     <p:sldId id="257" r:id="rId3"/>
     <p:sldId id="258" r:id="rId4"/>
     <p:sldId id="260" r:id="rId5"/>
-    <p:sldId id="259" r:id="rId6"/>
-    <p:sldId id="263" r:id="rId7"/>
-    <p:sldId id="264" r:id="rId8"/>
-    <p:sldId id="269" r:id="rId9"/>
-    <p:sldId id="270" r:id="rId10"/>
-    <p:sldId id="266" r:id="rId11"/>
-    <p:sldId id="267" r:id="rId12"/>
-    <p:sldId id="268" r:id="rId13"/>
+    <p:sldId id="271" r:id="rId6"/>
+    <p:sldId id="259" r:id="rId7"/>
+    <p:sldId id="263" r:id="rId8"/>
+    <p:sldId id="264" r:id="rId9"/>
+    <p:sldId id="269" r:id="rId10"/>
+    <p:sldId id="270" r:id="rId11"/>
+    <p:sldId id="266" r:id="rId12"/>
+    <p:sldId id="267" r:id="rId13"/>
+    <p:sldId id="268" r:id="rId14"/>
   </p:sldIdLst>
   <p:sldSz cx="9144000" cy="6858000" type="screen4x3"/>
   <p:notesSz cx="6858000" cy="9144000"/>
@@ -3825,8 +3826,8 @@
         </p:nvSpPr>
         <p:spPr>
           <a:xfrm>
-            <a:off x="0" y="2941730"/>
-            <a:ext cx="4644008" cy="974540"/>
+            <a:off x="5868144" y="188640"/>
+            <a:ext cx="3275856" cy="706090"/>
           </a:xfrm>
           <a:solidFill>
             <a:schemeClr val="tx1">
@@ -3835,27 +3836,101 @@
           </a:solidFill>
         </p:spPr>
         <p:txBody>
-          <a:bodyPr lIns="360000">
-            <a:noAutofit/>
+          <a:bodyPr rIns="144000">
+            <a:normAutofit/>
           </a:bodyPr>
           <a:lstStyle/>
           <a:p>
-            <a:pPr algn="l"/>
-            <a:r>
-              <a:rPr lang="pt-PT" sz="5400" dirty="0" smtClean="0">
+            <a:pPr algn="r"/>
+            <a:r>
+              <a:rPr lang="pt-PT" sz="3200" dirty="0" smtClean="0">
                 <a:solidFill>
                   <a:schemeClr val="bg1"/>
                 </a:solidFill>
                 <a:latin typeface="League Gothic" pitchFamily="50" charset="0"/>
               </a:rPr>
-              <a:t>Further Work</a:t>
-            </a:r>
-            <a:endParaRPr lang="pt-PT" sz="5400" dirty="0">
+              <a:t>Performance</a:t>
+            </a:r>
+            <a:endParaRPr lang="pt-PT" sz="3200" dirty="0">
               <a:solidFill>
                 <a:schemeClr val="bg1"/>
               </a:solidFill>
               <a:latin typeface="League Gothic" pitchFamily="50" charset="0"/>
             </a:endParaRPr>
+          </a:p>
+        </p:txBody>
+      </p:sp>
+      <p:sp>
+        <p:nvSpPr>
+          <p:cNvPr id="3" name="Content Placeholder 2"/>
+          <p:cNvSpPr>
+            <a:spLocks noGrp="1"/>
+          </p:cNvSpPr>
+          <p:nvPr>
+            <p:ph idx="1"/>
+          </p:nvPr>
+        </p:nvSpPr>
+        <p:spPr>
+          <a:xfrm>
+            <a:off x="457200" y="1124744"/>
+            <a:ext cx="8229600" cy="5040560"/>
+          </a:xfrm>
+          <a:effectLst>
+            <a:outerShdw blurRad="50800" dist="25400" dir="2700000" algn="tl" rotWithShape="0">
+              <a:prstClr val="black">
+                <a:alpha val="15000"/>
+              </a:prstClr>
+            </a:outerShdw>
+          </a:effectLst>
+        </p:spPr>
+        <p:txBody>
+          <a:bodyPr anchor="ctr" anchorCtr="0">
+            <a:normAutofit/>
+          </a:bodyPr>
+          <a:lstStyle/>
+          <a:p>
+            <a:pPr indent="0">
+              <a:lnSpc>
+                <a:spcPct val="110000"/>
+              </a:lnSpc>
+              <a:spcBef>
+                <a:spcPts val="0"/>
+              </a:spcBef>
+              <a:buNone/>
+            </a:pPr>
+            <a:endParaRPr lang="pt-PT" sz="3600" dirty="0" smtClean="0">
+              <a:solidFill>
+                <a:schemeClr val="tx1">
+                  <a:lumMod val="85000"/>
+                  <a:lumOff val="15000"/>
+                </a:schemeClr>
+              </a:solidFill>
+              <a:latin typeface="MetaSerif-Book" pitchFamily="34" charset="0"/>
+            </a:endParaRPr>
+          </a:p>
+        </p:txBody>
+      </p:sp>
+      <p:sp>
+        <p:nvSpPr>
+          <p:cNvPr id="4" name="Slide Number Placeholder 3"/>
+          <p:cNvSpPr>
+            <a:spLocks noGrp="1"/>
+          </p:cNvSpPr>
+          <p:nvPr>
+            <p:ph type="sldNum" sz="quarter" idx="12"/>
+          </p:nvPr>
+        </p:nvSpPr>
+        <p:spPr/>
+        <p:txBody>
+          <a:bodyPr/>
+          <a:lstStyle/>
+          <a:p>
+            <a:fld id="{AF2DD60D-AE1E-4B35-90D2-0ABAEDD7A6F5}" type="slidenum">
+              <a:rPr lang="pt-PT" smtClean="0"/>
+              <a:pPr/>
+              <a:t>10</a:t>
+            </a:fld>
+            <a:endParaRPr lang="pt-PT" dirty="0"/>
           </a:p>
         </p:txBody>
       </p:sp>
@@ -3903,8 +3978,8 @@
         </p:nvSpPr>
         <p:spPr>
           <a:xfrm>
-            <a:off x="5868144" y="188640"/>
-            <a:ext cx="3275856" cy="706090"/>
+            <a:off x="0" y="2941730"/>
+            <a:ext cx="4644008" cy="974540"/>
           </a:xfrm>
           <a:solidFill>
             <a:schemeClr val="tx1">
@@ -3913,101 +3988,27 @@
           </a:solidFill>
         </p:spPr>
         <p:txBody>
-          <a:bodyPr rIns="144000">
-            <a:normAutofit/>
+          <a:bodyPr lIns="360000">
+            <a:noAutofit/>
           </a:bodyPr>
           <a:lstStyle/>
           <a:p>
-            <a:pPr algn="r"/>
-            <a:r>
-              <a:rPr lang="pt-PT" sz="3200" dirty="0" smtClean="0">
+            <a:pPr algn="l"/>
+            <a:r>
+              <a:rPr lang="pt-PT" sz="5400" dirty="0" smtClean="0">
                 <a:solidFill>
                   <a:schemeClr val="bg1"/>
                 </a:solidFill>
                 <a:latin typeface="League Gothic" pitchFamily="50" charset="0"/>
               </a:rPr>
-              <a:t>Implementation</a:t>
-            </a:r>
-            <a:endParaRPr lang="pt-PT" sz="3200" dirty="0">
+              <a:t>Further Work</a:t>
+            </a:r>
+            <a:endParaRPr lang="pt-PT" sz="5400" dirty="0">
               <a:solidFill>
                 <a:schemeClr val="bg1"/>
               </a:solidFill>
               <a:latin typeface="League Gothic" pitchFamily="50" charset="0"/>
             </a:endParaRPr>
-          </a:p>
-        </p:txBody>
-      </p:sp>
-      <p:sp>
-        <p:nvSpPr>
-          <p:cNvPr id="3" name="Content Placeholder 2"/>
-          <p:cNvSpPr>
-            <a:spLocks noGrp="1"/>
-          </p:cNvSpPr>
-          <p:nvPr>
-            <p:ph idx="1"/>
-          </p:nvPr>
-        </p:nvSpPr>
-        <p:spPr>
-          <a:xfrm>
-            <a:off x="457200" y="1124744"/>
-            <a:ext cx="8229600" cy="5040560"/>
-          </a:xfrm>
-          <a:effectLst>
-            <a:outerShdw blurRad="50800" dist="25400" dir="2700000" algn="tl" rotWithShape="0">
-              <a:prstClr val="black">
-                <a:alpha val="15000"/>
-              </a:prstClr>
-            </a:outerShdw>
-          </a:effectLst>
-        </p:spPr>
-        <p:txBody>
-          <a:bodyPr anchor="ctr" anchorCtr="0">
-            <a:normAutofit/>
-          </a:bodyPr>
-          <a:lstStyle/>
-          <a:p>
-            <a:pPr indent="0">
-              <a:lnSpc>
-                <a:spcPct val="110000"/>
-              </a:lnSpc>
-              <a:spcBef>
-                <a:spcPts val="0"/>
-              </a:spcBef>
-              <a:buNone/>
-            </a:pPr>
-            <a:endParaRPr lang="pt-PT" sz="3600" dirty="0" smtClean="0">
-              <a:solidFill>
-                <a:schemeClr val="tx1">
-                  <a:lumMod val="85000"/>
-                  <a:lumOff val="15000"/>
-                </a:schemeClr>
-              </a:solidFill>
-              <a:latin typeface="MetaSerif-Book" pitchFamily="34" charset="0"/>
-            </a:endParaRPr>
-          </a:p>
-        </p:txBody>
-      </p:sp>
-      <p:sp>
-        <p:nvSpPr>
-          <p:cNvPr id="4" name="Slide Number Placeholder 3"/>
-          <p:cNvSpPr>
-            <a:spLocks noGrp="1"/>
-          </p:cNvSpPr>
-          <p:nvPr>
-            <p:ph type="sldNum" sz="quarter" idx="12"/>
-          </p:nvPr>
-        </p:nvSpPr>
-        <p:spPr/>
-        <p:txBody>
-          <a:bodyPr/>
-          <a:lstStyle/>
-          <a:p>
-            <a:fld id="{AF2DD60D-AE1E-4B35-90D2-0ABAEDD7A6F5}" type="slidenum">
-              <a:rPr lang="pt-PT" smtClean="0"/>
-              <a:pPr/>
-              <a:t>11</a:t>
-            </a:fld>
-            <a:endParaRPr lang="pt-PT" dirty="0"/>
           </a:p>
         </p:txBody>
       </p:sp>
@@ -4078,7 +4079,7 @@
                 </a:solidFill>
                 <a:latin typeface="League Gothic" pitchFamily="50" charset="0"/>
               </a:rPr>
-              <a:t>Performance</a:t>
+              <a:t>Implementation</a:t>
             </a:r>
             <a:endParaRPr lang="pt-PT" sz="3200" dirty="0">
               <a:solidFill>
@@ -4158,6 +4159,158 @@
               <a:rPr lang="pt-PT" smtClean="0"/>
               <a:pPr/>
               <a:t>12</a:t>
+            </a:fld>
+            <a:endParaRPr lang="pt-PT" dirty="0"/>
+          </a:p>
+        </p:txBody>
+      </p:sp>
+    </p:spTree>
+  </p:cSld>
+  <p:clrMapOvr>
+    <a:masterClrMapping/>
+  </p:clrMapOvr>
+  <p:timing>
+    <p:tnLst>
+      <p:par>
+        <p:cTn id="1" dur="indefinite" restart="never" nodeType="tmRoot"/>
+      </p:par>
+    </p:tnLst>
+  </p:timing>
+</p:sld>
+</file>
+
+<file path=ppt/slides/slide13.xml><?xml version="1.0" encoding="utf-8"?>
+<p:sld xmlns:a="http://schemas.openxmlformats.org/drawingml/2006/main" xmlns:r="http://schemas.openxmlformats.org/officeDocument/2006/relationships" xmlns:p="http://schemas.openxmlformats.org/presentationml/2006/main">
+  <p:cSld>
+    <p:spTree>
+      <p:nvGrpSpPr>
+        <p:cNvPr id="1" name=""/>
+        <p:cNvGrpSpPr/>
+        <p:nvPr/>
+      </p:nvGrpSpPr>
+      <p:grpSpPr>
+        <a:xfrm>
+          <a:off x="0" y="0"/>
+          <a:ext cx="0" cy="0"/>
+          <a:chOff x="0" y="0"/>
+          <a:chExt cx="0" cy="0"/>
+        </a:xfrm>
+      </p:grpSpPr>
+      <p:sp>
+        <p:nvSpPr>
+          <p:cNvPr id="2" name="Title 1"/>
+          <p:cNvSpPr>
+            <a:spLocks noGrp="1"/>
+          </p:cNvSpPr>
+          <p:nvPr>
+            <p:ph type="title"/>
+          </p:nvPr>
+        </p:nvSpPr>
+        <p:spPr>
+          <a:xfrm>
+            <a:off x="5868144" y="188640"/>
+            <a:ext cx="3275856" cy="706090"/>
+          </a:xfrm>
+          <a:solidFill>
+            <a:schemeClr val="tx1">
+              <a:alpha val="90000"/>
+            </a:schemeClr>
+          </a:solidFill>
+        </p:spPr>
+        <p:txBody>
+          <a:bodyPr rIns="144000">
+            <a:normAutofit/>
+          </a:bodyPr>
+          <a:lstStyle/>
+          <a:p>
+            <a:pPr algn="r"/>
+            <a:r>
+              <a:rPr lang="pt-PT" sz="3200" dirty="0" smtClean="0">
+                <a:solidFill>
+                  <a:schemeClr val="bg1"/>
+                </a:solidFill>
+                <a:latin typeface="League Gothic" pitchFamily="50" charset="0"/>
+              </a:rPr>
+              <a:t>Performance</a:t>
+            </a:r>
+            <a:endParaRPr lang="pt-PT" sz="3200" dirty="0">
+              <a:solidFill>
+                <a:schemeClr val="bg1"/>
+              </a:solidFill>
+              <a:latin typeface="League Gothic" pitchFamily="50" charset="0"/>
+            </a:endParaRPr>
+          </a:p>
+        </p:txBody>
+      </p:sp>
+      <p:sp>
+        <p:nvSpPr>
+          <p:cNvPr id="3" name="Content Placeholder 2"/>
+          <p:cNvSpPr>
+            <a:spLocks noGrp="1"/>
+          </p:cNvSpPr>
+          <p:nvPr>
+            <p:ph idx="1"/>
+          </p:nvPr>
+        </p:nvSpPr>
+        <p:spPr>
+          <a:xfrm>
+            <a:off x="457200" y="1124744"/>
+            <a:ext cx="8229600" cy="5040560"/>
+          </a:xfrm>
+          <a:effectLst>
+            <a:outerShdw blurRad="50800" dist="25400" dir="2700000" algn="tl" rotWithShape="0">
+              <a:prstClr val="black">
+                <a:alpha val="15000"/>
+              </a:prstClr>
+            </a:outerShdw>
+          </a:effectLst>
+        </p:spPr>
+        <p:txBody>
+          <a:bodyPr anchor="ctr" anchorCtr="0">
+            <a:normAutofit/>
+          </a:bodyPr>
+          <a:lstStyle/>
+          <a:p>
+            <a:pPr indent="0">
+              <a:lnSpc>
+                <a:spcPct val="110000"/>
+              </a:lnSpc>
+              <a:spcBef>
+                <a:spcPts val="0"/>
+              </a:spcBef>
+              <a:buNone/>
+            </a:pPr>
+            <a:endParaRPr lang="pt-PT" sz="3600" dirty="0" smtClean="0">
+              <a:solidFill>
+                <a:schemeClr val="tx1">
+                  <a:lumMod val="85000"/>
+                  <a:lumOff val="15000"/>
+                </a:schemeClr>
+              </a:solidFill>
+              <a:latin typeface="MetaSerif-Book" pitchFamily="34" charset="0"/>
+            </a:endParaRPr>
+          </a:p>
+        </p:txBody>
+      </p:sp>
+      <p:sp>
+        <p:nvSpPr>
+          <p:cNvPr id="4" name="Slide Number Placeholder 3"/>
+          <p:cNvSpPr>
+            <a:spLocks noGrp="1"/>
+          </p:cNvSpPr>
+          <p:nvPr>
+            <p:ph type="sldNum" sz="quarter" idx="12"/>
+          </p:nvPr>
+        </p:nvSpPr>
+        <p:spPr/>
+        <p:txBody>
+          <a:bodyPr/>
+          <a:lstStyle/>
+          <a:p>
+            <a:fld id="{AF2DD60D-AE1E-4B35-90D2-0ABAEDD7A6F5}" type="slidenum">
+              <a:rPr lang="pt-PT" smtClean="0"/>
+              <a:pPr/>
+              <a:t>13</a:t>
             </a:fld>
             <a:endParaRPr lang="pt-PT" dirty="0"/>
           </a:p>
@@ -4598,7 +4751,7 @@
       </p:grpSpPr>
       <p:pic>
         <p:nvPicPr>
-          <p:cNvPr id="3074" name="Picture 2" descr="C:\Users\jgradim\Documents\thesis\presentations\old_books.jpg"/>
+          <p:cNvPr id="1026" name="Picture 2" descr="C:\Users\jgradim\Documents\thesis\presentations\work.jpg"/>
           <p:cNvPicPr>
             <a:picLocks noChangeAspect="1" noChangeArrowheads="1"/>
           </p:cNvPicPr>
@@ -4606,7 +4759,7 @@
         </p:nvPicPr>
         <p:blipFill>
           <a:blip r:embed="rId2" cstate="print"/>
-          <a:srcRect r="11066"/>
+          <a:srcRect r="11068"/>
           <a:stretch>
             <a:fillRect/>
           </a:stretch>
@@ -4657,7 +4810,7 @@
                 </a:solidFill>
                 <a:latin typeface="League Gothic" pitchFamily="50" charset="0"/>
               </a:rPr>
-              <a:t>Conclusions</a:t>
+              <a:t>Approach &amp; Results</a:t>
             </a:r>
             <a:endParaRPr lang="pt-PT" sz="5400" dirty="0">
               <a:solidFill>
@@ -4700,6 +4853,32 @@
           <a:chExt cx="0" cy="0"/>
         </a:xfrm>
       </p:grpSpPr>
+      <p:pic>
+        <p:nvPicPr>
+          <p:cNvPr id="3074" name="Picture 2" descr="C:\Users\jgradim\Documents\thesis\presentations\old_books.jpg"/>
+          <p:cNvPicPr>
+            <a:picLocks noChangeAspect="1" noChangeArrowheads="1"/>
+          </p:cNvPicPr>
+          <p:nvPr/>
+        </p:nvPicPr>
+        <p:blipFill>
+          <a:blip r:embed="rId2" cstate="print"/>
+          <a:srcRect r="11066"/>
+          <a:stretch>
+            <a:fillRect/>
+          </a:stretch>
+        </p:blipFill>
+        <p:spPr bwMode="auto">
+          <a:xfrm>
+            <a:off x="0" y="0"/>
+            <a:ext cx="9144000" cy="6858000"/>
+          </a:xfrm>
+          <a:prstGeom prst="rect">
+            <a:avLst/>
+          </a:prstGeom>
+          <a:noFill/>
+        </p:spPr>
+      </p:pic>
       <p:sp>
         <p:nvSpPr>
           <p:cNvPr id="2" name="Title 1"/>
@@ -4712,8 +4891,8 @@
         </p:nvSpPr>
         <p:spPr>
           <a:xfrm>
-            <a:off x="5868144" y="188640"/>
-            <a:ext cx="3275856" cy="706090"/>
+            <a:off x="0" y="2941730"/>
+            <a:ext cx="4644008" cy="974540"/>
           </a:xfrm>
           <a:solidFill>
             <a:schemeClr val="tx1">
@@ -4722,104 +4901,27 @@
           </a:solidFill>
         </p:spPr>
         <p:txBody>
-          <a:bodyPr rIns="144000">
-            <a:normAutofit/>
+          <a:bodyPr lIns="360000">
+            <a:noAutofit/>
           </a:bodyPr>
           <a:lstStyle/>
           <a:p>
-            <a:pPr algn="r"/>
-            <a:r>
-              <a:rPr lang="pt-PT" sz="3200" dirty="0" smtClean="0">
+            <a:pPr algn="l"/>
+            <a:r>
+              <a:rPr lang="pt-PT" sz="5400" dirty="0" smtClean="0">
                 <a:solidFill>
                   <a:schemeClr val="bg1"/>
                 </a:solidFill>
                 <a:latin typeface="League Gothic" pitchFamily="50" charset="0"/>
               </a:rPr>
-              <a:t>AOMs</a:t>
-            </a:r>
-            <a:endParaRPr lang="pt-PT" sz="3200" dirty="0">
+              <a:t>Conclusions</a:t>
+            </a:r>
+            <a:endParaRPr lang="pt-PT" sz="5400" dirty="0">
               <a:solidFill>
                 <a:schemeClr val="bg1"/>
               </a:solidFill>
               <a:latin typeface="League Gothic" pitchFamily="50" charset="0"/>
             </a:endParaRPr>
-          </a:p>
-        </p:txBody>
-      </p:sp>
-      <p:sp>
-        <p:nvSpPr>
-          <p:cNvPr id="3" name="Content Placeholder 2"/>
-          <p:cNvSpPr>
-            <a:spLocks noGrp="1"/>
-          </p:cNvSpPr>
-          <p:nvPr>
-            <p:ph idx="1"/>
-          </p:nvPr>
-        </p:nvSpPr>
-        <p:spPr>
-          <a:xfrm>
-            <a:off x="457200" y="1124744"/>
-            <a:ext cx="8229600" cy="5040560"/>
-          </a:xfrm>
-          <a:effectLst>
-            <a:outerShdw blurRad="50800" dist="25400" dir="2700000" algn="tl" rotWithShape="0">
-              <a:prstClr val="black">
-                <a:alpha val="15000"/>
-              </a:prstClr>
-            </a:outerShdw>
-          </a:effectLst>
-        </p:spPr>
-        <p:txBody>
-          <a:bodyPr anchor="ctr" anchorCtr="0">
-            <a:normAutofit/>
-          </a:bodyPr>
-          <a:lstStyle/>
-          <a:p>
-            <a:pPr indent="0">
-              <a:lnSpc>
-                <a:spcPct val="110000"/>
-              </a:lnSpc>
-              <a:spcBef>
-                <a:spcPts val="0"/>
-              </a:spcBef>
-              <a:buNone/>
-            </a:pPr>
-            <a:r>
-              <a:rPr lang="pt-PT" sz="3600" dirty="0" smtClean="0">
-                <a:solidFill>
-                  <a:schemeClr val="tx1">
-                    <a:lumMod val="85000"/>
-                    <a:lumOff val="15000"/>
-                  </a:schemeClr>
-                </a:solidFill>
-                <a:latin typeface="MetaSerif-Book" pitchFamily="34" charset="0"/>
-              </a:rPr>
-              <a:t>AOM architectures provide the best framework for building adaptable software systems</a:t>
-            </a:r>
-          </a:p>
-        </p:txBody>
-      </p:sp>
-      <p:sp>
-        <p:nvSpPr>
-          <p:cNvPr id="4" name="Slide Number Placeholder 3"/>
-          <p:cNvSpPr>
-            <a:spLocks noGrp="1"/>
-          </p:cNvSpPr>
-          <p:nvPr>
-            <p:ph type="sldNum" sz="quarter" idx="12"/>
-          </p:nvPr>
-        </p:nvSpPr>
-        <p:spPr/>
-        <p:txBody>
-          <a:bodyPr/>
-          <a:lstStyle/>
-          <a:p>
-            <a:fld id="{AF2DD60D-AE1E-4B35-90D2-0ABAEDD7A6F5}" type="slidenum">
-              <a:rPr lang="pt-PT" smtClean="0"/>
-              <a:pPr/>
-              <a:t>6</a:t>
-            </a:fld>
-            <a:endParaRPr lang="pt-PT" dirty="0"/>
           </a:p>
         </p:txBody>
       </p:sp>
@@ -4890,7 +4992,7 @@
                 </a:solidFill>
                 <a:latin typeface="League Gothic" pitchFamily="50" charset="0"/>
               </a:rPr>
-              <a:t>Rails &amp; MVC</a:t>
+              <a:t>AOMs</a:t>
             </a:r>
             <a:endParaRPr lang="pt-PT" sz="3200" dirty="0">
               <a:solidFill>
@@ -4949,7 +5051,7 @@
                 </a:solidFill>
                 <a:latin typeface="MetaSerif-Book" pitchFamily="34" charset="0"/>
               </a:rPr>
-              <a:t>MVC architecture used by Rails can coexist harmoniously with AOM design patterns, especially </a:t>
+              <a:t>AOM architectures provide the best framework for building adaptable software systems</a:t>
             </a:r>
           </a:p>
         </p:txBody>
@@ -5045,7 +5147,7 @@
                 </a:solidFill>
                 <a:latin typeface="League Gothic" pitchFamily="50" charset="0"/>
               </a:rPr>
-              <a:t>Variability</a:t>
+              <a:t>Rails &amp; MVC</a:t>
             </a:r>
             <a:endParaRPr lang="pt-PT" sz="3200" dirty="0">
               <a:solidFill>
@@ -5094,15 +5196,18 @@
               </a:spcBef>
               <a:buNone/>
             </a:pPr>
-            <a:endParaRPr lang="pt-PT" sz="3600" dirty="0" smtClean="0">
-              <a:solidFill>
-                <a:schemeClr val="tx1">
-                  <a:lumMod val="85000"/>
-                  <a:lumOff val="15000"/>
-                </a:schemeClr>
-              </a:solidFill>
-              <a:latin typeface="MetaSerif-Book" pitchFamily="34" charset="0"/>
-            </a:endParaRPr>
+            <a:r>
+              <a:rPr lang="pt-PT" sz="3600" dirty="0" smtClean="0">
+                <a:solidFill>
+                  <a:schemeClr val="tx1">
+                    <a:lumMod val="85000"/>
+                    <a:lumOff val="15000"/>
+                  </a:schemeClr>
+                </a:solidFill>
+                <a:latin typeface="MetaSerif-Book" pitchFamily="34" charset="0"/>
+              </a:rPr>
+              <a:t>MVC architecture used by Rails can coexist harmoniously with AOM design patterns, especially </a:t>
+            </a:r>
           </a:p>
         </p:txBody>
       </p:sp>
@@ -5197,7 +5302,7 @@
                 </a:solidFill>
                 <a:latin typeface="League Gothic" pitchFamily="50" charset="0"/>
               </a:rPr>
-              <a:t>Performance</a:t>
+              <a:t>Variability</a:t>
             </a:r>
             <a:endParaRPr lang="pt-PT" sz="3200" dirty="0">
               <a:solidFill>

</xml_diff>

<commit_message>
Added image for 'Further Work'
</commit_message>
<xml_diff>
--- a/presentations/thesis.pptx
+++ b/presentations/thesis.pptx
@@ -3898,6 +3898,18 @@
               </a:spcBef>
               <a:buNone/>
             </a:pPr>
+            <a:r>
+              <a:rPr lang="pt-PT" sz="3600" smtClean="0">
+                <a:solidFill>
+                  <a:schemeClr val="tx1">
+                    <a:lumMod val="85000"/>
+                    <a:lumOff val="15000"/>
+                  </a:schemeClr>
+                </a:solidFill>
+                <a:latin typeface="MetaSerif-Book" pitchFamily="34" charset="0"/>
+              </a:rPr>
+              <a:t>Performance can be increased</a:t>
+            </a:r>
             <a:endParaRPr lang="pt-PT" sz="3600" dirty="0" smtClean="0">
               <a:solidFill>
                 <a:schemeClr val="tx1">
@@ -3966,6 +3978,32 @@
           <a:chExt cx="0" cy="0"/>
         </a:xfrm>
       </p:grpSpPr>
+      <p:pic>
+        <p:nvPicPr>
+          <p:cNvPr id="3076" name="Picture 4" descr="C:\Users\jgradim\Documents\thesis\presentations\death_star.jpg"/>
+          <p:cNvPicPr>
+            <a:picLocks noChangeAspect="1" noChangeArrowheads="1"/>
+          </p:cNvPicPr>
+          <p:nvPr/>
+        </p:nvPicPr>
+        <p:blipFill>
+          <a:blip r:embed="rId2" cstate="print"/>
+          <a:srcRect r="2083"/>
+          <a:stretch>
+            <a:fillRect/>
+          </a:stretch>
+        </p:blipFill>
+        <p:spPr bwMode="auto">
+          <a:xfrm>
+            <a:off x="0" y="0"/>
+            <a:ext cx="9144000" cy="6858000"/>
+          </a:xfrm>
+          <a:prstGeom prst="rect">
+            <a:avLst/>
+          </a:prstGeom>
+          <a:noFill/>
+        </p:spPr>
+      </p:pic>
       <p:sp>
         <p:nvSpPr>
           <p:cNvPr id="2" name="Title 1"/>
@@ -4639,7 +4677,7 @@
       </p:grpSpPr>
       <p:pic>
         <p:nvPicPr>
-          <p:cNvPr id="4" name="Picture 2" descr="C:\Users\jgradim\Documents\thesis\presentations\cameras.jpg"/>
+          <p:cNvPr id="6" name="Picture 2" descr="C:\Users\jgradim\Documents\thesis\presentations\cameras.jpg"/>
           <p:cNvPicPr>
             <a:picLocks noChangeAspect="1" noChangeArrowheads="1"/>
           </p:cNvPicPr>
@@ -4664,6 +4702,32 @@
           <a:xfrm>
             <a:off x="0" y="0"/>
             <a:ext cx="9144000" cy="6858000"/>
+          </a:xfrm>
+          <a:prstGeom prst="rect">
+            <a:avLst/>
+          </a:prstGeom>
+          <a:noFill/>
+        </p:spPr>
+      </p:pic>
+      <p:pic>
+        <p:nvPicPr>
+          <p:cNvPr id="2052" name="Picture 4" descr="C:\Users\jgradim\Documents\thesis\presentations\2171414516_effb7ef705_b.jpg"/>
+          <p:cNvPicPr>
+            <a:picLocks noChangeAspect="1" noChangeArrowheads="1"/>
+          </p:cNvPicPr>
+          <p:nvPr/>
+        </p:nvPicPr>
+        <p:blipFill>
+          <a:blip r:embed="rId3" cstate="print"/>
+          <a:srcRect l="10756"/>
+          <a:stretch>
+            <a:fillRect/>
+          </a:stretch>
+        </p:blipFill>
+        <p:spPr bwMode="auto">
+          <a:xfrm>
+            <a:off x="0" y="0"/>
+            <a:ext cx="9180512" cy="6858000"/>
           </a:xfrm>
           <a:prstGeom prst="rect">
             <a:avLst/>
@@ -5206,8 +5270,29 @@
                 </a:solidFill>
                 <a:latin typeface="MetaSerif-Book" pitchFamily="34" charset="0"/>
               </a:rPr>
-              <a:t>MVC architecture used by Rails can coexist harmoniously with AOM design patterns, especially </a:t>
-            </a:r>
+              <a:t>MVC architecture used by Rails can coexist harmoniously with AOM design patterns, </a:t>
+            </a:r>
+            <a:r>
+              <a:rPr lang="pt-PT" sz="3600" dirty="0" smtClean="0">
+                <a:solidFill>
+                  <a:schemeClr val="tx1">
+                    <a:lumMod val="85000"/>
+                    <a:lumOff val="15000"/>
+                  </a:schemeClr>
+                </a:solidFill>
+                <a:latin typeface="MetaSerif-Book" pitchFamily="34" charset="0"/>
+              </a:rPr>
+              <a:t>especially with the AR engine</a:t>
+            </a:r>
+            <a:endParaRPr lang="pt-PT" sz="3600" dirty="0" smtClean="0">
+              <a:solidFill>
+                <a:schemeClr val="tx1">
+                  <a:lumMod val="85000"/>
+                  <a:lumOff val="15000"/>
+                </a:schemeClr>
+              </a:solidFill>
+              <a:latin typeface="MetaSerif-Book" pitchFamily="34" charset="0"/>
+            </a:endParaRPr>
           </a:p>
         </p:txBody>
       </p:sp>

</xml_diff>

<commit_message>
Some more formating and content
</commit_message>
<xml_diff>
--- a/presentations/thesis.pptx
+++ b/presentations/thesis.pptx
@@ -5,22 +5,28 @@
     <p:sldMasterId id="2147483648" r:id="rId1"/>
   </p:sldMasterIdLst>
   <p:notesMasterIdLst>
-    <p:notesMasterId r:id="rId15"/>
+    <p:notesMasterId r:id="rId21"/>
   </p:notesMasterIdLst>
   <p:sldIdLst>
     <p:sldId id="256" r:id="rId2"/>
     <p:sldId id="257" r:id="rId3"/>
     <p:sldId id="258" r:id="rId4"/>
-    <p:sldId id="260" r:id="rId5"/>
-    <p:sldId id="271" r:id="rId6"/>
-    <p:sldId id="259" r:id="rId7"/>
-    <p:sldId id="263" r:id="rId8"/>
-    <p:sldId id="264" r:id="rId9"/>
-    <p:sldId id="269" r:id="rId10"/>
-    <p:sldId id="270" r:id="rId11"/>
-    <p:sldId id="266" r:id="rId12"/>
-    <p:sldId id="267" r:id="rId13"/>
-    <p:sldId id="268" r:id="rId14"/>
+    <p:sldId id="276" r:id="rId5"/>
+    <p:sldId id="277" r:id="rId6"/>
+    <p:sldId id="260" r:id="rId7"/>
+    <p:sldId id="272" r:id="rId8"/>
+    <p:sldId id="273" r:id="rId9"/>
+    <p:sldId id="274" r:id="rId10"/>
+    <p:sldId id="275" r:id="rId11"/>
+    <p:sldId id="271" r:id="rId12"/>
+    <p:sldId id="259" r:id="rId13"/>
+    <p:sldId id="263" r:id="rId14"/>
+    <p:sldId id="264" r:id="rId15"/>
+    <p:sldId id="269" r:id="rId16"/>
+    <p:sldId id="270" r:id="rId17"/>
+    <p:sldId id="266" r:id="rId18"/>
+    <p:sldId id="267" r:id="rId19"/>
+    <p:sldId id="268" r:id="rId20"/>
   </p:sldIdLst>
   <p:sldSz cx="9144000" cy="6858000" type="screen4x3"/>
   <p:notesSz cx="6858000" cy="9144000"/>
@@ -205,7 +211,7 @@
             <a:fld id="{A4A9652A-D4BF-41F5-B3CF-F03C6BFD8852}" type="datetimeFigureOut">
               <a:rPr lang="pt-PT" smtClean="0"/>
               <a:pPr/>
-              <a:t>29-01-2011</a:t>
+              <a:t>30-01-2011</a:t>
             </a:fld>
             <a:endParaRPr lang="pt-PT"/>
           </a:p>
@@ -653,7 +659,7 @@
             <a:fld id="{B21DA5EC-CDBD-4BE5-AFEC-D05D842E9DCA}" type="datetime1">
               <a:rPr lang="pt-PT" smtClean="0"/>
               <a:pPr/>
-              <a:t>29-01-2011</a:t>
+              <a:t>30-01-2011</a:t>
             </a:fld>
             <a:endParaRPr lang="pt-PT"/>
           </a:p>
@@ -820,7 +826,7 @@
             <a:fld id="{265ABC6D-62B8-444F-8CBB-55DA24843F08}" type="datetime1">
               <a:rPr lang="pt-PT" smtClean="0"/>
               <a:pPr/>
-              <a:t>29-01-2011</a:t>
+              <a:t>30-01-2011</a:t>
             </a:fld>
             <a:endParaRPr lang="pt-PT"/>
           </a:p>
@@ -997,7 +1003,7 @@
             <a:fld id="{642BB447-BC74-408D-87E2-151F2C4E6D5C}" type="datetime1">
               <a:rPr lang="pt-PT" smtClean="0"/>
               <a:pPr/>
-              <a:t>29-01-2011</a:t>
+              <a:t>30-01-2011</a:t>
             </a:fld>
             <a:endParaRPr lang="pt-PT"/>
           </a:p>
@@ -1108,7 +1114,7 @@
           <a:noFill/>
         </p:spPr>
         <p:txBody>
-          <a:bodyPr/>
+          <a:bodyPr anchor="ctr" anchorCtr="1"/>
           <a:lstStyle>
             <a:lvl1pPr>
               <a:buClr>
@@ -1217,7 +1223,7 @@
             <a:fld id="{1AE16238-79D5-4CE1-9F7C-9EB0DB09B684}" type="datetime1">
               <a:rPr lang="pt-PT" smtClean="0"/>
               <a:pPr/>
-              <a:t>29-01-2011</a:t>
+              <a:t>30-01-2011</a:t>
             </a:fld>
             <a:endParaRPr lang="pt-PT"/>
           </a:p>
@@ -1464,7 +1470,7 @@
             <a:fld id="{29EC9118-B484-4893-9D08-9848F3CE7FF2}" type="datetime1">
               <a:rPr lang="pt-PT" smtClean="0"/>
               <a:pPr/>
-              <a:t>29-01-2011</a:t>
+              <a:t>30-01-2011</a:t>
             </a:fld>
             <a:endParaRPr lang="pt-PT"/>
           </a:p>
@@ -1749,7 +1755,7 @@
             <a:fld id="{93295FF2-CB18-49BE-8735-588EA2A78858}" type="datetime1">
               <a:rPr lang="pt-PT" smtClean="0"/>
               <a:pPr/>
-              <a:t>29-01-2011</a:t>
+              <a:t>30-01-2011</a:t>
             </a:fld>
             <a:endParaRPr lang="pt-PT"/>
           </a:p>
@@ -2168,7 +2174,7 @@
             <a:fld id="{50896DA6-8084-488D-9E6B-45E32377C613}" type="datetime1">
               <a:rPr lang="pt-PT" smtClean="0"/>
               <a:pPr/>
-              <a:t>29-01-2011</a:t>
+              <a:t>30-01-2011</a:t>
             </a:fld>
             <a:endParaRPr lang="pt-PT"/>
           </a:p>
@@ -2283,7 +2289,7 @@
             <a:fld id="{40926C83-C8D3-48F0-B08F-F8259B57109C}" type="datetime1">
               <a:rPr lang="pt-PT" smtClean="0"/>
               <a:pPr/>
-              <a:t>29-01-2011</a:t>
+              <a:t>30-01-2011</a:t>
             </a:fld>
             <a:endParaRPr lang="pt-PT"/>
           </a:p>
@@ -2375,7 +2381,7 @@
             <a:fld id="{379D2EB6-009D-45E0-886C-0BF1B142AD62}" type="datetime1">
               <a:rPr lang="pt-PT" smtClean="0"/>
               <a:pPr/>
-              <a:t>29-01-2011</a:t>
+              <a:t>30-01-2011</a:t>
             </a:fld>
             <a:endParaRPr lang="pt-PT"/>
           </a:p>
@@ -2649,7 +2655,7 @@
             <a:fld id="{D9720365-511F-43DE-9BF0-D286DA1D7131}" type="datetime1">
               <a:rPr lang="pt-PT" smtClean="0"/>
               <a:pPr/>
-              <a:t>29-01-2011</a:t>
+              <a:t>30-01-2011</a:t>
             </a:fld>
             <a:endParaRPr lang="pt-PT"/>
           </a:p>
@@ -2899,7 +2905,7 @@
             <a:fld id="{E9DCFC39-BBD6-4CEF-9802-34CE70E119D6}" type="datetime1">
               <a:rPr lang="pt-PT" smtClean="0"/>
               <a:pPr/>
-              <a:t>29-01-2011</a:t>
+              <a:t>30-01-2011</a:t>
             </a:fld>
             <a:endParaRPr lang="pt-PT"/>
           </a:p>
@@ -3031,7 +3037,7 @@
           </a:prstGeom>
         </p:spPr>
         <p:txBody>
-          <a:bodyPr vert="horz" lIns="91440" tIns="45720" rIns="91440" bIns="45720" rtlCol="0">
+          <a:bodyPr vert="horz" lIns="91440" tIns="45720" rIns="91440" bIns="45720" rtlCol="0" anchor="ctr" anchorCtr="1">
             <a:normAutofit/>
           </a:bodyPr>
           <a:lstStyle/>
@@ -3109,7 +3115,7 @@
             <a:fld id="{D7EF8D5E-585F-4BE6-AEBD-62F6999D90C3}" type="datetime1">
               <a:rPr lang="pt-PT" smtClean="0"/>
               <a:pPr/>
-              <a:t>29-01-2011</a:t>
+              <a:t>30-01-2011</a:t>
             </a:fld>
             <a:endParaRPr lang="pt-PT"/>
           </a:p>
@@ -3849,7 +3855,7 @@
                 </a:solidFill>
                 <a:latin typeface="League Gothic" pitchFamily="50" charset="0"/>
               </a:rPr>
-              <a:t>Performance</a:t>
+              <a:t>Design</a:t>
             </a:r>
             <a:endParaRPr lang="pt-PT" sz="3200" dirty="0">
               <a:solidFill>
@@ -3872,8 +3878,8 @@
         </p:nvSpPr>
         <p:spPr>
           <a:xfrm>
-            <a:off x="457200" y="1124744"/>
-            <a:ext cx="8229600" cy="5040560"/>
+            <a:off x="457200" y="908720"/>
+            <a:ext cx="8229600" cy="5472608"/>
           </a:xfrm>
           <a:effectLst>
             <a:outerShdw blurRad="50800" dist="25400" dir="2700000" algn="tl" rotWithShape="0">
@@ -3884,22 +3890,19 @@
           </a:effectLst>
         </p:spPr>
         <p:txBody>
-          <a:bodyPr anchor="ctr" anchorCtr="0">
+          <a:bodyPr anchor="ctr" anchorCtr="1">
             <a:normAutofit/>
           </a:bodyPr>
           <a:lstStyle/>
           <a:p>
-            <a:pPr indent="0">
+            <a:pPr algn="ctr">
               <a:lnSpc>
                 <a:spcPct val="110000"/>
               </a:lnSpc>
-              <a:spcBef>
-                <a:spcPts val="0"/>
-              </a:spcBef>
               <a:buNone/>
             </a:pPr>
             <a:r>
-              <a:rPr lang="pt-PT" sz="3600" smtClean="0">
+              <a:rPr lang="pt-PT" sz="3600" dirty="0" smtClean="0">
                 <a:solidFill>
                   <a:schemeClr val="tx1">
                     <a:lumMod val="85000"/>
@@ -3908,7 +3911,44 @@
                 </a:solidFill>
                 <a:latin typeface="MetaSerif-Book" pitchFamily="34" charset="0"/>
               </a:rPr>
-              <a:t>Performance can be increased</a:t>
+              <a:t>Design Patterns</a:t>
+            </a:r>
+          </a:p>
+          <a:p>
+            <a:pPr algn="ctr">
+              <a:lnSpc>
+                <a:spcPct val="110000"/>
+              </a:lnSpc>
+              <a:buNone/>
+            </a:pPr>
+            <a:endParaRPr lang="pt-PT" sz="3600" dirty="0" smtClean="0">
+              <a:solidFill>
+                <a:schemeClr val="tx1">
+                  <a:lumMod val="85000"/>
+                  <a:lumOff val="15000"/>
+                </a:schemeClr>
+              </a:solidFill>
+              <a:latin typeface="MetaSerif-Book" pitchFamily="34" charset="0"/>
+            </a:endParaRPr>
+          </a:p>
+          <a:p>
+            <a:pPr algn="ctr">
+              <a:lnSpc>
+                <a:spcPct val="110000"/>
+              </a:lnSpc>
+              <a:buNone/>
+            </a:pPr>
+            <a:r>
+              <a:rPr lang="pt-PT" sz="3600" dirty="0" smtClean="0">
+                <a:solidFill>
+                  <a:schemeClr val="tx1">
+                    <a:lumMod val="85000"/>
+                    <a:lumOff val="15000"/>
+                  </a:schemeClr>
+                </a:solidFill>
+                <a:latin typeface="MetaSerif-Book" pitchFamily="34" charset="0"/>
+              </a:rPr>
+              <a:t>Architectural Patterns</a:t>
             </a:r>
             <a:endParaRPr lang="pt-PT" sz="3600" dirty="0" smtClean="0">
               <a:solidFill>
@@ -3962,6 +4002,831 @@
 </file>
 
 <file path=ppt/slides/slide11.xml><?xml version="1.0" encoding="utf-8"?>
+<p:sld xmlns:a="http://schemas.openxmlformats.org/drawingml/2006/main" xmlns:r="http://schemas.openxmlformats.org/officeDocument/2006/relationships" xmlns:p="http://schemas.openxmlformats.org/presentationml/2006/main">
+  <p:cSld>
+    <p:spTree>
+      <p:nvGrpSpPr>
+        <p:cNvPr id="1" name=""/>
+        <p:cNvGrpSpPr/>
+        <p:nvPr/>
+      </p:nvGrpSpPr>
+      <p:grpSpPr>
+        <a:xfrm>
+          <a:off x="0" y="0"/>
+          <a:ext cx="0" cy="0"/>
+          <a:chOff x="0" y="0"/>
+          <a:chExt cx="0" cy="0"/>
+        </a:xfrm>
+      </p:grpSpPr>
+      <p:pic>
+        <p:nvPicPr>
+          <p:cNvPr id="1026" name="Picture 2" descr="C:\Users\jgradim\Documents\thesis\presentations\work.jpg"/>
+          <p:cNvPicPr>
+            <a:picLocks noChangeAspect="1" noChangeArrowheads="1"/>
+          </p:cNvPicPr>
+          <p:nvPr/>
+        </p:nvPicPr>
+        <p:blipFill>
+          <a:blip r:embed="rId2" cstate="print"/>
+          <a:srcRect r="11068"/>
+          <a:stretch>
+            <a:fillRect/>
+          </a:stretch>
+        </p:blipFill>
+        <p:spPr bwMode="auto">
+          <a:xfrm>
+            <a:off x="0" y="0"/>
+            <a:ext cx="9144000" cy="6858000"/>
+          </a:xfrm>
+          <a:prstGeom prst="rect">
+            <a:avLst/>
+          </a:prstGeom>
+          <a:noFill/>
+        </p:spPr>
+      </p:pic>
+      <p:sp>
+        <p:nvSpPr>
+          <p:cNvPr id="2" name="Title 1"/>
+          <p:cNvSpPr>
+            <a:spLocks noGrp="1"/>
+          </p:cNvSpPr>
+          <p:nvPr>
+            <p:ph type="title"/>
+          </p:nvPr>
+        </p:nvSpPr>
+        <p:spPr>
+          <a:xfrm>
+            <a:off x="0" y="2941730"/>
+            <a:ext cx="4644008" cy="974540"/>
+          </a:xfrm>
+          <a:solidFill>
+            <a:schemeClr val="tx1">
+              <a:alpha val="90000"/>
+            </a:schemeClr>
+          </a:solidFill>
+        </p:spPr>
+        <p:txBody>
+          <a:bodyPr lIns="360000">
+            <a:noAutofit/>
+          </a:bodyPr>
+          <a:lstStyle/>
+          <a:p>
+            <a:pPr algn="l"/>
+            <a:r>
+              <a:rPr lang="pt-PT" sz="5400" dirty="0" smtClean="0">
+                <a:solidFill>
+                  <a:schemeClr val="bg1"/>
+                </a:solidFill>
+                <a:latin typeface="League Gothic" pitchFamily="50" charset="0"/>
+              </a:rPr>
+              <a:t>Approach &amp; Results</a:t>
+            </a:r>
+            <a:endParaRPr lang="pt-PT" sz="5400" dirty="0">
+              <a:solidFill>
+                <a:schemeClr val="bg1"/>
+              </a:solidFill>
+              <a:latin typeface="League Gothic" pitchFamily="50" charset="0"/>
+            </a:endParaRPr>
+          </a:p>
+        </p:txBody>
+      </p:sp>
+    </p:spTree>
+  </p:cSld>
+  <p:clrMapOvr>
+    <a:masterClrMapping/>
+  </p:clrMapOvr>
+  <p:timing>
+    <p:tnLst>
+      <p:par>
+        <p:cTn id="1" dur="indefinite" restart="never" nodeType="tmRoot"/>
+      </p:par>
+    </p:tnLst>
+  </p:timing>
+</p:sld>
+</file>
+
+<file path=ppt/slides/slide12.xml><?xml version="1.0" encoding="utf-8"?>
+<p:sld xmlns:a="http://schemas.openxmlformats.org/drawingml/2006/main" xmlns:r="http://schemas.openxmlformats.org/officeDocument/2006/relationships" xmlns:p="http://schemas.openxmlformats.org/presentationml/2006/main">
+  <p:cSld>
+    <p:spTree>
+      <p:nvGrpSpPr>
+        <p:cNvPr id="1" name=""/>
+        <p:cNvGrpSpPr/>
+        <p:nvPr/>
+      </p:nvGrpSpPr>
+      <p:grpSpPr>
+        <a:xfrm>
+          <a:off x="0" y="0"/>
+          <a:ext cx="0" cy="0"/>
+          <a:chOff x="0" y="0"/>
+          <a:chExt cx="0" cy="0"/>
+        </a:xfrm>
+      </p:grpSpPr>
+      <p:pic>
+        <p:nvPicPr>
+          <p:cNvPr id="3074" name="Picture 2" descr="C:\Users\jgradim\Documents\thesis\presentations\old_books.jpg"/>
+          <p:cNvPicPr>
+            <a:picLocks noChangeAspect="1" noChangeArrowheads="1"/>
+          </p:cNvPicPr>
+          <p:nvPr/>
+        </p:nvPicPr>
+        <p:blipFill>
+          <a:blip r:embed="rId2" cstate="print"/>
+          <a:srcRect r="11066"/>
+          <a:stretch>
+            <a:fillRect/>
+          </a:stretch>
+        </p:blipFill>
+        <p:spPr bwMode="auto">
+          <a:xfrm>
+            <a:off x="0" y="0"/>
+            <a:ext cx="9144000" cy="6858000"/>
+          </a:xfrm>
+          <a:prstGeom prst="rect">
+            <a:avLst/>
+          </a:prstGeom>
+          <a:noFill/>
+        </p:spPr>
+      </p:pic>
+      <p:sp>
+        <p:nvSpPr>
+          <p:cNvPr id="2" name="Title 1"/>
+          <p:cNvSpPr>
+            <a:spLocks noGrp="1"/>
+          </p:cNvSpPr>
+          <p:nvPr>
+            <p:ph type="title"/>
+          </p:nvPr>
+        </p:nvSpPr>
+        <p:spPr>
+          <a:xfrm>
+            <a:off x="0" y="2941730"/>
+            <a:ext cx="4644008" cy="974540"/>
+          </a:xfrm>
+          <a:solidFill>
+            <a:schemeClr val="tx1">
+              <a:alpha val="90000"/>
+            </a:schemeClr>
+          </a:solidFill>
+        </p:spPr>
+        <p:txBody>
+          <a:bodyPr lIns="360000">
+            <a:noAutofit/>
+          </a:bodyPr>
+          <a:lstStyle/>
+          <a:p>
+            <a:pPr algn="l"/>
+            <a:r>
+              <a:rPr lang="pt-PT" sz="5400" dirty="0" smtClean="0">
+                <a:solidFill>
+                  <a:schemeClr val="bg1"/>
+                </a:solidFill>
+                <a:latin typeface="League Gothic" pitchFamily="50" charset="0"/>
+              </a:rPr>
+              <a:t>Conclusions</a:t>
+            </a:r>
+            <a:endParaRPr lang="pt-PT" sz="5400" dirty="0">
+              <a:solidFill>
+                <a:schemeClr val="bg1"/>
+              </a:solidFill>
+              <a:latin typeface="League Gothic" pitchFamily="50" charset="0"/>
+            </a:endParaRPr>
+          </a:p>
+        </p:txBody>
+      </p:sp>
+    </p:spTree>
+  </p:cSld>
+  <p:clrMapOvr>
+    <a:masterClrMapping/>
+  </p:clrMapOvr>
+  <p:timing>
+    <p:tnLst>
+      <p:par>
+        <p:cTn id="1" dur="indefinite" restart="never" nodeType="tmRoot"/>
+      </p:par>
+    </p:tnLst>
+  </p:timing>
+</p:sld>
+</file>
+
+<file path=ppt/slides/slide13.xml><?xml version="1.0" encoding="utf-8"?>
+<p:sld xmlns:a="http://schemas.openxmlformats.org/drawingml/2006/main" xmlns:r="http://schemas.openxmlformats.org/officeDocument/2006/relationships" xmlns:p="http://schemas.openxmlformats.org/presentationml/2006/main">
+  <p:cSld>
+    <p:spTree>
+      <p:nvGrpSpPr>
+        <p:cNvPr id="1" name=""/>
+        <p:cNvGrpSpPr/>
+        <p:nvPr/>
+      </p:nvGrpSpPr>
+      <p:grpSpPr>
+        <a:xfrm>
+          <a:off x="0" y="0"/>
+          <a:ext cx="0" cy="0"/>
+          <a:chOff x="0" y="0"/>
+          <a:chExt cx="0" cy="0"/>
+        </a:xfrm>
+      </p:grpSpPr>
+      <p:sp>
+        <p:nvSpPr>
+          <p:cNvPr id="2" name="Title 1"/>
+          <p:cNvSpPr>
+            <a:spLocks noGrp="1"/>
+          </p:cNvSpPr>
+          <p:nvPr>
+            <p:ph type="title"/>
+          </p:nvPr>
+        </p:nvSpPr>
+        <p:spPr>
+          <a:xfrm>
+            <a:off x="5868144" y="188640"/>
+            <a:ext cx="3275856" cy="706090"/>
+          </a:xfrm>
+          <a:solidFill>
+            <a:schemeClr val="tx1">
+              <a:alpha val="90000"/>
+            </a:schemeClr>
+          </a:solidFill>
+        </p:spPr>
+        <p:txBody>
+          <a:bodyPr rIns="144000">
+            <a:normAutofit/>
+          </a:bodyPr>
+          <a:lstStyle/>
+          <a:p>
+            <a:pPr algn="r"/>
+            <a:r>
+              <a:rPr lang="pt-PT" sz="3200" dirty="0" smtClean="0">
+                <a:solidFill>
+                  <a:schemeClr val="bg1"/>
+                </a:solidFill>
+                <a:latin typeface="League Gothic" pitchFamily="50" charset="0"/>
+              </a:rPr>
+              <a:t>AOMs</a:t>
+            </a:r>
+            <a:endParaRPr lang="pt-PT" sz="3200" dirty="0">
+              <a:solidFill>
+                <a:schemeClr val="bg1"/>
+              </a:solidFill>
+              <a:latin typeface="League Gothic" pitchFamily="50" charset="0"/>
+            </a:endParaRPr>
+          </a:p>
+        </p:txBody>
+      </p:sp>
+      <p:sp>
+        <p:nvSpPr>
+          <p:cNvPr id="3" name="Content Placeholder 2"/>
+          <p:cNvSpPr>
+            <a:spLocks noGrp="1"/>
+          </p:cNvSpPr>
+          <p:nvPr>
+            <p:ph idx="1"/>
+          </p:nvPr>
+        </p:nvSpPr>
+        <p:spPr>
+          <a:xfrm>
+            <a:off x="457200" y="1124744"/>
+            <a:ext cx="8229600" cy="5040560"/>
+          </a:xfrm>
+          <a:effectLst>
+            <a:outerShdw blurRad="50800" dist="25400" dir="2700000" algn="tl" rotWithShape="0">
+              <a:prstClr val="black">
+                <a:alpha val="15000"/>
+              </a:prstClr>
+            </a:outerShdw>
+          </a:effectLst>
+        </p:spPr>
+        <p:txBody>
+          <a:bodyPr vert="horz" anchor="ctr" anchorCtr="1">
+            <a:normAutofit/>
+          </a:bodyPr>
+          <a:lstStyle/>
+          <a:p>
+            <a:pPr indent="0">
+              <a:lnSpc>
+                <a:spcPct val="110000"/>
+              </a:lnSpc>
+              <a:spcBef>
+                <a:spcPts val="0"/>
+              </a:spcBef>
+              <a:buNone/>
+            </a:pPr>
+            <a:r>
+              <a:rPr lang="pt-PT" sz="3600" dirty="0" smtClean="0">
+                <a:solidFill>
+                  <a:schemeClr val="tx1">
+                    <a:lumMod val="85000"/>
+                    <a:lumOff val="15000"/>
+                  </a:schemeClr>
+                </a:solidFill>
+                <a:latin typeface="MetaSerif-Book" pitchFamily="34" charset="0"/>
+              </a:rPr>
+              <a:t>AOM architectures provide the best framework for building adaptable software systems</a:t>
+            </a:r>
+          </a:p>
+        </p:txBody>
+      </p:sp>
+      <p:sp>
+        <p:nvSpPr>
+          <p:cNvPr id="4" name="Slide Number Placeholder 3"/>
+          <p:cNvSpPr>
+            <a:spLocks noGrp="1"/>
+          </p:cNvSpPr>
+          <p:nvPr>
+            <p:ph type="sldNum" sz="quarter" idx="12"/>
+          </p:nvPr>
+        </p:nvSpPr>
+        <p:spPr/>
+        <p:txBody>
+          <a:bodyPr/>
+          <a:lstStyle/>
+          <a:p>
+            <a:fld id="{AF2DD60D-AE1E-4B35-90D2-0ABAEDD7A6F5}" type="slidenum">
+              <a:rPr lang="pt-PT" smtClean="0"/>
+              <a:pPr/>
+              <a:t>13</a:t>
+            </a:fld>
+            <a:endParaRPr lang="pt-PT" dirty="0"/>
+          </a:p>
+        </p:txBody>
+      </p:sp>
+    </p:spTree>
+  </p:cSld>
+  <p:clrMapOvr>
+    <a:masterClrMapping/>
+  </p:clrMapOvr>
+  <p:timing>
+    <p:tnLst>
+      <p:par>
+        <p:cTn id="1" dur="indefinite" restart="never" nodeType="tmRoot"/>
+      </p:par>
+    </p:tnLst>
+  </p:timing>
+</p:sld>
+</file>
+
+<file path=ppt/slides/slide14.xml><?xml version="1.0" encoding="utf-8"?>
+<p:sld xmlns:a="http://schemas.openxmlformats.org/drawingml/2006/main" xmlns:r="http://schemas.openxmlformats.org/officeDocument/2006/relationships" xmlns:p="http://schemas.openxmlformats.org/presentationml/2006/main">
+  <p:cSld>
+    <p:spTree>
+      <p:nvGrpSpPr>
+        <p:cNvPr id="1" name=""/>
+        <p:cNvGrpSpPr/>
+        <p:nvPr/>
+      </p:nvGrpSpPr>
+      <p:grpSpPr>
+        <a:xfrm>
+          <a:off x="0" y="0"/>
+          <a:ext cx="0" cy="0"/>
+          <a:chOff x="0" y="0"/>
+          <a:chExt cx="0" cy="0"/>
+        </a:xfrm>
+      </p:grpSpPr>
+      <p:sp>
+        <p:nvSpPr>
+          <p:cNvPr id="2" name="Title 1"/>
+          <p:cNvSpPr>
+            <a:spLocks noGrp="1"/>
+          </p:cNvSpPr>
+          <p:nvPr>
+            <p:ph type="title"/>
+          </p:nvPr>
+        </p:nvSpPr>
+        <p:spPr>
+          <a:xfrm>
+            <a:off x="5868144" y="188640"/>
+            <a:ext cx="3275856" cy="706090"/>
+          </a:xfrm>
+          <a:solidFill>
+            <a:schemeClr val="tx1">
+              <a:alpha val="90000"/>
+            </a:schemeClr>
+          </a:solidFill>
+        </p:spPr>
+        <p:txBody>
+          <a:bodyPr rIns="144000">
+            <a:normAutofit/>
+          </a:bodyPr>
+          <a:lstStyle/>
+          <a:p>
+            <a:pPr algn="r"/>
+            <a:r>
+              <a:rPr lang="pt-PT" sz="3200" dirty="0" smtClean="0">
+                <a:solidFill>
+                  <a:schemeClr val="bg1"/>
+                </a:solidFill>
+                <a:latin typeface="League Gothic" pitchFamily="50" charset="0"/>
+              </a:rPr>
+              <a:t>Rails &amp; MVC</a:t>
+            </a:r>
+            <a:endParaRPr lang="pt-PT" sz="3200" dirty="0">
+              <a:solidFill>
+                <a:schemeClr val="bg1"/>
+              </a:solidFill>
+              <a:latin typeface="League Gothic" pitchFamily="50" charset="0"/>
+            </a:endParaRPr>
+          </a:p>
+        </p:txBody>
+      </p:sp>
+      <p:sp>
+        <p:nvSpPr>
+          <p:cNvPr id="3" name="Content Placeholder 2"/>
+          <p:cNvSpPr>
+            <a:spLocks noGrp="1"/>
+          </p:cNvSpPr>
+          <p:nvPr>
+            <p:ph idx="1"/>
+          </p:nvPr>
+        </p:nvSpPr>
+        <p:spPr>
+          <a:xfrm>
+            <a:off x="457200" y="1124744"/>
+            <a:ext cx="8229600" cy="5040560"/>
+          </a:xfrm>
+          <a:effectLst>
+            <a:outerShdw blurRad="50800" dist="25400" dir="2700000" algn="tl" rotWithShape="0">
+              <a:prstClr val="black">
+                <a:alpha val="15000"/>
+              </a:prstClr>
+            </a:outerShdw>
+          </a:effectLst>
+        </p:spPr>
+        <p:txBody>
+          <a:bodyPr anchor="ctr" anchorCtr="1">
+            <a:normAutofit/>
+          </a:bodyPr>
+          <a:lstStyle/>
+          <a:p>
+            <a:pPr indent="0">
+              <a:lnSpc>
+                <a:spcPct val="110000"/>
+              </a:lnSpc>
+              <a:spcBef>
+                <a:spcPts val="0"/>
+              </a:spcBef>
+              <a:buNone/>
+            </a:pPr>
+            <a:r>
+              <a:rPr lang="pt-PT" sz="3600" dirty="0" smtClean="0">
+                <a:solidFill>
+                  <a:schemeClr val="tx1">
+                    <a:lumMod val="85000"/>
+                    <a:lumOff val="15000"/>
+                  </a:schemeClr>
+                </a:solidFill>
+                <a:latin typeface="MetaSerif-Book" pitchFamily="34" charset="0"/>
+              </a:rPr>
+              <a:t>MVC architecture used by Rails can coexist harmoniously with AOM design patterns, especially with the AR engine</a:t>
+            </a:r>
+          </a:p>
+        </p:txBody>
+      </p:sp>
+      <p:sp>
+        <p:nvSpPr>
+          <p:cNvPr id="4" name="Slide Number Placeholder 3"/>
+          <p:cNvSpPr>
+            <a:spLocks noGrp="1"/>
+          </p:cNvSpPr>
+          <p:nvPr>
+            <p:ph type="sldNum" sz="quarter" idx="12"/>
+          </p:nvPr>
+        </p:nvSpPr>
+        <p:spPr/>
+        <p:txBody>
+          <a:bodyPr/>
+          <a:lstStyle/>
+          <a:p>
+            <a:fld id="{AF2DD60D-AE1E-4B35-90D2-0ABAEDD7A6F5}" type="slidenum">
+              <a:rPr lang="pt-PT" smtClean="0"/>
+              <a:pPr/>
+              <a:t>14</a:t>
+            </a:fld>
+            <a:endParaRPr lang="pt-PT" dirty="0"/>
+          </a:p>
+        </p:txBody>
+      </p:sp>
+    </p:spTree>
+  </p:cSld>
+  <p:clrMapOvr>
+    <a:masterClrMapping/>
+  </p:clrMapOvr>
+  <p:timing>
+    <p:tnLst>
+      <p:par>
+        <p:cTn id="1" dur="indefinite" restart="never" nodeType="tmRoot"/>
+      </p:par>
+    </p:tnLst>
+  </p:timing>
+</p:sld>
+</file>
+
+<file path=ppt/slides/slide15.xml><?xml version="1.0" encoding="utf-8"?>
+<p:sld xmlns:a="http://schemas.openxmlformats.org/drawingml/2006/main" xmlns:r="http://schemas.openxmlformats.org/officeDocument/2006/relationships" xmlns:p="http://schemas.openxmlformats.org/presentationml/2006/main">
+  <p:cSld>
+    <p:spTree>
+      <p:nvGrpSpPr>
+        <p:cNvPr id="1" name=""/>
+        <p:cNvGrpSpPr/>
+        <p:nvPr/>
+      </p:nvGrpSpPr>
+      <p:grpSpPr>
+        <a:xfrm>
+          <a:off x="0" y="0"/>
+          <a:ext cx="0" cy="0"/>
+          <a:chOff x="0" y="0"/>
+          <a:chExt cx="0" cy="0"/>
+        </a:xfrm>
+      </p:grpSpPr>
+      <p:sp>
+        <p:nvSpPr>
+          <p:cNvPr id="2" name="Title 1"/>
+          <p:cNvSpPr>
+            <a:spLocks noGrp="1"/>
+          </p:cNvSpPr>
+          <p:nvPr>
+            <p:ph type="title"/>
+          </p:nvPr>
+        </p:nvSpPr>
+        <p:spPr>
+          <a:xfrm>
+            <a:off x="5868144" y="188640"/>
+            <a:ext cx="3275856" cy="706090"/>
+          </a:xfrm>
+          <a:solidFill>
+            <a:schemeClr val="tx1">
+              <a:alpha val="90000"/>
+            </a:schemeClr>
+          </a:solidFill>
+        </p:spPr>
+        <p:txBody>
+          <a:bodyPr rIns="144000">
+            <a:normAutofit/>
+          </a:bodyPr>
+          <a:lstStyle/>
+          <a:p>
+            <a:pPr algn="r"/>
+            <a:r>
+              <a:rPr lang="pt-PT" sz="3200" dirty="0" smtClean="0">
+                <a:solidFill>
+                  <a:schemeClr val="bg1"/>
+                </a:solidFill>
+                <a:latin typeface="League Gothic" pitchFamily="50" charset="0"/>
+              </a:rPr>
+              <a:t>Variability</a:t>
+            </a:r>
+            <a:endParaRPr lang="pt-PT" sz="3200" dirty="0">
+              <a:solidFill>
+                <a:schemeClr val="bg1"/>
+              </a:solidFill>
+              <a:latin typeface="League Gothic" pitchFamily="50" charset="0"/>
+            </a:endParaRPr>
+          </a:p>
+        </p:txBody>
+      </p:sp>
+      <p:sp>
+        <p:nvSpPr>
+          <p:cNvPr id="3" name="Content Placeholder 2"/>
+          <p:cNvSpPr>
+            <a:spLocks noGrp="1"/>
+          </p:cNvSpPr>
+          <p:nvPr>
+            <p:ph idx="1"/>
+          </p:nvPr>
+        </p:nvSpPr>
+        <p:spPr>
+          <a:xfrm>
+            <a:off x="457200" y="1124744"/>
+            <a:ext cx="8229600" cy="5040560"/>
+          </a:xfrm>
+          <a:effectLst>
+            <a:outerShdw blurRad="50800" dist="25400" dir="2700000" algn="tl" rotWithShape="0">
+              <a:prstClr val="black">
+                <a:alpha val="15000"/>
+              </a:prstClr>
+            </a:outerShdw>
+          </a:effectLst>
+        </p:spPr>
+        <p:txBody>
+          <a:bodyPr anchor="ctr" anchorCtr="1">
+            <a:normAutofit/>
+          </a:bodyPr>
+          <a:lstStyle/>
+          <a:p>
+            <a:pPr indent="0">
+              <a:lnSpc>
+                <a:spcPct val="110000"/>
+              </a:lnSpc>
+              <a:spcBef>
+                <a:spcPts val="0"/>
+              </a:spcBef>
+              <a:buNone/>
+            </a:pPr>
+            <a:endParaRPr lang="pt-PT" sz="3600" dirty="0" smtClean="0">
+              <a:solidFill>
+                <a:schemeClr val="tx1">
+                  <a:lumMod val="85000"/>
+                  <a:lumOff val="15000"/>
+                </a:schemeClr>
+              </a:solidFill>
+              <a:latin typeface="MetaSerif-Book" pitchFamily="34" charset="0"/>
+            </a:endParaRPr>
+          </a:p>
+        </p:txBody>
+      </p:sp>
+      <p:sp>
+        <p:nvSpPr>
+          <p:cNvPr id="4" name="Slide Number Placeholder 3"/>
+          <p:cNvSpPr>
+            <a:spLocks noGrp="1"/>
+          </p:cNvSpPr>
+          <p:nvPr>
+            <p:ph type="sldNum" sz="quarter" idx="12"/>
+          </p:nvPr>
+        </p:nvSpPr>
+        <p:spPr/>
+        <p:txBody>
+          <a:bodyPr/>
+          <a:lstStyle/>
+          <a:p>
+            <a:fld id="{AF2DD60D-AE1E-4B35-90D2-0ABAEDD7A6F5}" type="slidenum">
+              <a:rPr lang="pt-PT" smtClean="0"/>
+              <a:pPr/>
+              <a:t>15</a:t>
+            </a:fld>
+            <a:endParaRPr lang="pt-PT" dirty="0"/>
+          </a:p>
+        </p:txBody>
+      </p:sp>
+    </p:spTree>
+  </p:cSld>
+  <p:clrMapOvr>
+    <a:masterClrMapping/>
+  </p:clrMapOvr>
+  <p:timing>
+    <p:tnLst>
+      <p:par>
+        <p:cTn id="1" dur="indefinite" restart="never" nodeType="tmRoot"/>
+      </p:par>
+    </p:tnLst>
+  </p:timing>
+</p:sld>
+</file>
+
+<file path=ppt/slides/slide16.xml><?xml version="1.0" encoding="utf-8"?>
+<p:sld xmlns:a="http://schemas.openxmlformats.org/drawingml/2006/main" xmlns:r="http://schemas.openxmlformats.org/officeDocument/2006/relationships" xmlns:p="http://schemas.openxmlformats.org/presentationml/2006/main">
+  <p:cSld>
+    <p:spTree>
+      <p:nvGrpSpPr>
+        <p:cNvPr id="1" name=""/>
+        <p:cNvGrpSpPr/>
+        <p:nvPr/>
+      </p:nvGrpSpPr>
+      <p:grpSpPr>
+        <a:xfrm>
+          <a:off x="0" y="0"/>
+          <a:ext cx="0" cy="0"/>
+          <a:chOff x="0" y="0"/>
+          <a:chExt cx="0" cy="0"/>
+        </a:xfrm>
+      </p:grpSpPr>
+      <p:sp>
+        <p:nvSpPr>
+          <p:cNvPr id="2" name="Title 1"/>
+          <p:cNvSpPr>
+            <a:spLocks noGrp="1"/>
+          </p:cNvSpPr>
+          <p:nvPr>
+            <p:ph type="title"/>
+          </p:nvPr>
+        </p:nvSpPr>
+        <p:spPr>
+          <a:xfrm>
+            <a:off x="5868144" y="188640"/>
+            <a:ext cx="3275856" cy="706090"/>
+          </a:xfrm>
+          <a:solidFill>
+            <a:schemeClr val="tx1">
+              <a:alpha val="90000"/>
+            </a:schemeClr>
+          </a:solidFill>
+        </p:spPr>
+        <p:txBody>
+          <a:bodyPr rIns="144000">
+            <a:normAutofit/>
+          </a:bodyPr>
+          <a:lstStyle/>
+          <a:p>
+            <a:pPr algn="r"/>
+            <a:r>
+              <a:rPr lang="pt-PT" sz="3200" dirty="0" smtClean="0">
+                <a:solidFill>
+                  <a:schemeClr val="bg1"/>
+                </a:solidFill>
+                <a:latin typeface="League Gothic" pitchFamily="50" charset="0"/>
+              </a:rPr>
+              <a:t>Performance</a:t>
+            </a:r>
+            <a:endParaRPr lang="pt-PT" sz="3200" dirty="0">
+              <a:solidFill>
+                <a:schemeClr val="bg1"/>
+              </a:solidFill>
+              <a:latin typeface="League Gothic" pitchFamily="50" charset="0"/>
+            </a:endParaRPr>
+          </a:p>
+        </p:txBody>
+      </p:sp>
+      <p:sp>
+        <p:nvSpPr>
+          <p:cNvPr id="3" name="Content Placeholder 2"/>
+          <p:cNvSpPr>
+            <a:spLocks noGrp="1"/>
+          </p:cNvSpPr>
+          <p:nvPr>
+            <p:ph idx="1"/>
+          </p:nvPr>
+        </p:nvSpPr>
+        <p:spPr>
+          <a:xfrm>
+            <a:off x="457200" y="1124744"/>
+            <a:ext cx="8229600" cy="5040560"/>
+          </a:xfrm>
+          <a:effectLst>
+            <a:outerShdw blurRad="50800" dist="25400" dir="2700000" algn="tl" rotWithShape="0">
+              <a:prstClr val="black">
+                <a:alpha val="15000"/>
+              </a:prstClr>
+            </a:outerShdw>
+          </a:effectLst>
+        </p:spPr>
+        <p:txBody>
+          <a:bodyPr anchor="ctr" anchorCtr="1">
+            <a:normAutofit/>
+          </a:bodyPr>
+          <a:lstStyle/>
+          <a:p>
+            <a:pPr indent="0">
+              <a:lnSpc>
+                <a:spcPct val="110000"/>
+              </a:lnSpc>
+              <a:spcBef>
+                <a:spcPts val="0"/>
+              </a:spcBef>
+              <a:buNone/>
+            </a:pPr>
+            <a:r>
+              <a:rPr lang="pt-PT" sz="3600" dirty="0" smtClean="0">
+                <a:solidFill>
+                  <a:schemeClr val="tx1">
+                    <a:lumMod val="85000"/>
+                    <a:lumOff val="15000"/>
+                  </a:schemeClr>
+                </a:solidFill>
+                <a:latin typeface="MetaSerif-Book" pitchFamily="34" charset="0"/>
+              </a:rPr>
+              <a:t>Performance can be increased</a:t>
+            </a:r>
+          </a:p>
+        </p:txBody>
+      </p:sp>
+      <p:sp>
+        <p:nvSpPr>
+          <p:cNvPr id="4" name="Slide Number Placeholder 3"/>
+          <p:cNvSpPr>
+            <a:spLocks noGrp="1"/>
+          </p:cNvSpPr>
+          <p:nvPr>
+            <p:ph type="sldNum" sz="quarter" idx="12"/>
+          </p:nvPr>
+        </p:nvSpPr>
+        <p:spPr/>
+        <p:txBody>
+          <a:bodyPr/>
+          <a:lstStyle/>
+          <a:p>
+            <a:fld id="{AF2DD60D-AE1E-4B35-90D2-0ABAEDD7A6F5}" type="slidenum">
+              <a:rPr lang="pt-PT" smtClean="0"/>
+              <a:pPr/>
+              <a:t>16</a:t>
+            </a:fld>
+            <a:endParaRPr lang="pt-PT" dirty="0"/>
+          </a:p>
+        </p:txBody>
+      </p:sp>
+    </p:spTree>
+  </p:cSld>
+  <p:clrMapOvr>
+    <a:masterClrMapping/>
+  </p:clrMapOvr>
+  <p:timing>
+    <p:tnLst>
+      <p:par>
+        <p:cTn id="1" dur="indefinite" restart="never" nodeType="tmRoot"/>
+      </p:par>
+    </p:tnLst>
+  </p:timing>
+</p:sld>
+</file>
+
+<file path=ppt/slides/slide17.xml><?xml version="1.0" encoding="utf-8"?>
 <p:sld xmlns:a="http://schemas.openxmlformats.org/drawingml/2006/main" xmlns:r="http://schemas.openxmlformats.org/officeDocument/2006/relationships" xmlns:p="http://schemas.openxmlformats.org/presentationml/2006/main">
   <p:cSld>
     <p:spTree>
@@ -4065,7 +4930,7 @@
 </p:sld>
 </file>
 
-<file path=ppt/slides/slide12.xml><?xml version="1.0" encoding="utf-8"?>
+<file path=ppt/slides/slide18.xml><?xml version="1.0" encoding="utf-8"?>
 <p:sld xmlns:a="http://schemas.openxmlformats.org/drawingml/2006/main" xmlns:r="http://schemas.openxmlformats.org/officeDocument/2006/relationships" xmlns:p="http://schemas.openxmlformats.org/presentationml/2006/main">
   <p:cSld>
     <p:spTree>
@@ -4152,7 +5017,7 @@
           </a:effectLst>
         </p:spPr>
         <p:txBody>
-          <a:bodyPr anchor="ctr" anchorCtr="0">
+          <a:bodyPr anchor="ctr" anchorCtr="1">
             <a:normAutofit/>
           </a:bodyPr>
           <a:lstStyle/>
@@ -4196,7 +5061,7 @@
             <a:fld id="{AF2DD60D-AE1E-4B35-90D2-0ABAEDD7A6F5}" type="slidenum">
               <a:rPr lang="pt-PT" smtClean="0"/>
               <a:pPr/>
-              <a:t>12</a:t>
+              <a:t>18</a:t>
             </a:fld>
             <a:endParaRPr lang="pt-PT" dirty="0"/>
           </a:p>
@@ -4217,7 +5082,7 @@
 </p:sld>
 </file>
 
-<file path=ppt/slides/slide13.xml><?xml version="1.0" encoding="utf-8"?>
+<file path=ppt/slides/slide19.xml><?xml version="1.0" encoding="utf-8"?>
 <p:sld xmlns:a="http://schemas.openxmlformats.org/drawingml/2006/main" xmlns:r="http://schemas.openxmlformats.org/officeDocument/2006/relationships" xmlns:p="http://schemas.openxmlformats.org/presentationml/2006/main">
   <p:cSld>
     <p:spTree>
@@ -4304,7 +5169,7 @@
           </a:effectLst>
         </p:spPr>
         <p:txBody>
-          <a:bodyPr anchor="ctr" anchorCtr="0">
+          <a:bodyPr anchor="ctr" anchorCtr="1">
             <a:normAutofit/>
           </a:bodyPr>
           <a:lstStyle/>
@@ -4348,7 +5213,7 @@
             <a:fld id="{AF2DD60D-AE1E-4B35-90D2-0ABAEDD7A6F5}" type="slidenum">
               <a:rPr lang="pt-PT" smtClean="0"/>
               <a:pPr/>
-              <a:t>13</a:t>
+              <a:t>19</a:t>
             </a:fld>
             <a:endParaRPr lang="pt-PT" dirty="0"/>
           </a:p>
@@ -4547,6 +5412,10 @@
           </p:nvPr>
         </p:nvSpPr>
         <p:spPr>
+          <a:xfrm>
+            <a:off x="457200" y="908720"/>
+            <a:ext cx="8229600" cy="5472608"/>
+          </a:xfrm>
           <a:effectLst>
             <a:outerShdw blurRad="50800" dist="25400" dir="2700000" algn="tl" rotWithShape="0">
               <a:prstClr val="black">
@@ -4556,15 +5425,16 @@
           </a:effectLst>
         </p:spPr>
         <p:txBody>
-          <a:bodyPr anchor="ctr" anchorCtr="0">
+          <a:bodyPr anchor="ctr" anchorCtr="1">
             <a:normAutofit/>
           </a:bodyPr>
           <a:lstStyle/>
           <a:p>
-            <a:pPr>
+            <a:pPr indent="0">
               <a:lnSpc>
                 <a:spcPct val="110000"/>
               </a:lnSpc>
+              <a:buNone/>
             </a:pPr>
             <a:r>
               <a:rPr lang="pt-PT" sz="3600" dirty="0" smtClean="0">
@@ -4576,15 +5446,8 @@
                 </a:solidFill>
                 <a:latin typeface="MetaSerif-Book" pitchFamily="34" charset="0"/>
               </a:rPr>
-              <a:t>Many software projects exist in an ever-changing environment</a:t>
-            </a:r>
-          </a:p>
-          <a:p>
-            <a:pPr>
-              <a:lnSpc>
-                <a:spcPct val="110000"/>
-              </a:lnSpc>
-            </a:pPr>
+              <a:t>Many software projects exist in an ever-changing </a:t>
+            </a:r>
             <a:r>
               <a:rPr lang="pt-PT" sz="3600" dirty="0" smtClean="0">
                 <a:solidFill>
@@ -4595,27 +5458,17 @@
                 </a:solidFill>
                 <a:latin typeface="MetaSerif-Book" pitchFamily="34" charset="0"/>
               </a:rPr>
-              <a:t>Requirements change to reflect changes in the enviroment, the industry, the client and end-users</a:t>
-            </a:r>
-          </a:p>
-          <a:p>
-            <a:pPr>
-              <a:lnSpc>
-                <a:spcPct val="110000"/>
-              </a:lnSpc>
-            </a:pPr>
-            <a:r>
-              <a:rPr lang="pt-PT" sz="3600" dirty="0" smtClean="0">
-                <a:solidFill>
-                  <a:schemeClr val="tx1">
-                    <a:lumMod val="85000"/>
-                    <a:lumOff val="15000"/>
-                  </a:schemeClr>
-                </a:solidFill>
-                <a:latin typeface="MetaSerif-Book" pitchFamily="34" charset="0"/>
-              </a:rPr>
-              <a:t>Modifying a system is costly</a:t>
-            </a:r>
+              <a:t>environment</a:t>
+            </a:r>
+            <a:endParaRPr lang="pt-PT" sz="3600" dirty="0" smtClean="0">
+              <a:solidFill>
+                <a:schemeClr val="tx1">
+                  <a:lumMod val="85000"/>
+                  <a:lumOff val="15000"/>
+                </a:schemeClr>
+              </a:solidFill>
+              <a:latin typeface="MetaSerif-Book" pitchFamily="34" charset="0"/>
+            </a:endParaRPr>
           </a:p>
         </p:txBody>
       </p:sp>
@@ -4659,6 +5512,355 @@
 </file>
 
 <file path=ppt/slides/slide4.xml><?xml version="1.0" encoding="utf-8"?>
+<p:sld xmlns:a="http://schemas.openxmlformats.org/drawingml/2006/main" xmlns:r="http://schemas.openxmlformats.org/officeDocument/2006/relationships" xmlns:p="http://schemas.openxmlformats.org/presentationml/2006/main">
+  <p:cSld>
+    <p:spTree>
+      <p:nvGrpSpPr>
+        <p:cNvPr id="1" name=""/>
+        <p:cNvGrpSpPr/>
+        <p:nvPr/>
+      </p:nvGrpSpPr>
+      <p:grpSpPr>
+        <a:xfrm>
+          <a:off x="0" y="0"/>
+          <a:ext cx="0" cy="0"/>
+          <a:chOff x="0" y="0"/>
+          <a:chExt cx="0" cy="0"/>
+        </a:xfrm>
+      </p:grpSpPr>
+      <p:sp>
+        <p:nvSpPr>
+          <p:cNvPr id="2" name="Title 1"/>
+          <p:cNvSpPr>
+            <a:spLocks noGrp="1"/>
+          </p:cNvSpPr>
+          <p:nvPr>
+            <p:ph type="title"/>
+          </p:nvPr>
+        </p:nvSpPr>
+        <p:spPr>
+          <a:xfrm>
+            <a:off x="5868144" y="188640"/>
+            <a:ext cx="3275856" cy="706090"/>
+          </a:xfrm>
+          <a:solidFill>
+            <a:schemeClr val="tx1">
+              <a:alpha val="90000"/>
+            </a:schemeClr>
+          </a:solidFill>
+        </p:spPr>
+        <p:txBody>
+          <a:bodyPr rIns="144000">
+            <a:normAutofit/>
+          </a:bodyPr>
+          <a:lstStyle/>
+          <a:p>
+            <a:pPr algn="r"/>
+            <a:r>
+              <a:rPr lang="pt-PT" sz="3200" dirty="0" smtClean="0">
+                <a:solidFill>
+                  <a:schemeClr val="bg1"/>
+                </a:solidFill>
+                <a:latin typeface="League Gothic" pitchFamily="50" charset="0"/>
+              </a:rPr>
+              <a:t>Context</a:t>
+            </a:r>
+            <a:endParaRPr lang="pt-PT" sz="3200" dirty="0">
+              <a:solidFill>
+                <a:schemeClr val="bg1"/>
+              </a:solidFill>
+              <a:latin typeface="League Gothic" pitchFamily="50" charset="0"/>
+            </a:endParaRPr>
+          </a:p>
+        </p:txBody>
+      </p:sp>
+      <p:sp>
+        <p:nvSpPr>
+          <p:cNvPr id="3" name="Content Placeholder 2"/>
+          <p:cNvSpPr>
+            <a:spLocks noGrp="1"/>
+          </p:cNvSpPr>
+          <p:nvPr>
+            <p:ph idx="1"/>
+          </p:nvPr>
+        </p:nvSpPr>
+        <p:spPr>
+          <a:xfrm>
+            <a:off x="457200" y="908720"/>
+            <a:ext cx="8229600" cy="5472608"/>
+          </a:xfrm>
+          <a:effectLst>
+            <a:outerShdw blurRad="50800" dist="25400" dir="2700000" algn="tl" rotWithShape="0">
+              <a:prstClr val="black">
+                <a:alpha val="15000"/>
+              </a:prstClr>
+            </a:outerShdw>
+          </a:effectLst>
+        </p:spPr>
+        <p:txBody>
+          <a:bodyPr anchor="ctr" anchorCtr="1">
+            <a:normAutofit/>
+          </a:bodyPr>
+          <a:lstStyle/>
+          <a:p>
+            <a:pPr indent="0">
+              <a:lnSpc>
+                <a:spcPct val="110000"/>
+              </a:lnSpc>
+              <a:buNone/>
+            </a:pPr>
+            <a:r>
+              <a:rPr lang="pt-PT" sz="3600" dirty="0" smtClean="0">
+                <a:solidFill>
+                  <a:schemeClr val="tx1">
+                    <a:lumMod val="85000"/>
+                    <a:lumOff val="15000"/>
+                  </a:schemeClr>
+                </a:solidFill>
+                <a:latin typeface="MetaSerif-Book" pitchFamily="34" charset="0"/>
+              </a:rPr>
+              <a:t>Requirements </a:t>
+            </a:r>
+            <a:r>
+              <a:rPr lang="pt-PT" sz="3600" dirty="0" smtClean="0">
+                <a:solidFill>
+                  <a:schemeClr val="tx1">
+                    <a:lumMod val="85000"/>
+                    <a:lumOff val="15000"/>
+                  </a:schemeClr>
+                </a:solidFill>
+                <a:latin typeface="MetaSerif-Book" pitchFamily="34" charset="0"/>
+              </a:rPr>
+              <a:t>change to reflect changes in the enviroment, the industry, the client and </a:t>
+            </a:r>
+            <a:r>
+              <a:rPr lang="pt-PT" sz="3600" dirty="0" smtClean="0">
+                <a:solidFill>
+                  <a:schemeClr val="tx1">
+                    <a:lumMod val="85000"/>
+                    <a:lumOff val="15000"/>
+                  </a:schemeClr>
+                </a:solidFill>
+                <a:latin typeface="MetaSerif-Book" pitchFamily="34" charset="0"/>
+              </a:rPr>
+              <a:t>end-users</a:t>
+            </a:r>
+            <a:endParaRPr lang="pt-PT" sz="3600" dirty="0" smtClean="0">
+              <a:solidFill>
+                <a:schemeClr val="tx1">
+                  <a:lumMod val="85000"/>
+                  <a:lumOff val="15000"/>
+                </a:schemeClr>
+              </a:solidFill>
+              <a:latin typeface="MetaSerif-Book" pitchFamily="34" charset="0"/>
+            </a:endParaRPr>
+          </a:p>
+        </p:txBody>
+      </p:sp>
+      <p:sp>
+        <p:nvSpPr>
+          <p:cNvPr id="4" name="Slide Number Placeholder 3"/>
+          <p:cNvSpPr>
+            <a:spLocks noGrp="1"/>
+          </p:cNvSpPr>
+          <p:nvPr>
+            <p:ph type="sldNum" sz="quarter" idx="12"/>
+          </p:nvPr>
+        </p:nvSpPr>
+        <p:spPr/>
+        <p:txBody>
+          <a:bodyPr/>
+          <a:lstStyle/>
+          <a:p>
+            <a:fld id="{AF2DD60D-AE1E-4B35-90D2-0ABAEDD7A6F5}" type="slidenum">
+              <a:rPr lang="pt-PT" smtClean="0"/>
+              <a:pPr/>
+              <a:t>4</a:t>
+            </a:fld>
+            <a:endParaRPr lang="pt-PT" dirty="0"/>
+          </a:p>
+        </p:txBody>
+      </p:sp>
+    </p:spTree>
+  </p:cSld>
+  <p:clrMapOvr>
+    <a:masterClrMapping/>
+  </p:clrMapOvr>
+  <p:timing>
+    <p:tnLst>
+      <p:par>
+        <p:cTn id="1" dur="indefinite" restart="never" nodeType="tmRoot"/>
+      </p:par>
+    </p:tnLst>
+  </p:timing>
+</p:sld>
+</file>
+
+<file path=ppt/slides/slide5.xml><?xml version="1.0" encoding="utf-8"?>
+<p:sld xmlns:a="http://schemas.openxmlformats.org/drawingml/2006/main" xmlns:r="http://schemas.openxmlformats.org/officeDocument/2006/relationships" xmlns:p="http://schemas.openxmlformats.org/presentationml/2006/main">
+  <p:cSld>
+    <p:spTree>
+      <p:nvGrpSpPr>
+        <p:cNvPr id="1" name=""/>
+        <p:cNvGrpSpPr/>
+        <p:nvPr/>
+      </p:nvGrpSpPr>
+      <p:grpSpPr>
+        <a:xfrm>
+          <a:off x="0" y="0"/>
+          <a:ext cx="0" cy="0"/>
+          <a:chOff x="0" y="0"/>
+          <a:chExt cx="0" cy="0"/>
+        </a:xfrm>
+      </p:grpSpPr>
+      <p:sp>
+        <p:nvSpPr>
+          <p:cNvPr id="2" name="Title 1"/>
+          <p:cNvSpPr>
+            <a:spLocks noGrp="1"/>
+          </p:cNvSpPr>
+          <p:nvPr>
+            <p:ph type="title"/>
+          </p:nvPr>
+        </p:nvSpPr>
+        <p:spPr>
+          <a:xfrm>
+            <a:off x="5868144" y="188640"/>
+            <a:ext cx="3275856" cy="706090"/>
+          </a:xfrm>
+          <a:solidFill>
+            <a:schemeClr val="tx1">
+              <a:alpha val="90000"/>
+            </a:schemeClr>
+          </a:solidFill>
+        </p:spPr>
+        <p:txBody>
+          <a:bodyPr rIns="144000">
+            <a:normAutofit/>
+          </a:bodyPr>
+          <a:lstStyle/>
+          <a:p>
+            <a:pPr algn="r"/>
+            <a:r>
+              <a:rPr lang="pt-PT" sz="3200" dirty="0" smtClean="0">
+                <a:solidFill>
+                  <a:schemeClr val="bg1"/>
+                </a:solidFill>
+                <a:latin typeface="League Gothic" pitchFamily="50" charset="0"/>
+              </a:rPr>
+              <a:t>Context</a:t>
+            </a:r>
+            <a:endParaRPr lang="pt-PT" sz="3200" dirty="0">
+              <a:solidFill>
+                <a:schemeClr val="bg1"/>
+              </a:solidFill>
+              <a:latin typeface="League Gothic" pitchFamily="50" charset="0"/>
+            </a:endParaRPr>
+          </a:p>
+        </p:txBody>
+      </p:sp>
+      <p:sp>
+        <p:nvSpPr>
+          <p:cNvPr id="3" name="Content Placeholder 2"/>
+          <p:cNvSpPr>
+            <a:spLocks noGrp="1"/>
+          </p:cNvSpPr>
+          <p:nvPr>
+            <p:ph idx="1"/>
+          </p:nvPr>
+        </p:nvSpPr>
+        <p:spPr>
+          <a:xfrm>
+            <a:off x="457200" y="908720"/>
+            <a:ext cx="8229600" cy="5472608"/>
+          </a:xfrm>
+          <a:effectLst>
+            <a:outerShdw blurRad="50800" dist="25400" dir="2700000" algn="tl" rotWithShape="0">
+              <a:prstClr val="black">
+                <a:alpha val="15000"/>
+              </a:prstClr>
+            </a:outerShdw>
+          </a:effectLst>
+        </p:spPr>
+        <p:txBody>
+          <a:bodyPr anchor="ctr" anchorCtr="0">
+            <a:normAutofit/>
+          </a:bodyPr>
+          <a:lstStyle/>
+          <a:p>
+            <a:pPr algn="ctr">
+              <a:lnSpc>
+                <a:spcPct val="110000"/>
+              </a:lnSpc>
+              <a:buNone/>
+            </a:pPr>
+            <a:r>
+              <a:rPr lang="pt-PT" sz="3600" dirty="0" smtClean="0">
+                <a:solidFill>
+                  <a:schemeClr val="tx1">
+                    <a:lumMod val="85000"/>
+                    <a:lumOff val="15000"/>
+                  </a:schemeClr>
+                </a:solidFill>
+                <a:latin typeface="MetaSerif-Book" pitchFamily="34" charset="0"/>
+              </a:rPr>
+              <a:t>Modifying </a:t>
+            </a:r>
+            <a:r>
+              <a:rPr lang="pt-PT" sz="3600" dirty="0" smtClean="0">
+                <a:solidFill>
+                  <a:schemeClr val="tx1">
+                    <a:lumMod val="85000"/>
+                    <a:lumOff val="15000"/>
+                  </a:schemeClr>
+                </a:solidFill>
+                <a:latin typeface="MetaSerif-Book" pitchFamily="34" charset="0"/>
+              </a:rPr>
+              <a:t>a system is costly</a:t>
+            </a:r>
+          </a:p>
+        </p:txBody>
+      </p:sp>
+      <p:sp>
+        <p:nvSpPr>
+          <p:cNvPr id="4" name="Slide Number Placeholder 3"/>
+          <p:cNvSpPr>
+            <a:spLocks noGrp="1"/>
+          </p:cNvSpPr>
+          <p:nvPr>
+            <p:ph type="sldNum" sz="quarter" idx="12"/>
+          </p:nvPr>
+        </p:nvSpPr>
+        <p:spPr/>
+        <p:txBody>
+          <a:bodyPr/>
+          <a:lstStyle/>
+          <a:p>
+            <a:fld id="{AF2DD60D-AE1E-4B35-90D2-0ABAEDD7A6F5}" type="slidenum">
+              <a:rPr lang="pt-PT" smtClean="0"/>
+              <a:pPr/>
+              <a:t>5</a:t>
+            </a:fld>
+            <a:endParaRPr lang="pt-PT" dirty="0"/>
+          </a:p>
+        </p:txBody>
+      </p:sp>
+    </p:spTree>
+  </p:cSld>
+  <p:clrMapOvr>
+    <a:masterClrMapping/>
+  </p:clrMapOvr>
+  <p:timing>
+    <p:tnLst>
+      <p:par>
+        <p:cTn id="1" dur="indefinite" restart="never" nodeType="tmRoot"/>
+      </p:par>
+    </p:tnLst>
+  </p:timing>
+</p:sld>
+</file>
+
+<file path=ppt/slides/slide6.xml><?xml version="1.0" encoding="utf-8"?>
 <p:sld xmlns:a="http://schemas.openxmlformats.org/drawingml/2006/main" xmlns:r="http://schemas.openxmlformats.org/officeDocument/2006/relationships" xmlns:p="http://schemas.openxmlformats.org/presentationml/2006/main">
   <p:cSld>
     <p:spTree>
@@ -4796,214 +5998,6 @@
 </p:sld>
 </file>
 
-<file path=ppt/slides/slide5.xml><?xml version="1.0" encoding="utf-8"?>
-<p:sld xmlns:a="http://schemas.openxmlformats.org/drawingml/2006/main" xmlns:r="http://schemas.openxmlformats.org/officeDocument/2006/relationships" xmlns:p="http://schemas.openxmlformats.org/presentationml/2006/main">
-  <p:cSld>
-    <p:spTree>
-      <p:nvGrpSpPr>
-        <p:cNvPr id="1" name=""/>
-        <p:cNvGrpSpPr/>
-        <p:nvPr/>
-      </p:nvGrpSpPr>
-      <p:grpSpPr>
-        <a:xfrm>
-          <a:off x="0" y="0"/>
-          <a:ext cx="0" cy="0"/>
-          <a:chOff x="0" y="0"/>
-          <a:chExt cx="0" cy="0"/>
-        </a:xfrm>
-      </p:grpSpPr>
-      <p:pic>
-        <p:nvPicPr>
-          <p:cNvPr id="1026" name="Picture 2" descr="C:\Users\jgradim\Documents\thesis\presentations\work.jpg"/>
-          <p:cNvPicPr>
-            <a:picLocks noChangeAspect="1" noChangeArrowheads="1"/>
-          </p:cNvPicPr>
-          <p:nvPr/>
-        </p:nvPicPr>
-        <p:blipFill>
-          <a:blip r:embed="rId2" cstate="print"/>
-          <a:srcRect r="11068"/>
-          <a:stretch>
-            <a:fillRect/>
-          </a:stretch>
-        </p:blipFill>
-        <p:spPr bwMode="auto">
-          <a:xfrm>
-            <a:off x="0" y="0"/>
-            <a:ext cx="9144000" cy="6858000"/>
-          </a:xfrm>
-          <a:prstGeom prst="rect">
-            <a:avLst/>
-          </a:prstGeom>
-          <a:noFill/>
-        </p:spPr>
-      </p:pic>
-      <p:sp>
-        <p:nvSpPr>
-          <p:cNvPr id="2" name="Title 1"/>
-          <p:cNvSpPr>
-            <a:spLocks noGrp="1"/>
-          </p:cNvSpPr>
-          <p:nvPr>
-            <p:ph type="title"/>
-          </p:nvPr>
-        </p:nvSpPr>
-        <p:spPr>
-          <a:xfrm>
-            <a:off x="0" y="2941730"/>
-            <a:ext cx="4644008" cy="974540"/>
-          </a:xfrm>
-          <a:solidFill>
-            <a:schemeClr val="tx1">
-              <a:alpha val="90000"/>
-            </a:schemeClr>
-          </a:solidFill>
-        </p:spPr>
-        <p:txBody>
-          <a:bodyPr lIns="360000">
-            <a:noAutofit/>
-          </a:bodyPr>
-          <a:lstStyle/>
-          <a:p>
-            <a:pPr algn="l"/>
-            <a:r>
-              <a:rPr lang="pt-PT" sz="5400" dirty="0" smtClean="0">
-                <a:solidFill>
-                  <a:schemeClr val="bg1"/>
-                </a:solidFill>
-                <a:latin typeface="League Gothic" pitchFamily="50" charset="0"/>
-              </a:rPr>
-              <a:t>Approach &amp; Results</a:t>
-            </a:r>
-            <a:endParaRPr lang="pt-PT" sz="5400" dirty="0">
-              <a:solidFill>
-                <a:schemeClr val="bg1"/>
-              </a:solidFill>
-              <a:latin typeface="League Gothic" pitchFamily="50" charset="0"/>
-            </a:endParaRPr>
-          </a:p>
-        </p:txBody>
-      </p:sp>
-    </p:spTree>
-  </p:cSld>
-  <p:clrMapOvr>
-    <a:masterClrMapping/>
-  </p:clrMapOvr>
-  <p:timing>
-    <p:tnLst>
-      <p:par>
-        <p:cTn id="1" dur="indefinite" restart="never" nodeType="tmRoot"/>
-      </p:par>
-    </p:tnLst>
-  </p:timing>
-</p:sld>
-</file>
-
-<file path=ppt/slides/slide6.xml><?xml version="1.0" encoding="utf-8"?>
-<p:sld xmlns:a="http://schemas.openxmlformats.org/drawingml/2006/main" xmlns:r="http://schemas.openxmlformats.org/officeDocument/2006/relationships" xmlns:p="http://schemas.openxmlformats.org/presentationml/2006/main">
-  <p:cSld>
-    <p:spTree>
-      <p:nvGrpSpPr>
-        <p:cNvPr id="1" name=""/>
-        <p:cNvGrpSpPr/>
-        <p:nvPr/>
-      </p:nvGrpSpPr>
-      <p:grpSpPr>
-        <a:xfrm>
-          <a:off x="0" y="0"/>
-          <a:ext cx="0" cy="0"/>
-          <a:chOff x="0" y="0"/>
-          <a:chExt cx="0" cy="0"/>
-        </a:xfrm>
-      </p:grpSpPr>
-      <p:pic>
-        <p:nvPicPr>
-          <p:cNvPr id="3074" name="Picture 2" descr="C:\Users\jgradim\Documents\thesis\presentations\old_books.jpg"/>
-          <p:cNvPicPr>
-            <a:picLocks noChangeAspect="1" noChangeArrowheads="1"/>
-          </p:cNvPicPr>
-          <p:nvPr/>
-        </p:nvPicPr>
-        <p:blipFill>
-          <a:blip r:embed="rId2" cstate="print"/>
-          <a:srcRect r="11066"/>
-          <a:stretch>
-            <a:fillRect/>
-          </a:stretch>
-        </p:blipFill>
-        <p:spPr bwMode="auto">
-          <a:xfrm>
-            <a:off x="0" y="0"/>
-            <a:ext cx="9144000" cy="6858000"/>
-          </a:xfrm>
-          <a:prstGeom prst="rect">
-            <a:avLst/>
-          </a:prstGeom>
-          <a:noFill/>
-        </p:spPr>
-      </p:pic>
-      <p:sp>
-        <p:nvSpPr>
-          <p:cNvPr id="2" name="Title 1"/>
-          <p:cNvSpPr>
-            <a:spLocks noGrp="1"/>
-          </p:cNvSpPr>
-          <p:nvPr>
-            <p:ph type="title"/>
-          </p:nvPr>
-        </p:nvSpPr>
-        <p:spPr>
-          <a:xfrm>
-            <a:off x="0" y="2941730"/>
-            <a:ext cx="4644008" cy="974540"/>
-          </a:xfrm>
-          <a:solidFill>
-            <a:schemeClr val="tx1">
-              <a:alpha val="90000"/>
-            </a:schemeClr>
-          </a:solidFill>
-        </p:spPr>
-        <p:txBody>
-          <a:bodyPr lIns="360000">
-            <a:noAutofit/>
-          </a:bodyPr>
-          <a:lstStyle/>
-          <a:p>
-            <a:pPr algn="l"/>
-            <a:r>
-              <a:rPr lang="pt-PT" sz="5400" dirty="0" smtClean="0">
-                <a:solidFill>
-                  <a:schemeClr val="bg1"/>
-                </a:solidFill>
-                <a:latin typeface="League Gothic" pitchFamily="50" charset="0"/>
-              </a:rPr>
-              <a:t>Conclusions</a:t>
-            </a:r>
-            <a:endParaRPr lang="pt-PT" sz="5400" dirty="0">
-              <a:solidFill>
-                <a:schemeClr val="bg1"/>
-              </a:solidFill>
-              <a:latin typeface="League Gothic" pitchFamily="50" charset="0"/>
-            </a:endParaRPr>
-          </a:p>
-        </p:txBody>
-      </p:sp>
-    </p:spTree>
-  </p:cSld>
-  <p:clrMapOvr>
-    <a:masterClrMapping/>
-  </p:clrMapOvr>
-  <p:timing>
-    <p:tnLst>
-      <p:par>
-        <p:cTn id="1" dur="indefinite" restart="never" nodeType="tmRoot"/>
-      </p:par>
-    </p:tnLst>
-  </p:timing>
-</p:sld>
-</file>
-
 <file path=ppt/slides/slide7.xml><?xml version="1.0" encoding="utf-8"?>
 <p:sld xmlns:a="http://schemas.openxmlformats.org/drawingml/2006/main" xmlns:r="http://schemas.openxmlformats.org/officeDocument/2006/relationships" xmlns:p="http://schemas.openxmlformats.org/presentationml/2006/main">
   <p:cSld>
@@ -5056,7 +6050,7 @@
                 </a:solidFill>
                 <a:latin typeface="League Gothic" pitchFamily="50" charset="0"/>
               </a:rPr>
-              <a:t>AOMs</a:t>
+              <a:t>Methodologies</a:t>
             </a:r>
             <a:endParaRPr lang="pt-PT" sz="3200" dirty="0">
               <a:solidFill>
@@ -5079,8 +6073,8 @@
         </p:nvSpPr>
         <p:spPr>
           <a:xfrm>
-            <a:off x="457200" y="1124744"/>
-            <a:ext cx="8229600" cy="5040560"/>
+            <a:off x="457200" y="908720"/>
+            <a:ext cx="8229600" cy="5472608"/>
           </a:xfrm>
           <a:effectLst>
             <a:outerShdw blurRad="50800" dist="25400" dir="2700000" algn="tl" rotWithShape="0">
@@ -5091,18 +6085,15 @@
           </a:effectLst>
         </p:spPr>
         <p:txBody>
-          <a:bodyPr anchor="ctr" anchorCtr="0">
+          <a:bodyPr anchor="ctr" anchorCtr="1">
             <a:normAutofit/>
           </a:bodyPr>
           <a:lstStyle/>
           <a:p>
-            <a:pPr indent="0">
+            <a:pPr algn="ctr">
               <a:lnSpc>
                 <a:spcPct val="110000"/>
               </a:lnSpc>
-              <a:spcBef>
-                <a:spcPts val="0"/>
-              </a:spcBef>
               <a:buNone/>
             </a:pPr>
             <a:r>
@@ -5115,8 +6106,17 @@
                 </a:solidFill>
                 <a:latin typeface="MetaSerif-Book" pitchFamily="34" charset="0"/>
               </a:rPr>
-              <a:t>AOM architectures provide the best framework for building adaptable software systems</a:t>
-            </a:r>
+              <a:t>Domain-Driven Design</a:t>
+            </a:r>
+            <a:endParaRPr lang="pt-PT" sz="3600" dirty="0" smtClean="0">
+              <a:solidFill>
+                <a:schemeClr val="tx1">
+                  <a:lumMod val="85000"/>
+                  <a:lumOff val="15000"/>
+                </a:schemeClr>
+              </a:solidFill>
+              <a:latin typeface="MetaSerif-Book" pitchFamily="34" charset="0"/>
+            </a:endParaRPr>
           </a:p>
         </p:txBody>
       </p:sp>
@@ -5211,7 +6211,7 @@
                 </a:solidFill>
                 <a:latin typeface="League Gothic" pitchFamily="50" charset="0"/>
               </a:rPr>
-              <a:t>Rails &amp; MVC</a:t>
+              <a:t>Generative Programming</a:t>
             </a:r>
             <a:endParaRPr lang="pt-PT" sz="3200" dirty="0">
               <a:solidFill>
@@ -5234,8 +6234,8 @@
         </p:nvSpPr>
         <p:spPr>
           <a:xfrm>
-            <a:off x="457200" y="1124744"/>
-            <a:ext cx="8229600" cy="5040560"/>
+            <a:off x="457200" y="908720"/>
+            <a:ext cx="8229600" cy="5472608"/>
           </a:xfrm>
           <a:effectLst>
             <a:outerShdw blurRad="50800" dist="25400" dir="2700000" algn="tl" rotWithShape="0">
@@ -5246,18 +6246,15 @@
           </a:effectLst>
         </p:spPr>
         <p:txBody>
-          <a:bodyPr anchor="ctr" anchorCtr="0">
+          <a:bodyPr anchor="ctr" anchorCtr="1">
             <a:normAutofit/>
           </a:bodyPr>
           <a:lstStyle/>
           <a:p>
-            <a:pPr indent="0">
+            <a:pPr algn="ctr">
               <a:lnSpc>
                 <a:spcPct val="110000"/>
               </a:lnSpc>
-              <a:spcBef>
-                <a:spcPts val="0"/>
-              </a:spcBef>
               <a:buNone/>
             </a:pPr>
             <a:r>
@@ -5270,8 +6267,33 @@
                 </a:solidFill>
                 <a:latin typeface="MetaSerif-Book" pitchFamily="34" charset="0"/>
               </a:rPr>
-              <a:t>MVC architecture used by Rails can coexist harmoniously with AOM design patterns, </a:t>
-            </a:r>
+              <a:t>Software Product Lines</a:t>
+            </a:r>
+          </a:p>
+          <a:p>
+            <a:pPr algn="ctr">
+              <a:lnSpc>
+                <a:spcPct val="110000"/>
+              </a:lnSpc>
+              <a:buNone/>
+            </a:pPr>
+            <a:endParaRPr lang="pt-PT" sz="3600" dirty="0" smtClean="0">
+              <a:solidFill>
+                <a:schemeClr val="tx1">
+                  <a:lumMod val="85000"/>
+                  <a:lumOff val="15000"/>
+                </a:schemeClr>
+              </a:solidFill>
+              <a:latin typeface="MetaSerif-Book" pitchFamily="34" charset="0"/>
+            </a:endParaRPr>
+          </a:p>
+          <a:p>
+            <a:pPr algn="ctr">
+              <a:lnSpc>
+                <a:spcPct val="110000"/>
+              </a:lnSpc>
+              <a:buNone/>
+            </a:pPr>
             <a:r>
               <a:rPr lang="pt-PT" sz="3600" dirty="0" smtClean="0">
                 <a:solidFill>
@@ -5282,7 +6304,44 @@
                 </a:solidFill>
                 <a:latin typeface="MetaSerif-Book" pitchFamily="34" charset="0"/>
               </a:rPr>
-              <a:t>especially with the AR engine</a:t>
+              <a:t>Model-Driven Engineering</a:t>
+            </a:r>
+          </a:p>
+          <a:p>
+            <a:pPr algn="ctr">
+              <a:lnSpc>
+                <a:spcPct val="110000"/>
+              </a:lnSpc>
+              <a:buNone/>
+            </a:pPr>
+            <a:endParaRPr lang="pt-PT" sz="3600" dirty="0" smtClean="0">
+              <a:solidFill>
+                <a:schemeClr val="tx1">
+                  <a:lumMod val="85000"/>
+                  <a:lumOff val="15000"/>
+                </a:schemeClr>
+              </a:solidFill>
+              <a:latin typeface="MetaSerif-Book" pitchFamily="34" charset="0"/>
+            </a:endParaRPr>
+          </a:p>
+          <a:p>
+            <a:pPr algn="ctr">
+              <a:lnSpc>
+                <a:spcPct val="110000"/>
+              </a:lnSpc>
+              <a:buNone/>
+            </a:pPr>
+            <a:r>
+              <a:rPr lang="pt-PT" sz="3600" dirty="0" smtClean="0">
+                <a:solidFill>
+                  <a:schemeClr val="tx1">
+                    <a:lumMod val="85000"/>
+                    <a:lumOff val="15000"/>
+                  </a:schemeClr>
+                </a:solidFill>
+                <a:latin typeface="MetaSerif-Book" pitchFamily="34" charset="0"/>
+              </a:rPr>
+              <a:t>Frameworks (e.g. Rails scaffolding)</a:t>
             </a:r>
             <a:endParaRPr lang="pt-PT" sz="3600" dirty="0" smtClean="0">
               <a:solidFill>
@@ -5387,7 +6446,7 @@
                 </a:solidFill>
                 <a:latin typeface="League Gothic" pitchFamily="50" charset="0"/>
               </a:rPr>
-              <a:t>Variability</a:t>
+              <a:t>Metaprogramming</a:t>
             </a:r>
             <a:endParaRPr lang="pt-PT" sz="3200" dirty="0">
               <a:solidFill>
@@ -5410,8 +6469,8 @@
         </p:nvSpPr>
         <p:spPr>
           <a:xfrm>
-            <a:off x="457200" y="1124744"/>
-            <a:ext cx="8229600" cy="5040560"/>
+            <a:off x="457200" y="908720"/>
+            <a:ext cx="8229600" cy="5472608"/>
           </a:xfrm>
           <a:effectLst>
             <a:outerShdw blurRad="50800" dist="25400" dir="2700000" algn="tl" rotWithShape="0">
@@ -5422,20 +6481,66 @@
           </a:effectLst>
         </p:spPr>
         <p:txBody>
-          <a:bodyPr anchor="ctr" anchorCtr="0">
+          <a:bodyPr anchor="ctr" anchorCtr="1">
             <a:normAutofit/>
           </a:bodyPr>
           <a:lstStyle/>
           <a:p>
-            <a:pPr indent="0">
+            <a:pPr algn="ctr">
               <a:lnSpc>
                 <a:spcPct val="110000"/>
               </a:lnSpc>
-              <a:spcBef>
-                <a:spcPts val="0"/>
-              </a:spcBef>
               <a:buNone/>
             </a:pPr>
+            <a:r>
+              <a:rPr lang="pt-PT" sz="3600" dirty="0" smtClean="0">
+                <a:solidFill>
+                  <a:schemeClr val="tx1">
+                    <a:lumMod val="85000"/>
+                    <a:lumOff val="15000"/>
+                  </a:schemeClr>
+                </a:solidFill>
+                <a:latin typeface="MetaSerif-Book" pitchFamily="34" charset="0"/>
+              </a:rPr>
+              <a:t>Metaprogramming</a:t>
+            </a:r>
+          </a:p>
+          <a:p>
+            <a:pPr algn="ctr">
+              <a:lnSpc>
+                <a:spcPct val="110000"/>
+              </a:lnSpc>
+              <a:buNone/>
+            </a:pPr>
+            <a:endParaRPr lang="pt-PT" sz="3600" dirty="0" smtClean="0">
+              <a:solidFill>
+                <a:schemeClr val="tx1">
+                  <a:lumMod val="85000"/>
+                  <a:lumOff val="15000"/>
+                </a:schemeClr>
+              </a:solidFill>
+              <a:latin typeface="MetaSerif-Book" pitchFamily="34" charset="0"/>
+            </a:endParaRPr>
+          </a:p>
+          <a:p>
+            <a:pPr algn="ctr">
+              <a:lnSpc>
+                <a:spcPct val="110000"/>
+              </a:lnSpc>
+              <a:buNone/>
+            </a:pPr>
+            <a:r>
+              <a:rPr lang="pt-PT" sz="3600" dirty="0" smtClean="0">
+                <a:solidFill>
+                  <a:schemeClr val="tx1">
+                    <a:lumMod val="85000"/>
+                    <a:lumOff val="15000"/>
+                  </a:schemeClr>
+                </a:solidFill>
+                <a:latin typeface="MetaSerif-Book" pitchFamily="34" charset="0"/>
+              </a:rPr>
+              <a:t>Aspect-Oriented Programming</a:t>
+            </a:r>
             <a:endParaRPr lang="pt-PT" sz="3600" dirty="0" smtClean="0">
               <a:solidFill>
                 <a:schemeClr val="tx1">

</xml_diff>

<commit_message>
Some more content, added credit for images when appropriate
</commit_message>
<xml_diff>
--- a/presentations/thesis.pptx
+++ b/presentations/thesis.pptx
@@ -5,7 +5,7 @@
     <p:sldMasterId id="2147483648" r:id="rId1"/>
   </p:sldMasterIdLst>
   <p:notesMasterIdLst>
-    <p:notesMasterId r:id="rId21"/>
+    <p:notesMasterId r:id="rId24"/>
   </p:notesMasterIdLst>
   <p:sldIdLst>
     <p:sldId id="256" r:id="rId2"/>
@@ -18,15 +18,18 @@
     <p:sldId id="273" r:id="rId9"/>
     <p:sldId id="274" r:id="rId10"/>
     <p:sldId id="275" r:id="rId11"/>
-    <p:sldId id="271" r:id="rId12"/>
-    <p:sldId id="259" r:id="rId13"/>
+    <p:sldId id="278" r:id="rId12"/>
+    <p:sldId id="271" r:id="rId13"/>
     <p:sldId id="263" r:id="rId14"/>
-    <p:sldId id="264" r:id="rId15"/>
-    <p:sldId id="269" r:id="rId16"/>
-    <p:sldId id="270" r:id="rId17"/>
-    <p:sldId id="266" r:id="rId18"/>
-    <p:sldId id="267" r:id="rId19"/>
-    <p:sldId id="268" r:id="rId20"/>
+    <p:sldId id="280" r:id="rId15"/>
+    <p:sldId id="259" r:id="rId16"/>
+    <p:sldId id="279" r:id="rId17"/>
+    <p:sldId id="264" r:id="rId18"/>
+    <p:sldId id="269" r:id="rId19"/>
+    <p:sldId id="270" r:id="rId20"/>
+    <p:sldId id="266" r:id="rId21"/>
+    <p:sldId id="267" r:id="rId22"/>
+    <p:sldId id="268" r:id="rId23"/>
   </p:sldIdLst>
   <p:sldSz cx="9144000" cy="6858000" type="screen4x3"/>
   <p:notesSz cx="6858000" cy="9144000"/>
@@ -3911,7 +3914,7 @@
                 </a:solidFill>
                 <a:latin typeface="MetaSerif-Book" pitchFamily="34" charset="0"/>
               </a:rPr>
-              <a:t>Design Patterns</a:t>
+              <a:t>Architectural Patterns</a:t>
             </a:r>
           </a:p>
           <a:p>
@@ -3948,7 +3951,7 @@
                 </a:solidFill>
                 <a:latin typeface="MetaSerif-Book" pitchFamily="34" charset="0"/>
               </a:rPr>
-              <a:t>Architectural Patterns</a:t>
+              <a:t>Design Patterns</a:t>
             </a:r>
             <a:endParaRPr lang="pt-PT" sz="3600" dirty="0" smtClean="0">
               <a:solidFill>
@@ -4018,32 +4021,6 @@
           <a:chExt cx="0" cy="0"/>
         </a:xfrm>
       </p:grpSpPr>
-      <p:pic>
-        <p:nvPicPr>
-          <p:cNvPr id="1026" name="Picture 2" descr="C:\Users\jgradim\Documents\thesis\presentations\work.jpg"/>
-          <p:cNvPicPr>
-            <a:picLocks noChangeAspect="1" noChangeArrowheads="1"/>
-          </p:cNvPicPr>
-          <p:nvPr/>
-        </p:nvPicPr>
-        <p:blipFill>
-          <a:blip r:embed="rId2" cstate="print"/>
-          <a:srcRect r="11068"/>
-          <a:stretch>
-            <a:fillRect/>
-          </a:stretch>
-        </p:blipFill>
-        <p:spPr bwMode="auto">
-          <a:xfrm>
-            <a:off x="0" y="0"/>
-            <a:ext cx="9144000" cy="6858000"/>
-          </a:xfrm>
-          <a:prstGeom prst="rect">
-            <a:avLst/>
-          </a:prstGeom>
-          <a:noFill/>
-        </p:spPr>
-      </p:pic>
       <p:sp>
         <p:nvSpPr>
           <p:cNvPr id="2" name="Title 1"/>
@@ -4056,8 +4033,8 @@
         </p:nvSpPr>
         <p:spPr>
           <a:xfrm>
-            <a:off x="0" y="2941730"/>
-            <a:ext cx="4644008" cy="974540"/>
+            <a:off x="5868144" y="188640"/>
+            <a:ext cx="3275856" cy="706090"/>
           </a:xfrm>
           <a:solidFill>
             <a:schemeClr val="tx1">
@@ -4066,27 +4043,98 @@
           </a:solidFill>
         </p:spPr>
         <p:txBody>
-          <a:bodyPr lIns="360000">
-            <a:noAutofit/>
+          <a:bodyPr rIns="144000">
+            <a:normAutofit/>
           </a:bodyPr>
           <a:lstStyle/>
           <a:p>
-            <a:pPr algn="l"/>
-            <a:r>
-              <a:rPr lang="pt-PT" sz="5400" dirty="0" smtClean="0">
+            <a:pPr algn="r"/>
+            <a:r>
+              <a:rPr lang="pt-PT" sz="3200" dirty="0" smtClean="0">
                 <a:solidFill>
                   <a:schemeClr val="bg1"/>
                 </a:solidFill>
                 <a:latin typeface="League Gothic" pitchFamily="50" charset="0"/>
               </a:rPr>
-              <a:t>Approach &amp; Results</a:t>
-            </a:r>
-            <a:endParaRPr lang="pt-PT" sz="5400" dirty="0">
+              <a:t>Adaptive Object-Models</a:t>
+            </a:r>
+            <a:endParaRPr lang="pt-PT" sz="3200" dirty="0">
               <a:solidFill>
                 <a:schemeClr val="bg1"/>
               </a:solidFill>
               <a:latin typeface="League Gothic" pitchFamily="50" charset="0"/>
             </a:endParaRPr>
+          </a:p>
+        </p:txBody>
+      </p:sp>
+      <p:sp>
+        <p:nvSpPr>
+          <p:cNvPr id="3" name="Content Placeholder 2"/>
+          <p:cNvSpPr>
+            <a:spLocks noGrp="1"/>
+          </p:cNvSpPr>
+          <p:nvPr>
+            <p:ph idx="1"/>
+          </p:nvPr>
+        </p:nvSpPr>
+        <p:spPr>
+          <a:xfrm>
+            <a:off x="457200" y="908720"/>
+            <a:ext cx="8229600" cy="5472608"/>
+          </a:xfrm>
+          <a:effectLst>
+            <a:outerShdw blurRad="50800" dist="25400" dir="2700000" algn="tl" rotWithShape="0">
+              <a:prstClr val="black">
+                <a:alpha val="15000"/>
+              </a:prstClr>
+            </a:outerShdw>
+          </a:effectLst>
+        </p:spPr>
+        <p:txBody>
+          <a:bodyPr anchor="ctr" anchorCtr="1">
+            <a:normAutofit/>
+          </a:bodyPr>
+          <a:lstStyle/>
+          <a:p>
+            <a:pPr algn="ctr">
+              <a:lnSpc>
+                <a:spcPct val="110000"/>
+              </a:lnSpc>
+              <a:buNone/>
+            </a:pPr>
+            <a:endParaRPr lang="pt-PT" sz="3600" dirty="0" smtClean="0">
+              <a:solidFill>
+                <a:schemeClr val="tx1">
+                  <a:lumMod val="85000"/>
+                  <a:lumOff val="15000"/>
+                </a:schemeClr>
+              </a:solidFill>
+              <a:latin typeface="MetaSerif-Book" pitchFamily="34" charset="0"/>
+            </a:endParaRPr>
+          </a:p>
+        </p:txBody>
+      </p:sp>
+      <p:sp>
+        <p:nvSpPr>
+          <p:cNvPr id="4" name="Slide Number Placeholder 3"/>
+          <p:cNvSpPr>
+            <a:spLocks noGrp="1"/>
+          </p:cNvSpPr>
+          <p:nvPr>
+            <p:ph type="sldNum" sz="quarter" idx="12"/>
+          </p:nvPr>
+        </p:nvSpPr>
+        <p:spPr/>
+        <p:txBody>
+          <a:bodyPr/>
+          <a:lstStyle/>
+          <a:p>
+            <a:fld id="{AF2DD60D-AE1E-4B35-90D2-0ABAEDD7A6F5}" type="slidenum">
+              <a:rPr lang="pt-PT" smtClean="0"/>
+              <a:pPr/>
+              <a:t>11</a:t>
+            </a:fld>
+            <a:endParaRPr lang="pt-PT" dirty="0"/>
           </a:p>
         </p:txBody>
       </p:sp>
@@ -4124,7 +4172,7 @@
       </p:grpSpPr>
       <p:pic>
         <p:nvPicPr>
-          <p:cNvPr id="3074" name="Picture 2" descr="C:\Users\jgradim\Documents\thesis\presentations\old_books.jpg"/>
+          <p:cNvPr id="1026" name="Picture 2" descr="C:\Users\jgradim\Documents\thesis\presentations\work.jpg"/>
           <p:cNvPicPr>
             <a:picLocks noChangeAspect="1" noChangeArrowheads="1"/>
           </p:cNvPicPr>
@@ -4132,7 +4180,7 @@
         </p:nvPicPr>
         <p:blipFill>
           <a:blip r:embed="rId2" cstate="print"/>
-          <a:srcRect r="11066"/>
+          <a:srcRect r="11068"/>
           <a:stretch>
             <a:fillRect/>
           </a:stretch>
@@ -4183,13 +4231,84 @@
                 </a:solidFill>
                 <a:latin typeface="League Gothic" pitchFamily="50" charset="0"/>
               </a:rPr>
-              <a:t>Conclusions</a:t>
+              <a:t>Approach &amp; Results</a:t>
             </a:r>
             <a:endParaRPr lang="pt-PT" sz="5400" dirty="0">
               <a:solidFill>
                 <a:schemeClr val="bg1"/>
               </a:solidFill>
               <a:latin typeface="League Gothic" pitchFamily="50" charset="0"/>
+            </a:endParaRPr>
+          </a:p>
+        </p:txBody>
+      </p:sp>
+      <p:sp>
+        <p:nvSpPr>
+          <p:cNvPr id="4" name="TextBox 3"/>
+          <p:cNvSpPr txBox="1"/>
+          <p:nvPr/>
+        </p:nvSpPr>
+        <p:spPr>
+          <a:xfrm>
+            <a:off x="1" y="6599813"/>
+            <a:ext cx="9144000" cy="246221"/>
+          </a:xfrm>
+          <a:prstGeom prst="rect">
+            <a:avLst/>
+          </a:prstGeom>
+          <a:noFill/>
+        </p:spPr>
+        <p:txBody>
+          <a:bodyPr wrap="square" rtlCol="0">
+            <a:spAutoFit/>
+          </a:bodyPr>
+          <a:lstStyle/>
+          <a:p>
+            <a:pPr algn="r"/>
+            <a:r>
+              <a:rPr lang="pt-PT" sz="1000" dirty="0" smtClean="0">
+                <a:solidFill>
+                  <a:schemeClr val="bg1"/>
+                </a:solidFill>
+                <a:effectLst>
+                  <a:outerShdw blurRad="38100" dist="38100" dir="2700000" algn="tl">
+                    <a:srgbClr val="000000">
+                      <a:alpha val="43137"/>
+                    </a:srgbClr>
+                  </a:outerShdw>
+                </a:effectLst>
+                <a:latin typeface="MetaSerif-Book" pitchFamily="34" charset="0"/>
+              </a:rPr>
+              <a:t>http://www.flickr.com/photos/ 33646230@N03 </a:t>
+            </a:r>
+            <a:r>
+              <a:rPr lang="pt-PT" sz="1000" dirty="0" smtClean="0">
+                <a:solidFill>
+                  <a:schemeClr val="bg1"/>
+                </a:solidFill>
+                <a:effectLst>
+                  <a:outerShdw blurRad="38100" dist="38100" dir="2700000" algn="tl">
+                    <a:srgbClr val="000000">
+                      <a:alpha val="43137"/>
+                    </a:srgbClr>
+                  </a:outerShdw>
+                </a:effectLst>
+                <a:latin typeface="MetaSerif-Book" pitchFamily="34" charset="0"/>
+              </a:rPr>
+              <a:t>/</a:t>
+            </a:r>
+            <a:endParaRPr lang="pt-PT" sz="1000" dirty="0">
+              <a:solidFill>
+                <a:schemeClr val="bg1"/>
+              </a:solidFill>
+              <a:effectLst>
+                <a:outerShdw blurRad="38100" dist="38100" dir="2700000" algn="tl">
+                  <a:srgbClr val="000000">
+                    <a:alpha val="43137"/>
+                  </a:srgbClr>
+                </a:outerShdw>
+              </a:effectLst>
+              <a:latin typeface="MetaSerif-Book" pitchFamily="34" charset="0"/>
             </a:endParaRPr>
           </a:p>
         </p:txBody>
@@ -4261,7 +4380,7 @@
                 </a:solidFill>
                 <a:latin typeface="League Gothic" pitchFamily="50" charset="0"/>
               </a:rPr>
-              <a:t>AOMs</a:t>
+              <a:t>Research Design</a:t>
             </a:r>
             <a:endParaRPr lang="pt-PT" sz="3200" dirty="0">
               <a:solidFill>
@@ -4301,7 +4420,7 @@
           </a:bodyPr>
           <a:lstStyle/>
           <a:p>
-            <a:pPr indent="0">
+            <a:pPr indent="0" algn="ctr">
               <a:lnSpc>
                 <a:spcPct val="110000"/>
               </a:lnSpc>
@@ -4320,8 +4439,103 @@
                 </a:solidFill>
                 <a:latin typeface="MetaSerif-Book" pitchFamily="34" charset="0"/>
               </a:rPr>
-              <a:t>AOM architectures provide the best framework for building adaptable software systems</a:t>
-            </a:r>
+              <a:t>Current Design Analysis</a:t>
+            </a:r>
+          </a:p>
+          <a:p>
+            <a:pPr indent="0" algn="ctr">
+              <a:lnSpc>
+                <a:spcPct val="110000"/>
+              </a:lnSpc>
+              <a:spcBef>
+                <a:spcPts val="0"/>
+              </a:spcBef>
+              <a:buNone/>
+            </a:pPr>
+            <a:endParaRPr lang="pt-PT" sz="3600" dirty="0" smtClean="0">
+              <a:solidFill>
+                <a:schemeClr val="tx1">
+                  <a:lumMod val="85000"/>
+                  <a:lumOff val="15000"/>
+                </a:schemeClr>
+              </a:solidFill>
+              <a:latin typeface="MetaSerif-Book" pitchFamily="34" charset="0"/>
+            </a:endParaRPr>
+          </a:p>
+          <a:p>
+            <a:pPr indent="0" algn="ctr">
+              <a:lnSpc>
+                <a:spcPct val="110000"/>
+              </a:lnSpc>
+              <a:spcBef>
+                <a:spcPts val="0"/>
+              </a:spcBef>
+              <a:buNone/>
+            </a:pPr>
+            <a:r>
+              <a:rPr lang="pt-PT" sz="3600" dirty="0" smtClean="0">
+                <a:solidFill>
+                  <a:schemeClr val="tx1">
+                    <a:lumMod val="85000"/>
+                    <a:lumOff val="15000"/>
+                  </a:schemeClr>
+                </a:solidFill>
+                <a:latin typeface="MetaSerif-Book" pitchFamily="34" charset="0"/>
+              </a:rPr>
+              <a:t>Variability Analysis</a:t>
+            </a:r>
+          </a:p>
+          <a:p>
+            <a:pPr indent="0" algn="ctr">
+              <a:lnSpc>
+                <a:spcPct val="110000"/>
+              </a:lnSpc>
+              <a:spcBef>
+                <a:spcPts val="0"/>
+              </a:spcBef>
+              <a:buNone/>
+            </a:pPr>
+            <a:endParaRPr lang="pt-PT" sz="3600" dirty="0" smtClean="0">
+              <a:solidFill>
+                <a:schemeClr val="tx1">
+                  <a:lumMod val="85000"/>
+                  <a:lumOff val="15000"/>
+                </a:schemeClr>
+              </a:solidFill>
+              <a:latin typeface="MetaSerif-Book" pitchFamily="34" charset="0"/>
+            </a:endParaRPr>
+          </a:p>
+          <a:p>
+            <a:pPr indent="0" algn="ctr">
+              <a:lnSpc>
+                <a:spcPct val="110000"/>
+              </a:lnSpc>
+              <a:spcBef>
+                <a:spcPts val="0"/>
+              </a:spcBef>
+              <a:buNone/>
+            </a:pPr>
+            <a:r>
+              <a:rPr lang="pt-PT" sz="3600" dirty="0" smtClean="0">
+                <a:solidFill>
+                  <a:schemeClr val="tx1">
+                    <a:lumMod val="85000"/>
+                    <a:lumOff val="15000"/>
+                  </a:schemeClr>
+                </a:solidFill>
+                <a:latin typeface="MetaSerif-Book" pitchFamily="34" charset="0"/>
+              </a:rPr>
+              <a:t>Implementation &amp; Impact Analysis</a:t>
+            </a:r>
+            <a:endParaRPr lang="pt-PT" sz="3600" dirty="0" smtClean="0">
+              <a:solidFill>
+                <a:schemeClr val="tx1">
+                  <a:lumMod val="85000"/>
+                  <a:lumOff val="15000"/>
+                </a:schemeClr>
+              </a:solidFill>
+              <a:latin typeface="MetaSerif-Book" pitchFamily="34" charset="0"/>
+            </a:endParaRPr>
           </a:p>
         </p:txBody>
       </p:sp>
@@ -4416,9 +4630,9 @@
                 </a:solidFill>
                 <a:latin typeface="League Gothic" pitchFamily="50" charset="0"/>
               </a:rPr>
-              <a:t>Rails &amp; MVC</a:t>
-            </a:r>
-            <a:endParaRPr lang="pt-PT" sz="3200" dirty="0">
+              <a:t>User Roles</a:t>
+            </a:r>
+            <a:endParaRPr lang="pt-PT" sz="1800" dirty="0">
               <a:solidFill>
                 <a:schemeClr val="bg1"/>
               </a:solidFill>
@@ -4451,12 +4665,12 @@
           </a:effectLst>
         </p:spPr>
         <p:txBody>
-          <a:bodyPr anchor="ctr" anchorCtr="1">
+          <a:bodyPr vert="horz" anchor="ctr" anchorCtr="1">
             <a:normAutofit/>
           </a:bodyPr>
           <a:lstStyle/>
           <a:p>
-            <a:pPr indent="0">
+            <a:pPr indent="0" algn="ctr">
               <a:lnSpc>
                 <a:spcPct val="110000"/>
               </a:lnSpc>
@@ -4465,18 +4679,15 @@
               </a:spcBef>
               <a:buNone/>
             </a:pPr>
-            <a:r>
-              <a:rPr lang="pt-PT" sz="3600" dirty="0" smtClean="0">
-                <a:solidFill>
-                  <a:schemeClr val="tx1">
-                    <a:lumMod val="85000"/>
-                    <a:lumOff val="15000"/>
-                  </a:schemeClr>
-                </a:solidFill>
-                <a:latin typeface="MetaSerif-Book" pitchFamily="34" charset="0"/>
-              </a:rPr>
-              <a:t>MVC architecture used by Rails can coexist harmoniously with AOM design patterns, especially with the AR engine</a:t>
-            </a:r>
+            <a:endParaRPr lang="pt-PT" sz="3600" dirty="0" smtClean="0">
+              <a:solidFill>
+                <a:schemeClr val="tx1">
+                  <a:lumMod val="85000"/>
+                  <a:lumOff val="15000"/>
+                </a:schemeClr>
+              </a:solidFill>
+              <a:latin typeface="MetaSerif-Book" pitchFamily="34" charset="0"/>
+            </a:endParaRPr>
           </a:p>
         </p:txBody>
       </p:sp>
@@ -4536,6 +4747,32 @@
           <a:chExt cx="0" cy="0"/>
         </a:xfrm>
       </p:grpSpPr>
+      <p:pic>
+        <p:nvPicPr>
+          <p:cNvPr id="3074" name="Picture 2" descr="C:\Users\jgradim\Documents\thesis\presentations\old_books.jpg"/>
+          <p:cNvPicPr>
+            <a:picLocks noChangeAspect="1" noChangeArrowheads="1"/>
+          </p:cNvPicPr>
+          <p:nvPr/>
+        </p:nvPicPr>
+        <p:blipFill>
+          <a:blip r:embed="rId2" cstate="print"/>
+          <a:srcRect r="11066"/>
+          <a:stretch>
+            <a:fillRect/>
+          </a:stretch>
+        </p:blipFill>
+        <p:spPr bwMode="auto">
+          <a:xfrm>
+            <a:off x="0" y="0"/>
+            <a:ext cx="9144000" cy="6858000"/>
+          </a:xfrm>
+          <a:prstGeom prst="rect">
+            <a:avLst/>
+          </a:prstGeom>
+          <a:noFill/>
+        </p:spPr>
+      </p:pic>
       <p:sp>
         <p:nvSpPr>
           <p:cNvPr id="2" name="Title 1"/>
@@ -4548,8 +4785,8 @@
         </p:nvSpPr>
         <p:spPr>
           <a:xfrm>
-            <a:off x="5868144" y="188640"/>
-            <a:ext cx="3275856" cy="706090"/>
+            <a:off x="0" y="2941730"/>
+            <a:ext cx="4644008" cy="974540"/>
           </a:xfrm>
           <a:solidFill>
             <a:schemeClr val="tx1">
@@ -4558,22 +4795,22 @@
           </a:solidFill>
         </p:spPr>
         <p:txBody>
-          <a:bodyPr rIns="144000">
-            <a:normAutofit/>
+          <a:bodyPr lIns="360000">
+            <a:noAutofit/>
           </a:bodyPr>
           <a:lstStyle/>
           <a:p>
-            <a:pPr algn="r"/>
-            <a:r>
-              <a:rPr lang="pt-PT" sz="3200" dirty="0" smtClean="0">
+            <a:pPr algn="l"/>
+            <a:r>
+              <a:rPr lang="pt-PT" sz="5400" dirty="0" smtClean="0">
                 <a:solidFill>
                   <a:schemeClr val="bg1"/>
                 </a:solidFill>
                 <a:latin typeface="League Gothic" pitchFamily="50" charset="0"/>
               </a:rPr>
-              <a:t>Variability</a:t>
-            </a:r>
-            <a:endParaRPr lang="pt-PT" sz="3200" dirty="0">
+              <a:t>Conclusions</a:t>
+            </a:r>
+            <a:endParaRPr lang="pt-PT" sz="5400" dirty="0">
               <a:solidFill>
                 <a:schemeClr val="bg1"/>
               </a:solidFill>
@@ -4584,75 +4821,72 @@
       </p:sp>
       <p:sp>
         <p:nvSpPr>
-          <p:cNvPr id="3" name="Content Placeholder 2"/>
-          <p:cNvSpPr>
-            <a:spLocks noGrp="1"/>
-          </p:cNvSpPr>
-          <p:nvPr>
-            <p:ph idx="1"/>
-          </p:nvPr>
+          <p:cNvPr id="4" name="TextBox 3"/>
+          <p:cNvSpPr txBox="1"/>
+          <p:nvPr/>
         </p:nvSpPr>
         <p:spPr>
           <a:xfrm>
-            <a:off x="457200" y="1124744"/>
-            <a:ext cx="8229600" cy="5040560"/>
-          </a:xfrm>
-          <a:effectLst>
-            <a:outerShdw blurRad="50800" dist="25400" dir="2700000" algn="tl" rotWithShape="0">
-              <a:prstClr val="black">
-                <a:alpha val="15000"/>
-              </a:prstClr>
-            </a:outerShdw>
-          </a:effectLst>
-        </p:spPr>
-        <p:txBody>
-          <a:bodyPr anchor="ctr" anchorCtr="1">
-            <a:normAutofit/>
+            <a:off x="1" y="6599813"/>
+            <a:ext cx="9144000" cy="246221"/>
+          </a:xfrm>
+          <a:prstGeom prst="rect">
+            <a:avLst/>
+          </a:prstGeom>
+          <a:noFill/>
+        </p:spPr>
+        <p:txBody>
+          <a:bodyPr wrap="square" rtlCol="0">
+            <a:spAutoFit/>
           </a:bodyPr>
           <a:lstStyle/>
           <a:p>
-            <a:pPr indent="0">
-              <a:lnSpc>
-                <a:spcPct val="110000"/>
-              </a:lnSpc>
-              <a:spcBef>
-                <a:spcPts val="0"/>
-              </a:spcBef>
-              <a:buNone/>
-            </a:pPr>
-            <a:endParaRPr lang="pt-PT" sz="3600" dirty="0" smtClean="0">
+            <a:pPr algn="r"/>
+            <a:r>
+              <a:rPr lang="pt-PT" sz="1000" dirty="0" smtClean="0">
+                <a:solidFill>
+                  <a:schemeClr val="bg1"/>
+                </a:solidFill>
+                <a:effectLst>
+                  <a:outerShdw blurRad="38100" dist="38100" dir="2700000" algn="tl">
+                    <a:srgbClr val="000000">
+                      <a:alpha val="43137"/>
+                    </a:srgbClr>
+                  </a:outerShdw>
+                </a:effectLst>
+                <a:latin typeface="MetaSerif-Book" pitchFamily="34" charset="0"/>
+              </a:rPr>
+              <a:t>http://www.flickr.com/photos/ </a:t>
+            </a:r>
+            <a:r>
+              <a:rPr lang="pt-PT" sz="1000" dirty="0" smtClean="0">
+                <a:solidFill>
+                  <a:schemeClr val="bg1"/>
+                </a:solidFill>
+                <a:effectLst>
+                  <a:outerShdw blurRad="38100" dist="38100" dir="2700000" algn="tl">
+                    <a:srgbClr val="000000">
+                      <a:alpha val="43137"/>
+                    </a:srgbClr>
+                  </a:outerShdw>
+                </a:effectLst>
+                <a:latin typeface="MetaSerif-Book" pitchFamily="34" charset="0"/>
+              </a:rPr>
+              <a:t>dklimke /</a:t>
+            </a:r>
+            <a:endParaRPr lang="pt-PT" sz="1000" dirty="0">
               <a:solidFill>
-                <a:schemeClr val="tx1">
-                  <a:lumMod val="85000"/>
-                  <a:lumOff val="15000"/>
-                </a:schemeClr>
+                <a:schemeClr val="bg1"/>
               </a:solidFill>
+              <a:effectLst>
+                <a:outerShdw blurRad="38100" dist="38100" dir="2700000" algn="tl">
+                  <a:srgbClr val="000000">
+                    <a:alpha val="43137"/>
+                  </a:srgbClr>
+                </a:outerShdw>
+              </a:effectLst>
               <a:latin typeface="MetaSerif-Book" pitchFamily="34" charset="0"/>
             </a:endParaRPr>
-          </a:p>
-        </p:txBody>
-      </p:sp>
-      <p:sp>
-        <p:nvSpPr>
-          <p:cNvPr id="4" name="Slide Number Placeholder 3"/>
-          <p:cNvSpPr>
-            <a:spLocks noGrp="1"/>
-          </p:cNvSpPr>
-          <p:nvPr>
-            <p:ph type="sldNum" sz="quarter" idx="12"/>
-          </p:nvPr>
-        </p:nvSpPr>
-        <p:spPr/>
-        <p:txBody>
-          <a:bodyPr/>
-          <a:lstStyle/>
-          <a:p>
-            <a:fld id="{AF2DD60D-AE1E-4B35-90D2-0ABAEDD7A6F5}" type="slidenum">
-              <a:rPr lang="pt-PT" smtClean="0"/>
-              <a:pPr/>
-              <a:t>15</a:t>
-            </a:fld>
-            <a:endParaRPr lang="pt-PT" dirty="0"/>
           </a:p>
         </p:txBody>
       </p:sp>
@@ -4723,7 +4957,7 @@
                 </a:solidFill>
                 <a:latin typeface="League Gothic" pitchFamily="50" charset="0"/>
               </a:rPr>
-              <a:t>Performance</a:t>
+              <a:t>AOMs</a:t>
             </a:r>
             <a:endParaRPr lang="pt-PT" sz="3200" dirty="0">
               <a:solidFill>
@@ -4758,7 +4992,7 @@
           </a:effectLst>
         </p:spPr>
         <p:txBody>
-          <a:bodyPr anchor="ctr" anchorCtr="1">
+          <a:bodyPr vert="horz" anchor="ctr" anchorCtr="1">
             <a:normAutofit/>
           </a:bodyPr>
           <a:lstStyle/>
@@ -4782,7 +5016,7 @@
                 </a:solidFill>
                 <a:latin typeface="MetaSerif-Book" pitchFamily="34" charset="0"/>
               </a:rPr>
-              <a:t>Performance can be increased</a:t>
+              <a:t>AOM architectures provide the best framework for building adaptable software systems</a:t>
             </a:r>
           </a:p>
         </p:txBody>
@@ -4843,32 +5077,6 @@
           <a:chExt cx="0" cy="0"/>
         </a:xfrm>
       </p:grpSpPr>
-      <p:pic>
-        <p:nvPicPr>
-          <p:cNvPr id="3076" name="Picture 4" descr="C:\Users\jgradim\Documents\thesis\presentations\death_star.jpg"/>
-          <p:cNvPicPr>
-            <a:picLocks noChangeAspect="1" noChangeArrowheads="1"/>
-          </p:cNvPicPr>
-          <p:nvPr/>
-        </p:nvPicPr>
-        <p:blipFill>
-          <a:blip r:embed="rId2" cstate="print"/>
-          <a:srcRect r="2083"/>
-          <a:stretch>
-            <a:fillRect/>
-          </a:stretch>
-        </p:blipFill>
-        <p:spPr bwMode="auto">
-          <a:xfrm>
-            <a:off x="0" y="0"/>
-            <a:ext cx="9144000" cy="6858000"/>
-          </a:xfrm>
-          <a:prstGeom prst="rect">
-            <a:avLst/>
-          </a:prstGeom>
-          <a:noFill/>
-        </p:spPr>
-      </p:pic>
       <p:sp>
         <p:nvSpPr>
           <p:cNvPr id="2" name="Title 1"/>
@@ -4881,8 +5089,8 @@
         </p:nvSpPr>
         <p:spPr>
           <a:xfrm>
-            <a:off x="0" y="2941730"/>
-            <a:ext cx="4644008" cy="974540"/>
+            <a:off x="5868144" y="188640"/>
+            <a:ext cx="3275856" cy="706090"/>
           </a:xfrm>
           <a:solidFill>
             <a:schemeClr val="tx1">
@@ -4891,27 +5099,104 @@
           </a:solidFill>
         </p:spPr>
         <p:txBody>
-          <a:bodyPr lIns="360000">
-            <a:noAutofit/>
+          <a:bodyPr rIns="144000">
+            <a:normAutofit/>
           </a:bodyPr>
           <a:lstStyle/>
           <a:p>
-            <a:pPr algn="l"/>
-            <a:r>
-              <a:rPr lang="pt-PT" sz="5400" dirty="0" smtClean="0">
+            <a:pPr algn="r"/>
+            <a:r>
+              <a:rPr lang="pt-PT" sz="3200" dirty="0" smtClean="0">
                 <a:solidFill>
                   <a:schemeClr val="bg1"/>
                 </a:solidFill>
                 <a:latin typeface="League Gothic" pitchFamily="50" charset="0"/>
               </a:rPr>
-              <a:t>Further Work</a:t>
-            </a:r>
-            <a:endParaRPr lang="pt-PT" sz="5400" dirty="0">
+              <a:t>Rails &amp; MVC</a:t>
+            </a:r>
+            <a:endParaRPr lang="pt-PT" sz="3200" dirty="0">
               <a:solidFill>
                 <a:schemeClr val="bg1"/>
               </a:solidFill>
               <a:latin typeface="League Gothic" pitchFamily="50" charset="0"/>
             </a:endParaRPr>
+          </a:p>
+        </p:txBody>
+      </p:sp>
+      <p:sp>
+        <p:nvSpPr>
+          <p:cNvPr id="3" name="Content Placeholder 2"/>
+          <p:cNvSpPr>
+            <a:spLocks noGrp="1"/>
+          </p:cNvSpPr>
+          <p:nvPr>
+            <p:ph idx="1"/>
+          </p:nvPr>
+        </p:nvSpPr>
+        <p:spPr>
+          <a:xfrm>
+            <a:off x="457200" y="1124744"/>
+            <a:ext cx="8229600" cy="5040560"/>
+          </a:xfrm>
+          <a:effectLst>
+            <a:outerShdw blurRad="50800" dist="25400" dir="2700000" algn="tl" rotWithShape="0">
+              <a:prstClr val="black">
+                <a:alpha val="15000"/>
+              </a:prstClr>
+            </a:outerShdw>
+          </a:effectLst>
+        </p:spPr>
+        <p:txBody>
+          <a:bodyPr anchor="ctr" anchorCtr="1">
+            <a:normAutofit/>
+          </a:bodyPr>
+          <a:lstStyle/>
+          <a:p>
+            <a:pPr indent="0">
+              <a:lnSpc>
+                <a:spcPct val="110000"/>
+              </a:lnSpc>
+              <a:spcBef>
+                <a:spcPts val="0"/>
+              </a:spcBef>
+              <a:buNone/>
+            </a:pPr>
+            <a:r>
+              <a:rPr lang="pt-PT" sz="3600" dirty="0" smtClean="0">
+                <a:solidFill>
+                  <a:schemeClr val="tx1">
+                    <a:lumMod val="85000"/>
+                    <a:lumOff val="15000"/>
+                  </a:schemeClr>
+                </a:solidFill>
+                <a:latin typeface="MetaSerif-Book" pitchFamily="34" charset="0"/>
+              </a:rPr>
+              <a:t>MVC architecture used by Rails can coexist harmoniously with AOM design patterns, especially with the AR engine</a:t>
+            </a:r>
+          </a:p>
+        </p:txBody>
+      </p:sp>
+      <p:sp>
+        <p:nvSpPr>
+          <p:cNvPr id="4" name="Slide Number Placeholder 3"/>
+          <p:cNvSpPr>
+            <a:spLocks noGrp="1"/>
+          </p:cNvSpPr>
+          <p:nvPr>
+            <p:ph type="sldNum" sz="quarter" idx="12"/>
+          </p:nvPr>
+        </p:nvSpPr>
+        <p:spPr/>
+        <p:txBody>
+          <a:bodyPr/>
+          <a:lstStyle/>
+          <a:p>
+            <a:fld id="{AF2DD60D-AE1E-4B35-90D2-0ABAEDD7A6F5}" type="slidenum">
+              <a:rPr lang="pt-PT" smtClean="0"/>
+              <a:pPr/>
+              <a:t>17</a:t>
+            </a:fld>
+            <a:endParaRPr lang="pt-PT" dirty="0"/>
           </a:p>
         </p:txBody>
       </p:sp>
@@ -4982,7 +5267,7 @@
                 </a:solidFill>
                 <a:latin typeface="League Gothic" pitchFamily="50" charset="0"/>
               </a:rPr>
-              <a:t>Implementation</a:t>
+              <a:t>Variability</a:t>
             </a:r>
             <a:endParaRPr lang="pt-PT" sz="3200" dirty="0">
               <a:solidFill>
@@ -5183,15 +5468,18 @@
               </a:spcBef>
               <a:buNone/>
             </a:pPr>
-            <a:endParaRPr lang="pt-PT" sz="3600" dirty="0" smtClean="0">
-              <a:solidFill>
-                <a:schemeClr val="tx1">
-                  <a:lumMod val="85000"/>
-                  <a:lumOff val="15000"/>
-                </a:schemeClr>
-              </a:solidFill>
-              <a:latin typeface="MetaSerif-Book" pitchFamily="34" charset="0"/>
-            </a:endParaRPr>
+            <a:r>
+              <a:rPr lang="pt-PT" sz="3600" dirty="0" smtClean="0">
+                <a:solidFill>
+                  <a:schemeClr val="tx1">
+                    <a:lumMod val="85000"/>
+                    <a:lumOff val="15000"/>
+                  </a:schemeClr>
+                </a:solidFill>
+                <a:latin typeface="MetaSerif-Book" pitchFamily="34" charset="0"/>
+              </a:rPr>
+              <a:t>Performance can be increased</a:t>
+            </a:r>
           </a:p>
         </p:txBody>
       </p:sp>
@@ -5320,6 +5608,485 @@
               </a:solidFill>
               <a:latin typeface="League Gothic" pitchFamily="50" charset="0"/>
             </a:endParaRPr>
+          </a:p>
+        </p:txBody>
+      </p:sp>
+      <p:sp>
+        <p:nvSpPr>
+          <p:cNvPr id="4" name="TextBox 3"/>
+          <p:cNvSpPr txBox="1"/>
+          <p:nvPr/>
+        </p:nvSpPr>
+        <p:spPr>
+          <a:xfrm>
+            <a:off x="1" y="6599813"/>
+            <a:ext cx="9144000" cy="246221"/>
+          </a:xfrm>
+          <a:prstGeom prst="rect">
+            <a:avLst/>
+          </a:prstGeom>
+          <a:noFill/>
+        </p:spPr>
+        <p:txBody>
+          <a:bodyPr wrap="square" rtlCol="0">
+            <a:spAutoFit/>
+          </a:bodyPr>
+          <a:lstStyle/>
+          <a:p>
+            <a:pPr algn="r"/>
+            <a:r>
+              <a:rPr lang="pt-PT" sz="1000" dirty="0" smtClean="0">
+                <a:solidFill>
+                  <a:schemeClr val="bg1"/>
+                </a:solidFill>
+                <a:effectLst>
+                  <a:outerShdw blurRad="38100" dist="38100" dir="2700000" algn="tl">
+                    <a:srgbClr val="000000">
+                      <a:alpha val="43137"/>
+                    </a:srgbClr>
+                  </a:outerShdw>
+                </a:effectLst>
+                <a:latin typeface="MetaSerif-Book" pitchFamily="34" charset="0"/>
+              </a:rPr>
+              <a:t>http://</a:t>
+            </a:r>
+            <a:r>
+              <a:rPr lang="pt-PT" sz="1000" dirty="0" smtClean="0">
+                <a:solidFill>
+                  <a:schemeClr val="bg1"/>
+                </a:solidFill>
+                <a:effectLst>
+                  <a:outerShdw blurRad="38100" dist="38100" dir="2700000" algn="tl">
+                    <a:srgbClr val="000000">
+                      <a:alpha val="43137"/>
+                    </a:srgbClr>
+                  </a:outerShdw>
+                </a:effectLst>
+                <a:latin typeface="MetaSerif-Book" pitchFamily="34" charset="0"/>
+              </a:rPr>
+              <a:t>www.flickr.com/photos/seb-o/</a:t>
+            </a:r>
+            <a:endParaRPr lang="pt-PT" sz="1000" dirty="0">
+              <a:solidFill>
+                <a:schemeClr val="bg1"/>
+              </a:solidFill>
+              <a:effectLst>
+                <a:outerShdw blurRad="38100" dist="38100" dir="2700000" algn="tl">
+                  <a:srgbClr val="000000">
+                    <a:alpha val="43137"/>
+                  </a:srgbClr>
+                </a:outerShdw>
+              </a:effectLst>
+              <a:latin typeface="MetaSerif-Book" pitchFamily="34" charset="0"/>
+            </a:endParaRPr>
+          </a:p>
+        </p:txBody>
+      </p:sp>
+    </p:spTree>
+  </p:cSld>
+  <p:clrMapOvr>
+    <a:masterClrMapping/>
+  </p:clrMapOvr>
+  <p:timing>
+    <p:tnLst>
+      <p:par>
+        <p:cTn id="1" dur="indefinite" restart="never" nodeType="tmRoot"/>
+      </p:par>
+    </p:tnLst>
+  </p:timing>
+</p:sld>
+</file>
+
+<file path=ppt/slides/slide20.xml><?xml version="1.0" encoding="utf-8"?>
+<p:sld xmlns:a="http://schemas.openxmlformats.org/drawingml/2006/main" xmlns:r="http://schemas.openxmlformats.org/officeDocument/2006/relationships" xmlns:p="http://schemas.openxmlformats.org/presentationml/2006/main">
+  <p:cSld>
+    <p:spTree>
+      <p:nvGrpSpPr>
+        <p:cNvPr id="1" name=""/>
+        <p:cNvGrpSpPr/>
+        <p:nvPr/>
+      </p:nvGrpSpPr>
+      <p:grpSpPr>
+        <a:xfrm>
+          <a:off x="0" y="0"/>
+          <a:ext cx="0" cy="0"/>
+          <a:chOff x="0" y="0"/>
+          <a:chExt cx="0" cy="0"/>
+        </a:xfrm>
+      </p:grpSpPr>
+      <p:pic>
+        <p:nvPicPr>
+          <p:cNvPr id="3076" name="Picture 4" descr="C:\Users\jgradim\Documents\thesis\presentations\death_star.jpg"/>
+          <p:cNvPicPr>
+            <a:picLocks noChangeAspect="1" noChangeArrowheads="1"/>
+          </p:cNvPicPr>
+          <p:nvPr/>
+        </p:nvPicPr>
+        <p:blipFill>
+          <a:blip r:embed="rId2" cstate="print"/>
+          <a:srcRect r="2083"/>
+          <a:stretch>
+            <a:fillRect/>
+          </a:stretch>
+        </p:blipFill>
+        <p:spPr bwMode="auto">
+          <a:xfrm>
+            <a:off x="0" y="0"/>
+            <a:ext cx="9144000" cy="6858000"/>
+          </a:xfrm>
+          <a:prstGeom prst="rect">
+            <a:avLst/>
+          </a:prstGeom>
+          <a:noFill/>
+        </p:spPr>
+      </p:pic>
+      <p:sp>
+        <p:nvSpPr>
+          <p:cNvPr id="2" name="Title 1"/>
+          <p:cNvSpPr>
+            <a:spLocks noGrp="1"/>
+          </p:cNvSpPr>
+          <p:nvPr>
+            <p:ph type="title"/>
+          </p:nvPr>
+        </p:nvSpPr>
+        <p:spPr>
+          <a:xfrm>
+            <a:off x="0" y="2941730"/>
+            <a:ext cx="4644008" cy="974540"/>
+          </a:xfrm>
+          <a:solidFill>
+            <a:schemeClr val="tx1">
+              <a:alpha val="90000"/>
+            </a:schemeClr>
+          </a:solidFill>
+        </p:spPr>
+        <p:txBody>
+          <a:bodyPr lIns="360000">
+            <a:noAutofit/>
+          </a:bodyPr>
+          <a:lstStyle/>
+          <a:p>
+            <a:pPr algn="l"/>
+            <a:r>
+              <a:rPr lang="pt-PT" sz="5400" dirty="0" smtClean="0">
+                <a:solidFill>
+                  <a:schemeClr val="bg1"/>
+                </a:solidFill>
+                <a:latin typeface="League Gothic" pitchFamily="50" charset="0"/>
+              </a:rPr>
+              <a:t>Further Work</a:t>
+            </a:r>
+            <a:endParaRPr lang="pt-PT" sz="5400" dirty="0">
+              <a:solidFill>
+                <a:schemeClr val="bg1"/>
+              </a:solidFill>
+              <a:latin typeface="League Gothic" pitchFamily="50" charset="0"/>
+            </a:endParaRPr>
+          </a:p>
+        </p:txBody>
+      </p:sp>
+    </p:spTree>
+  </p:cSld>
+  <p:clrMapOvr>
+    <a:masterClrMapping/>
+  </p:clrMapOvr>
+  <p:timing>
+    <p:tnLst>
+      <p:par>
+        <p:cTn id="1" dur="indefinite" restart="never" nodeType="tmRoot"/>
+      </p:par>
+    </p:tnLst>
+  </p:timing>
+</p:sld>
+</file>
+
+<file path=ppt/slides/slide21.xml><?xml version="1.0" encoding="utf-8"?>
+<p:sld xmlns:a="http://schemas.openxmlformats.org/drawingml/2006/main" xmlns:r="http://schemas.openxmlformats.org/officeDocument/2006/relationships" xmlns:p="http://schemas.openxmlformats.org/presentationml/2006/main">
+  <p:cSld>
+    <p:spTree>
+      <p:nvGrpSpPr>
+        <p:cNvPr id="1" name=""/>
+        <p:cNvGrpSpPr/>
+        <p:nvPr/>
+      </p:nvGrpSpPr>
+      <p:grpSpPr>
+        <a:xfrm>
+          <a:off x="0" y="0"/>
+          <a:ext cx="0" cy="0"/>
+          <a:chOff x="0" y="0"/>
+          <a:chExt cx="0" cy="0"/>
+        </a:xfrm>
+      </p:grpSpPr>
+      <p:sp>
+        <p:nvSpPr>
+          <p:cNvPr id="2" name="Title 1"/>
+          <p:cNvSpPr>
+            <a:spLocks noGrp="1"/>
+          </p:cNvSpPr>
+          <p:nvPr>
+            <p:ph type="title"/>
+          </p:nvPr>
+        </p:nvSpPr>
+        <p:spPr>
+          <a:xfrm>
+            <a:off x="5868144" y="188640"/>
+            <a:ext cx="3275856" cy="706090"/>
+          </a:xfrm>
+          <a:solidFill>
+            <a:schemeClr val="tx1">
+              <a:alpha val="90000"/>
+            </a:schemeClr>
+          </a:solidFill>
+        </p:spPr>
+        <p:txBody>
+          <a:bodyPr rIns="144000">
+            <a:normAutofit/>
+          </a:bodyPr>
+          <a:lstStyle/>
+          <a:p>
+            <a:pPr algn="r"/>
+            <a:r>
+              <a:rPr lang="pt-PT" sz="3200" dirty="0" smtClean="0">
+                <a:solidFill>
+                  <a:schemeClr val="bg1"/>
+                </a:solidFill>
+                <a:latin typeface="League Gothic" pitchFamily="50" charset="0"/>
+              </a:rPr>
+              <a:t>Implementation</a:t>
+            </a:r>
+            <a:endParaRPr lang="pt-PT" sz="3200" dirty="0">
+              <a:solidFill>
+                <a:schemeClr val="bg1"/>
+              </a:solidFill>
+              <a:latin typeface="League Gothic" pitchFamily="50" charset="0"/>
+            </a:endParaRPr>
+          </a:p>
+        </p:txBody>
+      </p:sp>
+      <p:sp>
+        <p:nvSpPr>
+          <p:cNvPr id="3" name="Content Placeholder 2"/>
+          <p:cNvSpPr>
+            <a:spLocks noGrp="1"/>
+          </p:cNvSpPr>
+          <p:nvPr>
+            <p:ph idx="1"/>
+          </p:nvPr>
+        </p:nvSpPr>
+        <p:spPr>
+          <a:xfrm>
+            <a:off x="457200" y="1124744"/>
+            <a:ext cx="8229600" cy="5040560"/>
+          </a:xfrm>
+          <a:effectLst>
+            <a:outerShdw blurRad="50800" dist="25400" dir="2700000" algn="tl" rotWithShape="0">
+              <a:prstClr val="black">
+                <a:alpha val="15000"/>
+              </a:prstClr>
+            </a:outerShdw>
+          </a:effectLst>
+        </p:spPr>
+        <p:txBody>
+          <a:bodyPr anchor="ctr" anchorCtr="1">
+            <a:normAutofit/>
+          </a:bodyPr>
+          <a:lstStyle/>
+          <a:p>
+            <a:pPr indent="0">
+              <a:lnSpc>
+                <a:spcPct val="110000"/>
+              </a:lnSpc>
+              <a:spcBef>
+                <a:spcPts val="0"/>
+              </a:spcBef>
+              <a:buNone/>
+            </a:pPr>
+            <a:endParaRPr lang="pt-PT" sz="3600" dirty="0" smtClean="0">
+              <a:solidFill>
+                <a:schemeClr val="tx1">
+                  <a:lumMod val="85000"/>
+                  <a:lumOff val="15000"/>
+                </a:schemeClr>
+              </a:solidFill>
+              <a:latin typeface="MetaSerif-Book" pitchFamily="34" charset="0"/>
+            </a:endParaRPr>
+          </a:p>
+        </p:txBody>
+      </p:sp>
+      <p:sp>
+        <p:nvSpPr>
+          <p:cNvPr id="4" name="Slide Number Placeholder 3"/>
+          <p:cNvSpPr>
+            <a:spLocks noGrp="1"/>
+          </p:cNvSpPr>
+          <p:nvPr>
+            <p:ph type="sldNum" sz="quarter" idx="12"/>
+          </p:nvPr>
+        </p:nvSpPr>
+        <p:spPr/>
+        <p:txBody>
+          <a:bodyPr/>
+          <a:lstStyle/>
+          <a:p>
+            <a:fld id="{AF2DD60D-AE1E-4B35-90D2-0ABAEDD7A6F5}" type="slidenum">
+              <a:rPr lang="pt-PT" smtClean="0"/>
+              <a:pPr/>
+              <a:t>21</a:t>
+            </a:fld>
+            <a:endParaRPr lang="pt-PT" dirty="0"/>
+          </a:p>
+        </p:txBody>
+      </p:sp>
+    </p:spTree>
+  </p:cSld>
+  <p:clrMapOvr>
+    <a:masterClrMapping/>
+  </p:clrMapOvr>
+  <p:timing>
+    <p:tnLst>
+      <p:par>
+        <p:cTn id="1" dur="indefinite" restart="never" nodeType="tmRoot"/>
+      </p:par>
+    </p:tnLst>
+  </p:timing>
+</p:sld>
+</file>
+
+<file path=ppt/slides/slide22.xml><?xml version="1.0" encoding="utf-8"?>
+<p:sld xmlns:a="http://schemas.openxmlformats.org/drawingml/2006/main" xmlns:r="http://schemas.openxmlformats.org/officeDocument/2006/relationships" xmlns:p="http://schemas.openxmlformats.org/presentationml/2006/main">
+  <p:cSld>
+    <p:spTree>
+      <p:nvGrpSpPr>
+        <p:cNvPr id="1" name=""/>
+        <p:cNvGrpSpPr/>
+        <p:nvPr/>
+      </p:nvGrpSpPr>
+      <p:grpSpPr>
+        <a:xfrm>
+          <a:off x="0" y="0"/>
+          <a:ext cx="0" cy="0"/>
+          <a:chOff x="0" y="0"/>
+          <a:chExt cx="0" cy="0"/>
+        </a:xfrm>
+      </p:grpSpPr>
+      <p:sp>
+        <p:nvSpPr>
+          <p:cNvPr id="2" name="Title 1"/>
+          <p:cNvSpPr>
+            <a:spLocks noGrp="1"/>
+          </p:cNvSpPr>
+          <p:nvPr>
+            <p:ph type="title"/>
+          </p:nvPr>
+        </p:nvSpPr>
+        <p:spPr>
+          <a:xfrm>
+            <a:off x="5868144" y="188640"/>
+            <a:ext cx="3275856" cy="706090"/>
+          </a:xfrm>
+          <a:solidFill>
+            <a:schemeClr val="tx1">
+              <a:alpha val="90000"/>
+            </a:schemeClr>
+          </a:solidFill>
+        </p:spPr>
+        <p:txBody>
+          <a:bodyPr rIns="144000">
+            <a:normAutofit/>
+          </a:bodyPr>
+          <a:lstStyle/>
+          <a:p>
+            <a:pPr algn="r"/>
+            <a:r>
+              <a:rPr lang="pt-PT" sz="3200" dirty="0" smtClean="0">
+                <a:solidFill>
+                  <a:schemeClr val="bg1"/>
+                </a:solidFill>
+                <a:latin typeface="League Gothic" pitchFamily="50" charset="0"/>
+              </a:rPr>
+              <a:t>Performance</a:t>
+            </a:r>
+            <a:endParaRPr lang="pt-PT" sz="3200" dirty="0">
+              <a:solidFill>
+                <a:schemeClr val="bg1"/>
+              </a:solidFill>
+              <a:latin typeface="League Gothic" pitchFamily="50" charset="0"/>
+            </a:endParaRPr>
+          </a:p>
+        </p:txBody>
+      </p:sp>
+      <p:sp>
+        <p:nvSpPr>
+          <p:cNvPr id="3" name="Content Placeholder 2"/>
+          <p:cNvSpPr>
+            <a:spLocks noGrp="1"/>
+          </p:cNvSpPr>
+          <p:nvPr>
+            <p:ph idx="1"/>
+          </p:nvPr>
+        </p:nvSpPr>
+        <p:spPr>
+          <a:xfrm>
+            <a:off x="457200" y="1124744"/>
+            <a:ext cx="8229600" cy="5040560"/>
+          </a:xfrm>
+          <a:effectLst>
+            <a:outerShdw blurRad="50800" dist="25400" dir="2700000" algn="tl" rotWithShape="0">
+              <a:prstClr val="black">
+                <a:alpha val="15000"/>
+              </a:prstClr>
+            </a:outerShdw>
+          </a:effectLst>
+        </p:spPr>
+        <p:txBody>
+          <a:bodyPr anchor="ctr" anchorCtr="1">
+            <a:normAutofit/>
+          </a:bodyPr>
+          <a:lstStyle/>
+          <a:p>
+            <a:pPr indent="0">
+              <a:lnSpc>
+                <a:spcPct val="110000"/>
+              </a:lnSpc>
+              <a:spcBef>
+                <a:spcPts val="0"/>
+              </a:spcBef>
+              <a:buNone/>
+            </a:pPr>
+            <a:endParaRPr lang="pt-PT" sz="3600" dirty="0" smtClean="0">
+              <a:solidFill>
+                <a:schemeClr val="tx1">
+                  <a:lumMod val="85000"/>
+                  <a:lumOff val="15000"/>
+                </a:schemeClr>
+              </a:solidFill>
+              <a:latin typeface="MetaSerif-Book" pitchFamily="34" charset="0"/>
+            </a:endParaRPr>
+          </a:p>
+        </p:txBody>
+      </p:sp>
+      <p:sp>
+        <p:nvSpPr>
+          <p:cNvPr id="4" name="Slide Number Placeholder 3"/>
+          <p:cNvSpPr>
+            <a:spLocks noGrp="1"/>
+          </p:cNvSpPr>
+          <p:nvPr>
+            <p:ph type="sldNum" sz="quarter" idx="12"/>
+          </p:nvPr>
+        </p:nvSpPr>
+        <p:spPr/>
+        <p:txBody>
+          <a:bodyPr/>
+          <a:lstStyle/>
+          <a:p>
+            <a:fld id="{AF2DD60D-AE1E-4B35-90D2-0ABAEDD7A6F5}" type="slidenum">
+              <a:rPr lang="pt-PT" smtClean="0"/>
+              <a:pPr/>
+              <a:t>22</a:t>
+            </a:fld>
+            <a:endParaRPr lang="pt-PT" dirty="0"/>
           </a:p>
         </p:txBody>
       </p:sp>
@@ -5983,6 +6750,77 @@
           </a:p>
         </p:txBody>
       </p:sp>
+      <p:sp>
+        <p:nvSpPr>
+          <p:cNvPr id="8" name="TextBox 7"/>
+          <p:cNvSpPr txBox="1"/>
+          <p:nvPr/>
+        </p:nvSpPr>
+        <p:spPr>
+          <a:xfrm>
+            <a:off x="1" y="6599813"/>
+            <a:ext cx="9144000" cy="246221"/>
+          </a:xfrm>
+          <a:prstGeom prst="rect">
+            <a:avLst/>
+          </a:prstGeom>
+          <a:noFill/>
+        </p:spPr>
+        <p:txBody>
+          <a:bodyPr wrap="square" rtlCol="0">
+            <a:spAutoFit/>
+          </a:bodyPr>
+          <a:lstStyle/>
+          <a:p>
+            <a:pPr algn="r"/>
+            <a:r>
+              <a:rPr lang="pt-PT" sz="1000" dirty="0" smtClean="0">
+                <a:solidFill>
+                  <a:schemeClr val="bg1"/>
+                </a:solidFill>
+                <a:effectLst>
+                  <a:outerShdw blurRad="38100" dist="38100" dir="2700000" algn="tl">
+                    <a:srgbClr val="000000">
+                      <a:alpha val="43137"/>
+                    </a:srgbClr>
+                  </a:outerShdw>
+                </a:effectLst>
+                <a:latin typeface="MetaSerif-Book" pitchFamily="34" charset="0"/>
+              </a:rPr>
+              <a:t>http://</a:t>
+            </a:r>
+            <a:r>
+              <a:rPr lang="pt-PT" sz="1000" dirty="0" smtClean="0">
+                <a:solidFill>
+                  <a:schemeClr val="bg1"/>
+                </a:solidFill>
+                <a:effectLst>
+                  <a:outerShdw blurRad="38100" dist="38100" dir="2700000" algn="tl">
+                    <a:srgbClr val="000000">
+                      <a:alpha val="43137"/>
+                    </a:srgbClr>
+                  </a:outerShdw>
+                </a:effectLst>
+                <a:latin typeface="MetaSerif-Book" pitchFamily="34" charset="0"/>
+              </a:rPr>
+              <a:t>www.flickr.com/photos/minieng/</a:t>
+            </a:r>
+            <a:endParaRPr lang="pt-PT" sz="1000" dirty="0">
+              <a:solidFill>
+                <a:schemeClr val="bg1"/>
+              </a:solidFill>
+              <a:effectLst>
+                <a:outerShdw blurRad="38100" dist="38100" dir="2700000" algn="tl">
+                  <a:srgbClr val="000000">
+                    <a:alpha val="43137"/>
+                  </a:srgbClr>
+                </a:outerShdw>
+              </a:effectLst>
+              <a:latin typeface="MetaSerif-Book" pitchFamily="34" charset="0"/>
+            </a:endParaRPr>
+          </a:p>
+        </p:txBody>
+      </p:sp>
     </p:spTree>
   </p:cSld>
   <p:clrMapOvr>
@@ -6446,7 +7284,7 @@
                 </a:solidFill>
                 <a:latin typeface="League Gothic" pitchFamily="50" charset="0"/>
               </a:rPr>
-              <a:t>Metaprogramming</a:t>
+              <a:t>Programming Paradigms</a:t>
             </a:r>
             <a:endParaRPr lang="pt-PT" sz="3200" dirty="0">
               <a:solidFill>

</xml_diff>